<commit_message>
Added Information to PPT
Minor changes to Landmark app
</commit_message>
<xml_diff>
--- a/Presentations/Sprint01 ReviewMeeting.pptx
+++ b/Presentations/Sprint01 ReviewMeeting.pptx
@@ -5,7 +5,7 @@
     <p:sldMasterId id="2147483648" r:id="rId1"/>
   </p:sldMasterIdLst>
   <p:notesMasterIdLst>
-    <p:notesMasterId r:id="rId26"/>
+    <p:notesMasterId r:id="rId29"/>
   </p:notesMasterIdLst>
   <p:sldIdLst>
     <p:sldId id="256" r:id="rId2"/>
@@ -23,15 +23,18 @@
     <p:sldId id="265" r:id="rId14"/>
     <p:sldId id="279" r:id="rId15"/>
     <p:sldId id="275" r:id="rId16"/>
-    <p:sldId id="266" r:id="rId17"/>
-    <p:sldId id="276" r:id="rId18"/>
-    <p:sldId id="269" r:id="rId19"/>
-    <p:sldId id="270" r:id="rId20"/>
-    <p:sldId id="267" r:id="rId21"/>
-    <p:sldId id="277" r:id="rId22"/>
-    <p:sldId id="268" r:id="rId23"/>
-    <p:sldId id="273" r:id="rId24"/>
-    <p:sldId id="278" r:id="rId25"/>
+    <p:sldId id="267" r:id="rId17"/>
+    <p:sldId id="280" r:id="rId18"/>
+    <p:sldId id="281" r:id="rId19"/>
+    <p:sldId id="276" r:id="rId20"/>
+    <p:sldId id="266" r:id="rId21"/>
+    <p:sldId id="269" r:id="rId22"/>
+    <p:sldId id="270" r:id="rId23"/>
+    <p:sldId id="282" r:id="rId24"/>
+    <p:sldId id="277" r:id="rId25"/>
+    <p:sldId id="268" r:id="rId26"/>
+    <p:sldId id="273" r:id="rId27"/>
+    <p:sldId id="278" r:id="rId28"/>
   </p:sldIdLst>
   <p:sldSz cx="12192000" cy="6858000"/>
   <p:notesSz cx="6858000" cy="9144000"/>
@@ -150,11 +153,14 @@
             <p14:sldId id="265"/>
             <p14:sldId id="279"/>
             <p14:sldId id="275"/>
+            <p14:sldId id="267"/>
+            <p14:sldId id="280"/>
+            <p14:sldId id="281"/>
+            <p14:sldId id="276"/>
             <p14:sldId id="266"/>
-            <p14:sldId id="276"/>
             <p14:sldId id="269"/>
             <p14:sldId id="270"/>
-            <p14:sldId id="267"/>
+            <p14:sldId id="282"/>
             <p14:sldId id="277"/>
             <p14:sldId id="268"/>
             <p14:sldId id="273"/>
@@ -162,6 +168,20 @@
           </p14:sldIdLst>
         </p14:section>
       </p14:sectionLst>
+    </p:ext>
+    <p:ext uri="{EFAFB233-063F-42B5-8137-9DF3F51BA10A}">
+      <p15:sldGuideLst xmlns:p15="http://schemas.microsoft.com/office/powerpoint/2012/main">
+        <p15:guide id="1" orient="horz" pos="2160">
+          <p15:clr>
+            <a:srgbClr val="A4A3A4"/>
+          </p15:clr>
+        </p15:guide>
+        <p15:guide id="2" pos="3840">
+          <p15:clr>
+            <a:srgbClr val="A4A3A4"/>
+          </p15:clr>
+        </p15:guide>
+      </p15:sldGuideLst>
     </p:ext>
   </p:extLst>
 </p:presentation>
@@ -282,7 +302,7 @@
           <a:p>
             <a:fld id="{19BF4C59-5F08-44C4-B153-33D13F8820E2}" type="datetimeFigureOut">
               <a:rPr lang="en-US" smtClean="0"/>
-              <a:t>11/26/2018</a:t>
+              <a:t>26/11/2018</a:t>
             </a:fld>
             <a:endParaRPr lang="en-US"/>
           </a:p>
@@ -737,7 +757,7 @@
           <a:p>
             <a:fld id="{F496603D-C74F-4091-A2D3-4695C477BDF9}" type="datetime1">
               <a:rPr lang="en-US" smtClean="0"/>
-              <a:t>11/26/2018</a:t>
+              <a:t>26/11/2018</a:t>
             </a:fld>
             <a:endParaRPr lang="en-US" dirty="0"/>
           </a:p>
@@ -1071,7 +1091,7 @@
           <a:p>
             <a:fld id="{59B7F04C-D88F-4E87-8405-047FE8998599}" type="datetime1">
               <a:rPr lang="en-US" smtClean="0"/>
-              <a:t>11/26/2018</a:t>
+              <a:t>26/11/2018</a:t>
             </a:fld>
             <a:endParaRPr lang="en-US" dirty="0"/>
           </a:p>
@@ -1468,7 +1488,7 @@
           <a:p>
             <a:fld id="{F53A2574-81AC-4C8C-9315-A798CBD15508}" type="datetime1">
               <a:rPr lang="en-US" smtClean="0"/>
-              <a:t>11/26/2018</a:t>
+              <a:t>26/11/2018</a:t>
             </a:fld>
             <a:endParaRPr lang="en-US" dirty="0"/>
           </a:p>
@@ -1800,7 +1820,7 @@
           <a:p>
             <a:fld id="{9F79353D-7D17-4E5D-B6AA-BEFF3E0E4AED}" type="datetime1">
               <a:rPr lang="en-US" smtClean="0"/>
-              <a:t>11/26/2018</a:t>
+              <a:t>26/11/2018</a:t>
             </a:fld>
             <a:endParaRPr lang="en-US" dirty="0"/>
           </a:p>
@@ -2116,7 +2136,7 @@
           <a:p>
             <a:fld id="{62E83889-C6FA-4794-A93A-78152215D16A}" type="datetime1">
               <a:rPr lang="en-US" smtClean="0"/>
-              <a:t>11/26/2018</a:t>
+              <a:t>26/11/2018</a:t>
             </a:fld>
             <a:endParaRPr lang="en-US" dirty="0"/>
           </a:p>
@@ -2508,7 +2528,7 @@
           <a:p>
             <a:fld id="{A0ED2F6D-E95C-4D36-9BBD-35E186A95236}" type="datetime1">
               <a:rPr lang="en-US" smtClean="0"/>
-              <a:t>11/26/2018</a:t>
+              <a:t>26/11/2018</a:t>
             </a:fld>
             <a:endParaRPr lang="en-US" dirty="0"/>
           </a:p>
@@ -2761,7 +2781,7 @@
           <a:p>
             <a:fld id="{3F053689-2F89-4CD8-BBCC-628181C06D6F}" type="datetime1">
               <a:rPr lang="en-US" smtClean="0"/>
-              <a:t>11/26/2018</a:t>
+              <a:t>26/11/2018</a:t>
             </a:fld>
             <a:endParaRPr lang="en-US" dirty="0"/>
           </a:p>
@@ -3019,7 +3039,7 @@
           <a:p>
             <a:fld id="{97B04EC7-3A70-4154-BE8C-716D5F7D393A}" type="datetime1">
               <a:rPr lang="en-US" smtClean="0"/>
-              <a:t>11/26/2018</a:t>
+              <a:t>26/11/2018</a:t>
             </a:fld>
             <a:endParaRPr lang="en-US" dirty="0"/>
           </a:p>
@@ -3277,7 +3297,7 @@
           <a:p>
             <a:fld id="{324BC052-11CD-4DCD-ACF1-8E2FFA6E860A}" type="datetime1">
               <a:rPr lang="en-US" smtClean="0"/>
-              <a:t>11/26/2018</a:t>
+              <a:t>26/11/2018</a:t>
             </a:fld>
             <a:endParaRPr lang="en-US" dirty="0"/>
           </a:p>
@@ -3602,7 +3622,7 @@
           <a:p>
             <a:fld id="{76C8D67C-A063-467C-BC65-C57E079F80F5}" type="datetime1">
               <a:rPr lang="en-US" smtClean="0"/>
-              <a:t>11/26/2018</a:t>
+              <a:t>26/11/2018</a:t>
             </a:fld>
             <a:endParaRPr lang="en-US" dirty="0"/>
           </a:p>
@@ -3921,7 +3941,7 @@
           <a:p>
             <a:fld id="{B9D1D154-EC59-400A-90AD-D66E129D1C81}" type="datetime1">
               <a:rPr lang="en-US" smtClean="0"/>
-              <a:t>11/26/2018</a:t>
+              <a:t>26/11/2018</a:t>
             </a:fld>
             <a:endParaRPr lang="en-US" dirty="0"/>
           </a:p>
@@ -4374,7 +4394,7 @@
           <a:p>
             <a:fld id="{1289DCF8-DDB3-4ED6-91C7-A41042BCCEC0}" type="datetime1">
               <a:rPr lang="en-US" smtClean="0"/>
-              <a:t>11/26/2018</a:t>
+              <a:t>26/11/2018</a:t>
             </a:fld>
             <a:endParaRPr lang="en-US" dirty="0"/>
           </a:p>
@@ -4575,7 +4595,7 @@
           <a:p>
             <a:fld id="{B7D66469-CA9A-4262-8925-C1B460FFD1FE}" type="datetime1">
               <a:rPr lang="en-US" smtClean="0"/>
-              <a:t>11/26/2018</a:t>
+              <a:t>26/11/2018</a:t>
             </a:fld>
             <a:endParaRPr lang="en-US" dirty="0"/>
           </a:p>
@@ -4748,7 +4768,7 @@
           <a:p>
             <a:fld id="{8FFB0B98-420B-4669-A38B-6EA24DD00E40}" type="datetime1">
               <a:rPr lang="en-US" smtClean="0"/>
-              <a:t>11/26/2018</a:t>
+              <a:t>26/11/2018</a:t>
             </a:fld>
             <a:endParaRPr lang="en-US" dirty="0"/>
           </a:p>
@@ -5077,7 +5097,7 @@
           <a:p>
             <a:fld id="{57A84040-A505-4603-8AF8-947AF9A8C6B0}" type="datetime1">
               <a:rPr lang="en-US" smtClean="0"/>
-              <a:t>11/26/2018</a:t>
+              <a:t>26/11/2018</a:t>
             </a:fld>
             <a:endParaRPr lang="en-US" dirty="0"/>
           </a:p>
@@ -5418,7 +5438,7 @@
           <a:p>
             <a:fld id="{C257B495-959E-4C32-9725-73949DB74722}" type="datetime1">
               <a:rPr lang="en-US" smtClean="0"/>
-              <a:t>11/26/2018</a:t>
+              <a:t>26/11/2018</a:t>
             </a:fld>
             <a:endParaRPr lang="en-US" dirty="0"/>
           </a:p>
@@ -7531,7 +7551,7 @@
           <a:p>
             <a:fld id="{FC130E8E-EE4B-4D52-BAF0-F4AA6E538D19}" type="datetime1">
               <a:rPr lang="en-US" smtClean="0"/>
-              <a:t>11/26/2018</a:t>
+              <a:t>26/11/2018</a:t>
             </a:fld>
             <a:endParaRPr lang="en-US" dirty="0"/>
           </a:p>
@@ -8051,7 +8071,7 @@
           <p:cNvPr id="2" name="Title 1">
             <a:extLst>
               <a:ext uri="{FF2B5EF4-FFF2-40B4-BE49-F238E27FC236}">
-                <a16:creationId xmlns:a16="http://schemas.microsoft.com/office/drawing/2014/main" xmlns="" id="{13E98B89-0AC8-4AF8-8E51-2CB8CB9E04D8}"/>
+                <a16:creationId xmlns:a16="http://schemas.microsoft.com/office/drawing/2014/main" id="{13E98B89-0AC8-4AF8-8E51-2CB8CB9E04D8}"/>
               </a:ext>
             </a:extLst>
           </p:cNvPr>
@@ -8079,7 +8099,7 @@
           <p:cNvPr id="3" name="Subtitle 2">
             <a:extLst>
               <a:ext uri="{FF2B5EF4-FFF2-40B4-BE49-F238E27FC236}">
-                <a16:creationId xmlns:a16="http://schemas.microsoft.com/office/drawing/2014/main" xmlns="" id="{9FD722E2-C498-4E60-B7CA-E3B851CB0315}"/>
+                <a16:creationId xmlns:a16="http://schemas.microsoft.com/office/drawing/2014/main" id="{9FD722E2-C498-4E60-B7CA-E3B851CB0315}"/>
               </a:ext>
             </a:extLst>
           </p:cNvPr>
@@ -8104,7 +8124,7 @@
           <p:cNvPr id="4" name="Slide Number Placeholder 3">
             <a:extLst>
               <a:ext uri="{FF2B5EF4-FFF2-40B4-BE49-F238E27FC236}">
-                <a16:creationId xmlns:a16="http://schemas.microsoft.com/office/drawing/2014/main" xmlns="" id="{B56306B9-7F0A-418D-8206-B5F8585FB3ED}"/>
+                <a16:creationId xmlns:a16="http://schemas.microsoft.com/office/drawing/2014/main" id="{B56306B9-7F0A-418D-8206-B5F8585FB3ED}"/>
               </a:ext>
             </a:extLst>
           </p:cNvPr>
@@ -8164,7 +8184,7 @@
           <p:cNvPr id="2" name="Title 1">
             <a:extLst>
               <a:ext uri="{FF2B5EF4-FFF2-40B4-BE49-F238E27FC236}">
-                <a16:creationId xmlns:a16="http://schemas.microsoft.com/office/drawing/2014/main" xmlns="" id="{499DD049-749B-4076-B464-014F8ADDE19C}"/>
+                <a16:creationId xmlns:a16="http://schemas.microsoft.com/office/drawing/2014/main" id="{499DD049-749B-4076-B464-014F8ADDE19C}"/>
               </a:ext>
             </a:extLst>
           </p:cNvPr>
@@ -8181,10 +8201,9 @@
           <a:lstStyle/>
           <a:p>
             <a:r>
-              <a:rPr lang="en-US" dirty="0" smtClean="0"/>
+              <a:rPr lang="en-US" dirty="0"/>
               <a:t>Problems in the beginning</a:t>
             </a:r>
-            <a:endParaRPr lang="en-US" dirty="0"/>
           </a:p>
         </p:txBody>
       </p:sp>
@@ -8193,7 +8212,7 @@
           <p:cNvPr id="3" name="Content Placeholder 2">
             <a:extLst>
               <a:ext uri="{FF2B5EF4-FFF2-40B4-BE49-F238E27FC236}">
-                <a16:creationId xmlns:a16="http://schemas.microsoft.com/office/drawing/2014/main" xmlns="" id="{01E73AF8-E079-4E3C-B6BD-0E836196367F}"/>
+                <a16:creationId xmlns:a16="http://schemas.microsoft.com/office/drawing/2014/main" id="{01E73AF8-E079-4E3C-B6BD-0E836196367F}"/>
               </a:ext>
             </a:extLst>
           </p:cNvPr>
@@ -8210,32 +8229,27 @@
           <a:lstStyle/>
           <a:p>
             <a:r>
-              <a:rPr lang="en-US" dirty="0" smtClean="0"/>
+              <a:rPr lang="en-US" dirty="0"/>
               <a:t>Started building without enough design work</a:t>
             </a:r>
           </a:p>
           <a:p>
             <a:r>
-              <a:rPr lang="en-US" dirty="0" smtClean="0"/>
+              <a:rPr lang="en-US" dirty="0"/>
               <a:t>Led to wasted time </a:t>
             </a:r>
           </a:p>
           <a:p>
             <a:r>
-              <a:rPr lang="en-US" dirty="0" smtClean="0"/>
-              <a:t>Refocus </a:t>
-            </a:r>
-            <a:r>
-              <a:rPr lang="en-US" dirty="0"/>
-              <a:t>at 1.5-2 weeks into sprint</a:t>
-            </a:r>
-          </a:p>
-          <a:p>
-            <a:r>
-              <a:rPr lang="en-US" dirty="0" smtClean="0"/>
+              <a:rPr lang="en-US" dirty="0"/>
+              <a:t>Refocus at 1.5-2 weeks into sprint</a:t>
+            </a:r>
+          </a:p>
+          <a:p>
+            <a:r>
+              <a:rPr lang="en-US" dirty="0"/>
               <a:t>Shifted focus to focus on core functionality must-haves</a:t>
             </a:r>
-            <a:endParaRPr lang="en-US" dirty="0"/>
           </a:p>
         </p:txBody>
       </p:sp>
@@ -8244,7 +8258,7 @@
           <p:cNvPr id="4" name="Slide Number Placeholder 3">
             <a:extLst>
               <a:ext uri="{FF2B5EF4-FFF2-40B4-BE49-F238E27FC236}">
-                <a16:creationId xmlns:a16="http://schemas.microsoft.com/office/drawing/2014/main" xmlns="" id="{F641D3F2-75C5-40F6-80C4-E394B00EBE2F}"/>
+                <a16:creationId xmlns:a16="http://schemas.microsoft.com/office/drawing/2014/main" id="{F641D3F2-75C5-40F6-80C4-E394B00EBE2F}"/>
               </a:ext>
             </a:extLst>
           </p:cNvPr>
@@ -8304,7 +8318,7 @@
           <p:cNvPr id="2" name="Title 1">
             <a:extLst>
               <a:ext uri="{FF2B5EF4-FFF2-40B4-BE49-F238E27FC236}">
-                <a16:creationId xmlns:a16="http://schemas.microsoft.com/office/drawing/2014/main" xmlns="" id="{E7B8949F-0B31-4A8B-88CD-BCF7FDCCDC8C}"/>
+                <a16:creationId xmlns:a16="http://schemas.microsoft.com/office/drawing/2014/main" id="{E7B8949F-0B31-4A8B-88CD-BCF7FDCCDC8C}"/>
               </a:ext>
             </a:extLst>
           </p:cNvPr>
@@ -8332,7 +8346,7 @@
           <p:cNvPr id="3" name="Content Placeholder 2">
             <a:extLst>
               <a:ext uri="{FF2B5EF4-FFF2-40B4-BE49-F238E27FC236}">
-                <a16:creationId xmlns:a16="http://schemas.microsoft.com/office/drawing/2014/main" xmlns="" id="{5018D8C8-31EA-4094-A891-253AAD5D26D8}"/>
+                <a16:creationId xmlns:a16="http://schemas.microsoft.com/office/drawing/2014/main" id="{5018D8C8-31EA-4094-A891-253AAD5D26D8}"/>
               </a:ext>
             </a:extLst>
           </p:cNvPr>
@@ -8357,7 +8371,7 @@
           <p:cNvPr id="4" name="Slide Number Placeholder 3">
             <a:extLst>
               <a:ext uri="{FF2B5EF4-FFF2-40B4-BE49-F238E27FC236}">
-                <a16:creationId xmlns:a16="http://schemas.microsoft.com/office/drawing/2014/main" xmlns="" id="{7DEE7B36-887B-4747-AD42-46A4BE37CE1D}"/>
+                <a16:creationId xmlns:a16="http://schemas.microsoft.com/office/drawing/2014/main" id="{7DEE7B36-887B-4747-AD42-46A4BE37CE1D}"/>
               </a:ext>
             </a:extLst>
           </p:cNvPr>
@@ -8417,7 +8431,7 @@
           <p:cNvPr id="2" name="Title 1">
             <a:extLst>
               <a:ext uri="{FF2B5EF4-FFF2-40B4-BE49-F238E27FC236}">
-                <a16:creationId xmlns:a16="http://schemas.microsoft.com/office/drawing/2014/main" xmlns="" id="{CF6EE8FB-D3EC-4DF0-BE35-2EAA1E9F1208}"/>
+                <a16:creationId xmlns:a16="http://schemas.microsoft.com/office/drawing/2014/main" id="{CF6EE8FB-D3EC-4DF0-BE35-2EAA1E9F1208}"/>
               </a:ext>
             </a:extLst>
           </p:cNvPr>
@@ -8445,7 +8459,7 @@
           <p:cNvPr id="3" name="Content Placeholder 2">
             <a:extLst>
               <a:ext uri="{FF2B5EF4-FFF2-40B4-BE49-F238E27FC236}">
-                <a16:creationId xmlns:a16="http://schemas.microsoft.com/office/drawing/2014/main" xmlns="" id="{65B46963-A67E-46F8-8ACF-E50284148EC5}"/>
+                <a16:creationId xmlns:a16="http://schemas.microsoft.com/office/drawing/2014/main" id="{65B46963-A67E-46F8-8ACF-E50284148EC5}"/>
               </a:ext>
             </a:extLst>
           </p:cNvPr>
@@ -8470,7 +8484,7 @@
           <p:cNvPr id="4" name="Slide Number Placeholder 3">
             <a:extLst>
               <a:ext uri="{FF2B5EF4-FFF2-40B4-BE49-F238E27FC236}">
-                <a16:creationId xmlns:a16="http://schemas.microsoft.com/office/drawing/2014/main" xmlns="" id="{4FAAFCB4-B201-4C0B-A29A-0D298A2342C1}"/>
+                <a16:creationId xmlns:a16="http://schemas.microsoft.com/office/drawing/2014/main" id="{4FAAFCB4-B201-4C0B-A29A-0D298A2342C1}"/>
               </a:ext>
             </a:extLst>
           </p:cNvPr>
@@ -8530,7 +8544,7 @@
           <p:cNvPr id="2" name="Title 1">
             <a:extLst>
               <a:ext uri="{FF2B5EF4-FFF2-40B4-BE49-F238E27FC236}">
-                <a16:creationId xmlns:a16="http://schemas.microsoft.com/office/drawing/2014/main" xmlns="" id="{E2708479-A9AB-4BF8-A44B-937AE89AEBFF}"/>
+                <a16:creationId xmlns:a16="http://schemas.microsoft.com/office/drawing/2014/main" id="{E2708479-A9AB-4BF8-A44B-937AE89AEBFF}"/>
               </a:ext>
             </a:extLst>
           </p:cNvPr>
@@ -8558,7 +8572,7 @@
           <p:cNvPr id="3" name="Content Placeholder 2">
             <a:extLst>
               <a:ext uri="{FF2B5EF4-FFF2-40B4-BE49-F238E27FC236}">
-                <a16:creationId xmlns:a16="http://schemas.microsoft.com/office/drawing/2014/main" xmlns="" id="{9B55791B-E2AF-4809-A81A-750947D90409}"/>
+                <a16:creationId xmlns:a16="http://schemas.microsoft.com/office/drawing/2014/main" id="{9B55791B-E2AF-4809-A81A-750947D90409}"/>
               </a:ext>
             </a:extLst>
           </p:cNvPr>
@@ -8575,48 +8589,32 @@
           <a:lstStyle/>
           <a:p>
             <a:r>
-              <a:rPr lang="en-US" dirty="0" smtClean="0"/>
+              <a:rPr lang="en-US" dirty="0"/>
               <a:t>Designed a UML style layout of our app navigation</a:t>
             </a:r>
           </a:p>
           <a:p>
             <a:r>
-              <a:rPr lang="en-US" dirty="0" smtClean="0"/>
+              <a:rPr lang="en-US" dirty="0"/>
               <a:t>Emphasis on need vs want</a:t>
             </a:r>
           </a:p>
           <a:p>
             <a:r>
-              <a:rPr lang="en-US" dirty="0" smtClean="0"/>
+              <a:rPr lang="en-US" dirty="0"/>
               <a:t>Grab bag of features</a:t>
             </a:r>
           </a:p>
           <a:p>
             <a:r>
-              <a:rPr lang="en-US" dirty="0" smtClean="0"/>
+              <a:rPr lang="en-US" dirty="0"/>
               <a:t>Accommodating user stories</a:t>
             </a:r>
           </a:p>
           <a:p>
             <a:r>
-              <a:rPr lang="en-US" dirty="0" smtClean="0"/>
-              <a:t>Removed </a:t>
-            </a:r>
-            <a:r>
-              <a:rPr lang="en-US" dirty="0" smtClean="0"/>
-              <a:t>areas that </a:t>
-            </a:r>
-            <a:r>
-              <a:rPr lang="en-US" dirty="0" smtClean="0"/>
-              <a:t>weren</a:t>
-            </a:r>
-            <a:r>
-              <a:rPr lang="en-US" dirty="0" smtClean="0"/>
-              <a:t>’t </a:t>
-            </a:r>
-            <a:r>
-              <a:rPr lang="en-US" dirty="0" smtClean="0"/>
-              <a:t>justified by a user story</a:t>
+              <a:rPr lang="en-US" dirty="0"/>
+              <a:t>Removed areas that weren’t justified by a user story</a:t>
             </a:r>
           </a:p>
           <a:p>
@@ -8629,7 +8627,7 @@
           <p:cNvPr id="4" name="Slide Number Placeholder 3">
             <a:extLst>
               <a:ext uri="{FF2B5EF4-FFF2-40B4-BE49-F238E27FC236}">
-                <a16:creationId xmlns:a16="http://schemas.microsoft.com/office/drawing/2014/main" xmlns="" id="{25F31333-FA60-4DDE-860A-723484BDC712}"/>
+                <a16:creationId xmlns:a16="http://schemas.microsoft.com/office/drawing/2014/main" id="{25F31333-FA60-4DDE-860A-723484BDC712}"/>
               </a:ext>
             </a:extLst>
           </p:cNvPr>
@@ -8797,7 +8795,7 @@
           <p:cNvPr id="2" name="Title 1">
             <a:extLst>
               <a:ext uri="{FF2B5EF4-FFF2-40B4-BE49-F238E27FC236}">
-                <a16:creationId xmlns:a16="http://schemas.microsoft.com/office/drawing/2014/main" xmlns="" id="{D96EBD93-1E0F-4715-BA1C-4AB9A43FEEDE}"/>
+                <a16:creationId xmlns:a16="http://schemas.microsoft.com/office/drawing/2014/main" id="{D96EBD93-1E0F-4715-BA1C-4AB9A43FEEDE}"/>
               </a:ext>
             </a:extLst>
           </p:cNvPr>
@@ -8825,7 +8823,7 @@
           <p:cNvPr id="3" name="Content Placeholder 2">
             <a:extLst>
               <a:ext uri="{FF2B5EF4-FFF2-40B4-BE49-F238E27FC236}">
-                <a16:creationId xmlns:a16="http://schemas.microsoft.com/office/drawing/2014/main" xmlns="" id="{1DAF5560-583E-4CB6-A740-F6B3808FA9A7}"/>
+                <a16:creationId xmlns:a16="http://schemas.microsoft.com/office/drawing/2014/main" id="{1DAF5560-583E-4CB6-A740-F6B3808FA9A7}"/>
               </a:ext>
             </a:extLst>
           </p:cNvPr>
@@ -8850,7 +8848,7 @@
           <p:cNvPr id="4" name="Slide Number Placeholder 3">
             <a:extLst>
               <a:ext uri="{FF2B5EF4-FFF2-40B4-BE49-F238E27FC236}">
-                <a16:creationId xmlns:a16="http://schemas.microsoft.com/office/drawing/2014/main" xmlns="" id="{F2E49AE3-63D3-4DD3-818F-6E7B5C470582}"/>
+                <a16:creationId xmlns:a16="http://schemas.microsoft.com/office/drawing/2014/main" id="{F2E49AE3-63D3-4DD3-818F-6E7B5C470582}"/>
               </a:ext>
             </a:extLst>
           </p:cNvPr>
@@ -8910,7 +8908,7 @@
           <p:cNvPr id="2" name="Title 1">
             <a:extLst>
               <a:ext uri="{FF2B5EF4-FFF2-40B4-BE49-F238E27FC236}">
-                <a16:creationId xmlns:a16="http://schemas.microsoft.com/office/drawing/2014/main" xmlns="" id="{83DFF23D-959A-44BC-BE78-1D0330CDF164}"/>
+                <a16:creationId xmlns:a16="http://schemas.microsoft.com/office/drawing/2014/main" id="{F2AB9014-8A31-4680-8991-595A8A0A7749}"/>
               </a:ext>
             </a:extLst>
           </p:cNvPr>
@@ -8928,7 +8926,7 @@
           <a:p>
             <a:r>
               <a:rPr lang="en-US" dirty="0"/>
-              <a:t>Algorithm</a:t>
+              <a:t>Possible Cloud Hosts for Databases</a:t>
             </a:r>
           </a:p>
         </p:txBody>
@@ -8938,7 +8936,7 @@
           <p:cNvPr id="3" name="Content Placeholder 2">
             <a:extLst>
               <a:ext uri="{FF2B5EF4-FFF2-40B4-BE49-F238E27FC236}">
-                <a16:creationId xmlns:a16="http://schemas.microsoft.com/office/drawing/2014/main" xmlns="" id="{706A48C4-F2C9-48C7-B302-4ADE777DDB2E}"/>
+                <a16:creationId xmlns:a16="http://schemas.microsoft.com/office/drawing/2014/main" id="{943385D6-20E6-41CB-94E2-C41E10317A02}"/>
               </a:ext>
             </a:extLst>
           </p:cNvPr>
@@ -8949,12 +8947,105 @@
             <p:ph idx="1"/>
           </p:nvPr>
         </p:nvSpPr>
-        <p:spPr/>
-        <p:txBody>
-          <a:bodyPr/>
-          <a:lstStyle/>
-          <a:p>
-            <a:endParaRPr lang="en-US"/>
+        <p:spPr>
+          <a:xfrm>
+            <a:off x="2589212" y="1394012"/>
+            <a:ext cx="8915400" cy="4554069"/>
+          </a:xfrm>
+        </p:spPr>
+        <p:txBody>
+          <a:bodyPr>
+            <a:normAutofit/>
+          </a:bodyPr>
+          <a:lstStyle/>
+          <a:p>
+            <a:r>
+              <a:rPr lang="en-US" dirty="0"/>
+              <a:t>Amazon Web Services</a:t>
+            </a:r>
+          </a:p>
+          <a:p>
+            <a:pPr lvl="1"/>
+            <a:r>
+              <a:rPr lang="en-US" dirty="0"/>
+              <a:t>Pros</a:t>
+            </a:r>
+            <a:endParaRPr lang="en-US" sz="1400" dirty="0"/>
+          </a:p>
+          <a:p>
+            <a:pPr lvl="2"/>
+            <a:r>
+              <a:rPr lang="en-US" dirty="0"/>
+              <a:t>Free trial</a:t>
+            </a:r>
+            <a:endParaRPr lang="en-US" sz="1200" dirty="0"/>
+          </a:p>
+          <a:p>
+            <a:pPr lvl="2"/>
+            <a:r>
+              <a:rPr lang="en-US" dirty="0"/>
+              <a:t>Supports multiple database types</a:t>
+            </a:r>
+            <a:endParaRPr lang="en-US" sz="1200" dirty="0"/>
+          </a:p>
+          <a:p>
+            <a:pPr lvl="1"/>
+            <a:r>
+              <a:rPr lang="en-US" dirty="0"/>
+              <a:t>Cons</a:t>
+            </a:r>
+            <a:endParaRPr lang="en-US" sz="1400" dirty="0"/>
+          </a:p>
+          <a:p>
+            <a:pPr lvl="2"/>
+            <a:r>
+              <a:rPr lang="en-US" dirty="0"/>
+              <a:t>Difficult to learn</a:t>
+            </a:r>
+          </a:p>
+          <a:p>
+            <a:r>
+              <a:rPr lang="en-US" dirty="0"/>
+              <a:t>Microsoft Azure</a:t>
+            </a:r>
+          </a:p>
+          <a:p>
+            <a:pPr lvl="1"/>
+            <a:r>
+              <a:rPr lang="en-US" dirty="0"/>
+              <a:t>Pros</a:t>
+            </a:r>
+            <a:endParaRPr lang="en-US" sz="1400" dirty="0"/>
+          </a:p>
+          <a:p>
+            <a:pPr lvl="2"/>
+            <a:r>
+              <a:rPr lang="en-US" dirty="0"/>
+              <a:t>Free trial</a:t>
+            </a:r>
+            <a:endParaRPr lang="en-US" sz="1200" dirty="0"/>
+          </a:p>
+          <a:p>
+            <a:pPr lvl="1"/>
+            <a:r>
+              <a:rPr lang="en-US" dirty="0"/>
+              <a:t>Cons</a:t>
+            </a:r>
+            <a:endParaRPr lang="en-US" sz="1400" dirty="0"/>
+          </a:p>
+          <a:p>
+            <a:pPr lvl="2"/>
+            <a:r>
+              <a:rPr lang="en-US" dirty="0"/>
+              <a:t>Support issues</a:t>
+            </a:r>
+            <a:endParaRPr lang="en-US" sz="1200" dirty="0"/>
+          </a:p>
+          <a:p>
+            <a:pPr marL="0" indent="0">
+              <a:buNone/>
+            </a:pPr>
+            <a:endParaRPr lang="en-US" dirty="0"/>
           </a:p>
         </p:txBody>
       </p:sp>
@@ -8963,7 +9054,7 @@
           <p:cNvPr id="4" name="Slide Number Placeholder 3">
             <a:extLst>
               <a:ext uri="{FF2B5EF4-FFF2-40B4-BE49-F238E27FC236}">
-                <a16:creationId xmlns:a16="http://schemas.microsoft.com/office/drawing/2014/main" xmlns="" id="{8BA44F56-3ECD-42B0-A9A9-E5F99872401B}"/>
+                <a16:creationId xmlns:a16="http://schemas.microsoft.com/office/drawing/2014/main" id="{D85744C6-A06A-4F75-9D77-276BE5D6962F}"/>
               </a:ext>
             </a:extLst>
           </p:cNvPr>
@@ -8991,7 +9082,7 @@
     </p:spTree>
     <p:extLst>
       <p:ext uri="{BB962C8B-B14F-4D97-AF65-F5344CB8AC3E}">
-        <p14:creationId xmlns:p14="http://schemas.microsoft.com/office/powerpoint/2010/main" val="230190470"/>
+        <p14:creationId xmlns:p14="http://schemas.microsoft.com/office/powerpoint/2010/main" val="735481043"/>
       </p:ext>
     </p:extLst>
   </p:cSld>
@@ -9023,7 +9114,7 @@
           <p:cNvPr id="2" name="Title 1">
             <a:extLst>
               <a:ext uri="{FF2B5EF4-FFF2-40B4-BE49-F238E27FC236}">
-                <a16:creationId xmlns:a16="http://schemas.microsoft.com/office/drawing/2014/main" xmlns="" id="{4E96F21E-1AFE-4A04-8BD0-C88D1D2DA52C}"/>
+                <a16:creationId xmlns:a16="http://schemas.microsoft.com/office/drawing/2014/main" id="{F2AB9014-8A31-4680-8991-595A8A0A7749}"/>
               </a:ext>
             </a:extLst>
           </p:cNvPr>
@@ -9034,14 +9125,19 @@
             <p:ph type="title"/>
           </p:nvPr>
         </p:nvSpPr>
-        <p:spPr/>
-        <p:txBody>
-          <a:bodyPr/>
-          <a:lstStyle/>
-          <a:p>
-            <a:r>
-              <a:rPr lang="en-US" dirty="0"/>
-              <a:t>Questions?</a:t>
+        <p:spPr>
+          <a:xfrm>
+            <a:off x="2592925" y="624110"/>
+            <a:ext cx="9236004" cy="1280890"/>
+          </a:xfrm>
+        </p:spPr>
+        <p:txBody>
+          <a:bodyPr/>
+          <a:lstStyle/>
+          <a:p>
+            <a:r>
+              <a:rPr lang="en-US" dirty="0"/>
+              <a:t>Possible Cloud Hosts for Databases cont.</a:t>
             </a:r>
           </a:p>
         </p:txBody>
@@ -9051,7 +9147,7 @@
           <p:cNvPr id="3" name="Content Placeholder 2">
             <a:extLst>
               <a:ext uri="{FF2B5EF4-FFF2-40B4-BE49-F238E27FC236}">
-                <a16:creationId xmlns:a16="http://schemas.microsoft.com/office/drawing/2014/main" xmlns="" id="{C6D9C712-7144-4100-BCDB-F2CFAF7A1F31}"/>
+                <a16:creationId xmlns:a16="http://schemas.microsoft.com/office/drawing/2014/main" id="{943385D6-20E6-41CB-94E2-C41E10317A02}"/>
               </a:ext>
             </a:extLst>
           </p:cNvPr>
@@ -9062,12 +9158,136 @@
             <p:ph idx="1"/>
           </p:nvPr>
         </p:nvSpPr>
-        <p:spPr/>
-        <p:txBody>
-          <a:bodyPr/>
-          <a:lstStyle/>
-          <a:p>
-            <a:endParaRPr lang="en-US"/>
+        <p:spPr>
+          <a:xfrm>
+            <a:off x="2589212" y="1394012"/>
+            <a:ext cx="8915400" cy="5396753"/>
+          </a:xfrm>
+        </p:spPr>
+        <p:txBody>
+          <a:bodyPr>
+            <a:normAutofit fontScale="92500" lnSpcReduction="10000"/>
+          </a:bodyPr>
+          <a:lstStyle/>
+          <a:p>
+            <a:r>
+              <a:rPr lang="en-US" dirty="0"/>
+              <a:t>Rackspace Cloud</a:t>
+            </a:r>
+          </a:p>
+          <a:p>
+            <a:pPr lvl="1"/>
+            <a:r>
+              <a:rPr lang="en-US" dirty="0"/>
+              <a:t>Pros</a:t>
+            </a:r>
+            <a:endParaRPr lang="en-US" sz="1400" dirty="0"/>
+          </a:p>
+          <a:p>
+            <a:pPr lvl="2"/>
+            <a:r>
+              <a:rPr lang="en-US" dirty="0"/>
+              <a:t>Supports multiple database types</a:t>
+            </a:r>
+            <a:endParaRPr lang="en-US" sz="1200" dirty="0"/>
+          </a:p>
+          <a:p>
+            <a:pPr lvl="1"/>
+            <a:r>
+              <a:rPr lang="en-US" dirty="0"/>
+              <a:t>Cons</a:t>
+            </a:r>
+            <a:endParaRPr lang="en-US" sz="1400" dirty="0"/>
+          </a:p>
+          <a:p>
+            <a:pPr lvl="2"/>
+            <a:r>
+              <a:rPr lang="en-US" dirty="0"/>
+              <a:t>Low documentation</a:t>
+            </a:r>
+          </a:p>
+          <a:p>
+            <a:r>
+              <a:rPr lang="en-US" dirty="0"/>
+              <a:t>Oracle Database Cloud</a:t>
+            </a:r>
+          </a:p>
+          <a:p>
+            <a:pPr lvl="1"/>
+            <a:r>
+              <a:rPr lang="en-US" dirty="0"/>
+              <a:t>Pros</a:t>
+            </a:r>
+            <a:endParaRPr lang="en-US" sz="1400" dirty="0"/>
+          </a:p>
+          <a:p>
+            <a:pPr lvl="2"/>
+            <a:r>
+              <a:rPr lang="en-US" dirty="0"/>
+              <a:t>Easy maintenance</a:t>
+            </a:r>
+            <a:endParaRPr lang="en-US" sz="1200" dirty="0"/>
+          </a:p>
+          <a:p>
+            <a:pPr lvl="2"/>
+            <a:r>
+              <a:rPr lang="en-US" dirty="0"/>
+              <a:t>Secure encryption</a:t>
+            </a:r>
+            <a:endParaRPr lang="en-US" sz="1200" dirty="0"/>
+          </a:p>
+          <a:p>
+            <a:pPr lvl="1"/>
+            <a:r>
+              <a:rPr lang="en-US" dirty="0"/>
+              <a:t>Cons</a:t>
+            </a:r>
+            <a:endParaRPr lang="en-US" sz="1400" dirty="0"/>
+          </a:p>
+          <a:p>
+            <a:pPr lvl="2"/>
+            <a:r>
+              <a:rPr lang="en-US" dirty="0"/>
+              <a:t>Support issues</a:t>
+            </a:r>
+          </a:p>
+          <a:p>
+            <a:r>
+              <a:rPr lang="en-US" dirty="0"/>
+              <a:t>SAP Cloud Platform</a:t>
+            </a:r>
+          </a:p>
+          <a:p>
+            <a:pPr lvl="1"/>
+            <a:r>
+              <a:rPr lang="en-US" dirty="0"/>
+              <a:t>Pros</a:t>
+            </a:r>
+            <a:endParaRPr lang="en-US" sz="1400" dirty="0"/>
+          </a:p>
+          <a:p>
+            <a:pPr lvl="2"/>
+            <a:r>
+              <a:rPr lang="en-US" dirty="0"/>
+              <a:t>Free trial</a:t>
+            </a:r>
+            <a:endParaRPr lang="en-US" sz="1200" dirty="0"/>
+          </a:p>
+          <a:p>
+            <a:pPr lvl="1"/>
+            <a:r>
+              <a:rPr lang="en-US" dirty="0"/>
+              <a:t>Cons</a:t>
+            </a:r>
+            <a:endParaRPr lang="en-US" sz="1400" dirty="0"/>
+          </a:p>
+          <a:p>
+            <a:pPr lvl="2"/>
+            <a:r>
+              <a:rPr lang="en-US" dirty="0"/>
+              <a:t>Expensive</a:t>
+            </a:r>
+            <a:endParaRPr lang="en-US" sz="1200" dirty="0"/>
           </a:p>
         </p:txBody>
       </p:sp>
@@ -9076,7 +9296,7 @@
           <p:cNvPr id="4" name="Slide Number Placeholder 3">
             <a:extLst>
               <a:ext uri="{FF2B5EF4-FFF2-40B4-BE49-F238E27FC236}">
-                <a16:creationId xmlns:a16="http://schemas.microsoft.com/office/drawing/2014/main" xmlns="" id="{ABDB7F91-3EE4-476A-9661-1648C797CBD1}"/>
+                <a16:creationId xmlns:a16="http://schemas.microsoft.com/office/drawing/2014/main" id="{D85744C6-A06A-4F75-9D77-276BE5D6962F}"/>
               </a:ext>
             </a:extLst>
           </p:cNvPr>
@@ -9104,7 +9324,7 @@
     </p:spTree>
     <p:extLst>
       <p:ext uri="{BB962C8B-B14F-4D97-AF65-F5344CB8AC3E}">
-        <p14:creationId xmlns:p14="http://schemas.microsoft.com/office/powerpoint/2010/main" val="1700607014"/>
+        <p14:creationId xmlns:p14="http://schemas.microsoft.com/office/powerpoint/2010/main" val="2279213441"/>
       </p:ext>
     </p:extLst>
   </p:cSld>
@@ -9136,7 +9356,7 @@
           <p:cNvPr id="2" name="Title 1">
             <a:extLst>
               <a:ext uri="{FF2B5EF4-FFF2-40B4-BE49-F238E27FC236}">
-                <a16:creationId xmlns:a16="http://schemas.microsoft.com/office/drawing/2014/main" xmlns="" id="{1183D399-4942-4C83-BF24-B436160EB419}"/>
+                <a16:creationId xmlns:a16="http://schemas.microsoft.com/office/drawing/2014/main" id="{FB48C855-54F0-48EC-A7CC-6354BCB305D5}"/>
               </a:ext>
             </a:extLst>
           </p:cNvPr>
@@ -9154,7 +9374,7 @@
           <a:p>
             <a:r>
               <a:rPr lang="en-US" dirty="0"/>
-              <a:t>Sensors</a:t>
+              <a:t>Chosen Database</a:t>
             </a:r>
           </a:p>
         </p:txBody>
@@ -9164,7 +9384,7 @@
           <p:cNvPr id="3" name="Content Placeholder 2">
             <a:extLst>
               <a:ext uri="{FF2B5EF4-FFF2-40B4-BE49-F238E27FC236}">
-                <a16:creationId xmlns:a16="http://schemas.microsoft.com/office/drawing/2014/main" xmlns="" id="{0DD74EA9-167B-4010-AF9E-BA2A7445C522}"/>
+                <a16:creationId xmlns:a16="http://schemas.microsoft.com/office/drawing/2014/main" id="{182AB522-2226-4EFD-823D-D450755C3706}"/>
               </a:ext>
             </a:extLst>
           </p:cNvPr>
@@ -9180,7 +9400,37 @@
           <a:bodyPr/>
           <a:lstStyle/>
           <a:p>
-            <a:endParaRPr lang="en-US"/>
+            <a:r>
+              <a:rPr lang="en-US" dirty="0"/>
+              <a:t>Azure SQL Database</a:t>
+            </a:r>
+          </a:p>
+          <a:p>
+            <a:endParaRPr lang="en-US" dirty="0"/>
+          </a:p>
+          <a:p>
+            <a:r>
+              <a:rPr lang="en-US" dirty="0"/>
+              <a:t>Free trial gives 250GB of storage on cloud</a:t>
+            </a:r>
+          </a:p>
+          <a:p>
+            <a:r>
+              <a:rPr lang="en-US" dirty="0"/>
+              <a:t>Shares same codebase with SQL Server</a:t>
+            </a:r>
+          </a:p>
+          <a:p>
+            <a:endParaRPr lang="en-US" dirty="0"/>
+          </a:p>
+          <a:p>
+            <a:endParaRPr lang="en-US" dirty="0"/>
+          </a:p>
+          <a:p>
+            <a:r>
+              <a:rPr lang="en-US" dirty="0"/>
+              <a:t>Prefer cloud as users could literally be anywhere</a:t>
+            </a:r>
           </a:p>
         </p:txBody>
       </p:sp>
@@ -9189,7 +9439,7 @@
           <p:cNvPr id="4" name="Slide Number Placeholder 3">
             <a:extLst>
               <a:ext uri="{FF2B5EF4-FFF2-40B4-BE49-F238E27FC236}">
-                <a16:creationId xmlns:a16="http://schemas.microsoft.com/office/drawing/2014/main" xmlns="" id="{54E49C07-2ECF-4660-8582-3A662CD53904}"/>
+                <a16:creationId xmlns:a16="http://schemas.microsoft.com/office/drawing/2014/main" id="{67A54C74-446F-4283-A614-DCD1E307638E}"/>
               </a:ext>
             </a:extLst>
           </p:cNvPr>
@@ -9217,7 +9467,7 @@
     </p:spTree>
     <p:extLst>
       <p:ext uri="{BB962C8B-B14F-4D97-AF65-F5344CB8AC3E}">
-        <p14:creationId xmlns:p14="http://schemas.microsoft.com/office/powerpoint/2010/main" val="3652658612"/>
+        <p14:creationId xmlns:p14="http://schemas.microsoft.com/office/powerpoint/2010/main" val="1065244771"/>
       </p:ext>
     </p:extLst>
   </p:cSld>
@@ -9249,7 +9499,7 @@
           <p:cNvPr id="2" name="Title 1">
             <a:extLst>
               <a:ext uri="{FF2B5EF4-FFF2-40B4-BE49-F238E27FC236}">
-                <a16:creationId xmlns:a16="http://schemas.microsoft.com/office/drawing/2014/main" xmlns="" id="{AB1A53DB-70FB-432D-BCAF-DCFBCCE6B023}"/>
+                <a16:creationId xmlns:a16="http://schemas.microsoft.com/office/drawing/2014/main" id="{4E96F21E-1AFE-4A04-8BD0-C88D1D2DA52C}"/>
               </a:ext>
             </a:extLst>
           </p:cNvPr>
@@ -9266,12 +9516,8 @@
           <a:lstStyle/>
           <a:p>
             <a:r>
-              <a:rPr lang="en-US" dirty="0" err="1"/>
-              <a:t>MapBox</a:t>
-            </a:r>
-            <a:r>
-              <a:rPr lang="en-US" dirty="0"/>
-              <a:t> API</a:t>
+              <a:rPr lang="en-US" dirty="0"/>
+              <a:t>Questions?</a:t>
             </a:r>
           </a:p>
         </p:txBody>
@@ -9281,7 +9527,7 @@
           <p:cNvPr id="3" name="Content Placeholder 2">
             <a:extLst>
               <a:ext uri="{FF2B5EF4-FFF2-40B4-BE49-F238E27FC236}">
-                <a16:creationId xmlns:a16="http://schemas.microsoft.com/office/drawing/2014/main" xmlns="" id="{A6866161-0CFB-4603-9213-EC107AF2D1E8}"/>
+                <a16:creationId xmlns:a16="http://schemas.microsoft.com/office/drawing/2014/main" id="{C6D9C712-7144-4100-BCDB-F2CFAF7A1F31}"/>
               </a:ext>
             </a:extLst>
           </p:cNvPr>
@@ -9294,81 +9540,10 @@
         </p:nvSpPr>
         <p:spPr/>
         <p:txBody>
-          <a:bodyPr>
-            <a:normAutofit/>
-          </a:bodyPr>
-          <a:lstStyle/>
-          <a:p>
-            <a:r>
-              <a:rPr lang="en-US" dirty="0" smtClean="0"/>
-              <a:t>Dove into documentation</a:t>
-            </a:r>
-          </a:p>
-          <a:p>
-            <a:r>
-              <a:rPr lang="en-US" dirty="0" smtClean="0"/>
-              <a:t>Used our acquired key to interact with the API</a:t>
-            </a:r>
-          </a:p>
-          <a:p>
-            <a:r>
-              <a:rPr lang="en-US" dirty="0" smtClean="0"/>
-              <a:t>Implemented </a:t>
-            </a:r>
-            <a:r>
-              <a:rPr lang="en-US" dirty="0" smtClean="0"/>
-              <a:t>drawing a </a:t>
-            </a:r>
-            <a:r>
-              <a:rPr lang="en-US" dirty="0" smtClean="0"/>
-              <a:t>map</a:t>
-            </a:r>
-          </a:p>
-          <a:p>
-            <a:r>
-              <a:rPr lang="en-US" dirty="0" smtClean="0"/>
-              <a:t>Current points are arbitrary, but easily modified to reflect points produced by algorithm </a:t>
-            </a:r>
-          </a:p>
-          <a:p>
-            <a:r>
-              <a:rPr lang="en-US" dirty="0" smtClean="0"/>
-              <a:t>Currently working on:</a:t>
-            </a:r>
-          </a:p>
-          <a:p>
-            <a:pPr lvl="1"/>
-            <a:r>
-              <a:rPr lang="en-US" dirty="0" smtClean="0"/>
-              <a:t>Refining large map into a rectangular shaped map in direction phone is pointing</a:t>
-            </a:r>
-            <a:endParaRPr lang="en-US" dirty="0" smtClean="0"/>
-          </a:p>
-          <a:p>
-            <a:pPr lvl="1"/>
-            <a:r>
-              <a:rPr lang="en-US" dirty="0" smtClean="0"/>
-              <a:t>Drawing markers for landmarks in refined map</a:t>
-            </a:r>
-            <a:endParaRPr lang="en-US" dirty="0" smtClean="0"/>
-          </a:p>
-          <a:p>
-            <a:pPr lvl="1"/>
-            <a:r>
-              <a:rPr lang="en-US" dirty="0" smtClean="0"/>
-              <a:t>Drawing custom markers (custom landmark locations)</a:t>
-            </a:r>
-          </a:p>
-          <a:p>
-            <a:pPr lvl="1"/>
-            <a:r>
-              <a:rPr lang="en-US" dirty="0" smtClean="0"/>
-              <a:t>Retrieving location data from refined map</a:t>
-            </a:r>
-            <a:endParaRPr lang="en-US" dirty="0" smtClean="0"/>
-          </a:p>
-          <a:p>
-            <a:endParaRPr lang="en-US" dirty="0"/>
+          <a:bodyPr/>
+          <a:lstStyle/>
+          <a:p>
+            <a:endParaRPr lang="en-US"/>
           </a:p>
         </p:txBody>
       </p:sp>
@@ -9377,7 +9552,7 @@
           <p:cNvPr id="4" name="Slide Number Placeholder 3">
             <a:extLst>
               <a:ext uri="{FF2B5EF4-FFF2-40B4-BE49-F238E27FC236}">
-                <a16:creationId xmlns:a16="http://schemas.microsoft.com/office/drawing/2014/main" xmlns="" id="{46B07E3D-35B9-4761-9561-21093A66968A}"/>
+                <a16:creationId xmlns:a16="http://schemas.microsoft.com/office/drawing/2014/main" id="{ABDB7F91-3EE4-476A-9661-1648C797CBD1}"/>
               </a:ext>
             </a:extLst>
           </p:cNvPr>
@@ -9405,7 +9580,7 @@
     </p:spTree>
     <p:extLst>
       <p:ext uri="{BB962C8B-B14F-4D97-AF65-F5344CB8AC3E}">
-        <p14:creationId xmlns:p14="http://schemas.microsoft.com/office/powerpoint/2010/main" val="3591823853"/>
+        <p14:creationId xmlns:p14="http://schemas.microsoft.com/office/powerpoint/2010/main" val="1700607014"/>
       </p:ext>
     </p:extLst>
   </p:cSld>
@@ -9437,7 +9612,7 @@
           <p:cNvPr id="2" name="Title 1">
             <a:extLst>
               <a:ext uri="{FF2B5EF4-FFF2-40B4-BE49-F238E27FC236}">
-                <a16:creationId xmlns:a16="http://schemas.microsoft.com/office/drawing/2014/main" xmlns="" id="{A9659006-5658-41C1-A6C3-449E86D35AC0}"/>
+                <a16:creationId xmlns:a16="http://schemas.microsoft.com/office/drawing/2014/main" id="{A9659006-5658-41C1-A6C3-449E86D35AC0}"/>
               </a:ext>
             </a:extLst>
           </p:cNvPr>
@@ -9465,7 +9640,7 @@
           <p:cNvPr id="3" name="Content Placeholder 2">
             <a:extLst>
               <a:ext uri="{FF2B5EF4-FFF2-40B4-BE49-F238E27FC236}">
-                <a16:creationId xmlns:a16="http://schemas.microsoft.com/office/drawing/2014/main" xmlns="" id="{73DD2599-6704-444D-B198-A61017C68022}"/>
+                <a16:creationId xmlns:a16="http://schemas.microsoft.com/office/drawing/2014/main" id="{73DD2599-6704-444D-B198-A61017C68022}"/>
               </a:ext>
             </a:extLst>
           </p:cNvPr>
@@ -9493,7 +9668,7 @@
           <p:cNvPr id="4" name="Slide Number Placeholder 3">
             <a:extLst>
               <a:ext uri="{FF2B5EF4-FFF2-40B4-BE49-F238E27FC236}">
-                <a16:creationId xmlns:a16="http://schemas.microsoft.com/office/drawing/2014/main" xmlns="" id="{1648D571-E13E-4175-B1E8-3DF13ABB935A}"/>
+                <a16:creationId xmlns:a16="http://schemas.microsoft.com/office/drawing/2014/main" id="{1648D571-E13E-4175-B1E8-3DF13ABB935A}"/>
               </a:ext>
             </a:extLst>
           </p:cNvPr>
@@ -9553,7 +9728,7 @@
           <p:cNvPr id="2" name="Title 1">
             <a:extLst>
               <a:ext uri="{FF2B5EF4-FFF2-40B4-BE49-F238E27FC236}">
-                <a16:creationId xmlns:a16="http://schemas.microsoft.com/office/drawing/2014/main" xmlns="" id="{F2AB9014-8A31-4680-8991-595A8A0A7749}"/>
+                <a16:creationId xmlns:a16="http://schemas.microsoft.com/office/drawing/2014/main" id="{83DFF23D-959A-44BC-BE78-1D0330CDF164}"/>
               </a:ext>
             </a:extLst>
           </p:cNvPr>
@@ -9571,7 +9746,7 @@
           <a:p>
             <a:r>
               <a:rPr lang="en-US" dirty="0"/>
-              <a:t>Database</a:t>
+              <a:t>Algorithm</a:t>
             </a:r>
           </a:p>
         </p:txBody>
@@ -9581,7 +9756,7 @@
           <p:cNvPr id="3" name="Content Placeholder 2">
             <a:extLst>
               <a:ext uri="{FF2B5EF4-FFF2-40B4-BE49-F238E27FC236}">
-                <a16:creationId xmlns:a16="http://schemas.microsoft.com/office/drawing/2014/main" xmlns="" id="{943385D6-20E6-41CB-94E2-C41E10317A02}"/>
+                <a16:creationId xmlns:a16="http://schemas.microsoft.com/office/drawing/2014/main" id="{706A48C4-F2C9-48C7-B302-4ADE777DDB2E}"/>
               </a:ext>
             </a:extLst>
           </p:cNvPr>
@@ -9592,12 +9767,103 @@
             <p:ph idx="1"/>
           </p:nvPr>
         </p:nvSpPr>
-        <p:spPr/>
-        <p:txBody>
-          <a:bodyPr/>
-          <a:lstStyle/>
-          <a:p>
-            <a:endParaRPr lang="en-US"/>
+        <p:spPr>
+          <a:xfrm>
+            <a:off x="2589212" y="1752599"/>
+            <a:ext cx="8915400" cy="4285129"/>
+          </a:xfrm>
+        </p:spPr>
+        <p:txBody>
+          <a:bodyPr>
+            <a:normAutofit/>
+          </a:bodyPr>
+          <a:lstStyle/>
+          <a:p>
+            <a:r>
+              <a:rPr lang="en-US" dirty="0"/>
+              <a:t>Get relevant sensor information</a:t>
+            </a:r>
+          </a:p>
+          <a:p>
+            <a:pPr lvl="1"/>
+            <a:r>
+              <a:rPr lang="en-US" dirty="0"/>
+              <a:t>Get elevation </a:t>
+            </a:r>
+          </a:p>
+          <a:p>
+            <a:pPr lvl="1"/>
+            <a:r>
+              <a:rPr lang="en-US" dirty="0"/>
+              <a:t>Get location</a:t>
+            </a:r>
+          </a:p>
+          <a:p>
+            <a:pPr lvl="1"/>
+            <a:r>
+              <a:rPr lang="en-US" dirty="0"/>
+              <a:t>Get orientation</a:t>
+            </a:r>
+          </a:p>
+          <a:p>
+            <a:r>
+              <a:rPr lang="en-US" dirty="0"/>
+              <a:t>Find landmarks in orientation</a:t>
+            </a:r>
+          </a:p>
+          <a:p>
+            <a:pPr lvl="1"/>
+            <a:r>
+              <a:rPr lang="en-US" dirty="0"/>
+              <a:t>Find Line of Sight (</a:t>
+            </a:r>
+            <a:r>
+              <a:rPr lang="en-US" dirty="0" err="1"/>
+              <a:t>LoS</a:t>
+            </a:r>
+            <a:r>
+              <a:rPr lang="en-US" dirty="0"/>
+              <a:t>) by numerical method</a:t>
+            </a:r>
+          </a:p>
+          <a:p>
+            <a:pPr lvl="1"/>
+            <a:r>
+              <a:rPr lang="en-US" dirty="0"/>
+              <a:t>Find landmarks between location and </a:t>
+            </a:r>
+            <a:r>
+              <a:rPr lang="en-US" dirty="0" err="1"/>
+              <a:t>LoS</a:t>
+            </a:r>
+            <a:endParaRPr lang="en-US" dirty="0"/>
+          </a:p>
+          <a:p>
+            <a:pPr lvl="1"/>
+            <a:r>
+              <a:rPr lang="en-US" dirty="0"/>
+              <a:t>Output landmarks to user</a:t>
+            </a:r>
+          </a:p>
+          <a:p>
+            <a:pPr lvl="1"/>
+            <a:r>
+              <a:rPr lang="en-US" dirty="0"/>
+              <a:t>Allow user to select landmark </a:t>
+            </a:r>
+          </a:p>
+          <a:p>
+            <a:pPr lvl="1"/>
+            <a:r>
+              <a:rPr lang="en-US" dirty="0"/>
+              <a:t>Pull information about landmark</a:t>
+            </a:r>
+          </a:p>
+          <a:p>
+            <a:r>
+              <a:rPr lang="en-US" dirty="0"/>
+              <a:t>Find distance between current location and landmark</a:t>
+            </a:r>
           </a:p>
         </p:txBody>
       </p:sp>
@@ -9606,7 +9872,7 @@
           <p:cNvPr id="4" name="Slide Number Placeholder 3">
             <a:extLst>
               <a:ext uri="{FF2B5EF4-FFF2-40B4-BE49-F238E27FC236}">
-                <a16:creationId xmlns:a16="http://schemas.microsoft.com/office/drawing/2014/main" xmlns="" id="{D85744C6-A06A-4F75-9D77-276BE5D6962F}"/>
+                <a16:creationId xmlns:a16="http://schemas.microsoft.com/office/drawing/2014/main" id="{8BA44F56-3ECD-42B0-A9A9-E5F99872401B}"/>
               </a:ext>
             </a:extLst>
           </p:cNvPr>
@@ -9634,7 +9900,7 @@
     </p:spTree>
     <p:extLst>
       <p:ext uri="{BB962C8B-B14F-4D97-AF65-F5344CB8AC3E}">
-        <p14:creationId xmlns:p14="http://schemas.microsoft.com/office/powerpoint/2010/main" val="735481043"/>
+        <p14:creationId xmlns:p14="http://schemas.microsoft.com/office/powerpoint/2010/main" val="230190470"/>
       </p:ext>
     </p:extLst>
   </p:cSld>
@@ -9666,7 +9932,7 @@
           <p:cNvPr id="2" name="Title 1">
             <a:extLst>
               <a:ext uri="{FF2B5EF4-FFF2-40B4-BE49-F238E27FC236}">
-                <a16:creationId xmlns:a16="http://schemas.microsoft.com/office/drawing/2014/main" xmlns="" id="{E745B5BA-CEC8-422E-982B-F8BC98723754}"/>
+                <a16:creationId xmlns:a16="http://schemas.microsoft.com/office/drawing/2014/main" id="{1183D399-4942-4C83-BF24-B436160EB419}"/>
               </a:ext>
             </a:extLst>
           </p:cNvPr>
@@ -9684,7 +9950,7 @@
           <a:p>
             <a:r>
               <a:rPr lang="en-US" dirty="0"/>
-              <a:t>Questions?</a:t>
+              <a:t>Sensors</a:t>
             </a:r>
           </a:p>
         </p:txBody>
@@ -9694,7 +9960,7 @@
           <p:cNvPr id="3" name="Content Placeholder 2">
             <a:extLst>
               <a:ext uri="{FF2B5EF4-FFF2-40B4-BE49-F238E27FC236}">
-                <a16:creationId xmlns:a16="http://schemas.microsoft.com/office/drawing/2014/main" xmlns="" id="{737908CF-DFCF-479E-B76A-2140E612B90F}"/>
+                <a16:creationId xmlns:a16="http://schemas.microsoft.com/office/drawing/2014/main" id="{0DD74EA9-167B-4010-AF9E-BA2A7445C522}"/>
               </a:ext>
             </a:extLst>
           </p:cNvPr>
@@ -9705,12 +9971,96 @@
             <p:ph idx="1"/>
           </p:nvPr>
         </p:nvSpPr>
-        <p:spPr/>
-        <p:txBody>
-          <a:bodyPr/>
-          <a:lstStyle/>
-          <a:p>
-            <a:endParaRPr lang="en-US"/>
+        <p:spPr>
+          <a:xfrm>
+            <a:off x="2589212" y="1564344"/>
+            <a:ext cx="8915400" cy="4509244"/>
+          </a:xfrm>
+        </p:spPr>
+        <p:txBody>
+          <a:bodyPr/>
+          <a:lstStyle/>
+          <a:p>
+            <a:r>
+              <a:rPr lang="en-US" dirty="0"/>
+              <a:t>Accelerometer and Magnetometer</a:t>
+            </a:r>
+          </a:p>
+          <a:p>
+            <a:pPr lvl="1"/>
+            <a:r>
+              <a:rPr lang="en-US" dirty="0"/>
+              <a:t>Used to calculate the orientation of the phone</a:t>
+            </a:r>
+          </a:p>
+          <a:p>
+            <a:pPr lvl="1"/>
+            <a:r>
+              <a:rPr lang="en-US" dirty="0"/>
+              <a:t>Gives access to:</a:t>
+            </a:r>
+          </a:p>
+          <a:p>
+            <a:pPr lvl="2"/>
+            <a:r>
+              <a:rPr lang="en-US" dirty="0"/>
+              <a:t>Azimuth</a:t>
+            </a:r>
+          </a:p>
+          <a:p>
+            <a:pPr lvl="2"/>
+            <a:r>
+              <a:rPr lang="en-US" dirty="0"/>
+              <a:t>Pitch</a:t>
+            </a:r>
+          </a:p>
+          <a:p>
+            <a:pPr lvl="2"/>
+            <a:r>
+              <a:rPr lang="en-US" dirty="0"/>
+              <a:t>Roll</a:t>
+            </a:r>
+          </a:p>
+          <a:p>
+            <a:r>
+              <a:rPr lang="en-US" dirty="0"/>
+              <a:t>GPS</a:t>
+            </a:r>
+          </a:p>
+          <a:p>
+            <a:pPr lvl="1"/>
+            <a:r>
+              <a:rPr lang="en-US" dirty="0"/>
+              <a:t>Requires explicit user permission</a:t>
+            </a:r>
+          </a:p>
+          <a:p>
+            <a:pPr lvl="1"/>
+            <a:r>
+              <a:rPr lang="en-US" dirty="0"/>
+              <a:t>Gives access to:</a:t>
+            </a:r>
+          </a:p>
+          <a:p>
+            <a:pPr lvl="2"/>
+            <a:r>
+              <a:rPr lang="en-US" dirty="0"/>
+              <a:t>Latitude</a:t>
+            </a:r>
+          </a:p>
+          <a:p>
+            <a:pPr lvl="2"/>
+            <a:r>
+              <a:rPr lang="en-US" dirty="0"/>
+              <a:t>Longitude</a:t>
+            </a:r>
+          </a:p>
+          <a:p>
+            <a:pPr lvl="2"/>
+            <a:r>
+              <a:rPr lang="en-US" dirty="0"/>
+              <a:t>Elevation</a:t>
+            </a:r>
           </a:p>
         </p:txBody>
       </p:sp>
@@ -9719,7 +10069,7 @@
           <p:cNvPr id="4" name="Slide Number Placeholder 3">
             <a:extLst>
               <a:ext uri="{FF2B5EF4-FFF2-40B4-BE49-F238E27FC236}">
-                <a16:creationId xmlns:a16="http://schemas.microsoft.com/office/drawing/2014/main" xmlns="" id="{DF8C3242-F7F3-4B6D-BE97-C08D1A7EC84D}"/>
+                <a16:creationId xmlns:a16="http://schemas.microsoft.com/office/drawing/2014/main" id="{54E49C07-2ECF-4660-8582-3A662CD53904}"/>
               </a:ext>
             </a:extLst>
           </p:cNvPr>
@@ -9747,7 +10097,7 @@
     </p:spTree>
     <p:extLst>
       <p:ext uri="{BB962C8B-B14F-4D97-AF65-F5344CB8AC3E}">
-        <p14:creationId xmlns:p14="http://schemas.microsoft.com/office/powerpoint/2010/main" val="1587191523"/>
+        <p14:creationId xmlns:p14="http://schemas.microsoft.com/office/powerpoint/2010/main" val="3652658612"/>
       </p:ext>
     </p:extLst>
   </p:cSld>
@@ -9779,7 +10129,7 @@
           <p:cNvPr id="2" name="Title 1">
             <a:extLst>
               <a:ext uri="{FF2B5EF4-FFF2-40B4-BE49-F238E27FC236}">
-                <a16:creationId xmlns:a16="http://schemas.microsoft.com/office/drawing/2014/main" xmlns="" id="{0925D358-7D77-482A-BA62-AF4AAB8E726F}"/>
+                <a16:creationId xmlns:a16="http://schemas.microsoft.com/office/drawing/2014/main" id="{AB1A53DB-70FB-432D-BCAF-DCFBCCE6B023}"/>
               </a:ext>
             </a:extLst>
           </p:cNvPr>
@@ -9796,8 +10146,12 @@
           <a:lstStyle/>
           <a:p>
             <a:r>
-              <a:rPr lang="en-US" dirty="0"/>
-              <a:t>Unofficial Sprint</a:t>
+              <a:rPr lang="en-US" dirty="0" err="1"/>
+              <a:t>MapBox</a:t>
+            </a:r>
+            <a:r>
+              <a:rPr lang="en-US" dirty="0"/>
+              <a:t> API</a:t>
             </a:r>
           </a:p>
         </p:txBody>
@@ -9807,7 +10161,7 @@
           <p:cNvPr id="3" name="Content Placeholder 2">
             <a:extLst>
               <a:ext uri="{FF2B5EF4-FFF2-40B4-BE49-F238E27FC236}">
-                <a16:creationId xmlns:a16="http://schemas.microsoft.com/office/drawing/2014/main" xmlns="" id="{6A41BCA7-F42D-4C14-9EE3-C0604BD1C8ED}"/>
+                <a16:creationId xmlns:a16="http://schemas.microsoft.com/office/drawing/2014/main" id="{A6866161-0CFB-4603-9213-EC107AF2D1E8}"/>
               </a:ext>
             </a:extLst>
           </p:cNvPr>
@@ -9820,10 +10174,70 @@
         </p:nvSpPr>
         <p:spPr/>
         <p:txBody>
-          <a:bodyPr/>
-          <a:lstStyle/>
-          <a:p>
-            <a:endParaRPr lang="en-US"/>
+          <a:bodyPr>
+            <a:normAutofit/>
+          </a:bodyPr>
+          <a:lstStyle/>
+          <a:p>
+            <a:r>
+              <a:rPr lang="en-US" dirty="0"/>
+              <a:t>Dove into documentation</a:t>
+            </a:r>
+          </a:p>
+          <a:p>
+            <a:r>
+              <a:rPr lang="en-US" dirty="0"/>
+              <a:t>Used our acquired key to interact with the API</a:t>
+            </a:r>
+          </a:p>
+          <a:p>
+            <a:r>
+              <a:rPr lang="en-US" dirty="0"/>
+              <a:t>Implemented drawing a map</a:t>
+            </a:r>
+          </a:p>
+          <a:p>
+            <a:r>
+              <a:rPr lang="en-US" dirty="0"/>
+              <a:t>Current points are arbitrary, but easily modified to reflect points produced by algorithm </a:t>
+            </a:r>
+          </a:p>
+          <a:p>
+            <a:r>
+              <a:rPr lang="en-US" dirty="0"/>
+              <a:t>Currently working on:</a:t>
+            </a:r>
+          </a:p>
+          <a:p>
+            <a:pPr lvl="1"/>
+            <a:r>
+              <a:rPr lang="en-US" dirty="0"/>
+              <a:t>Refining large map into a rectangular shaped map in direction phone is pointing</a:t>
+            </a:r>
+          </a:p>
+          <a:p>
+            <a:pPr lvl="1"/>
+            <a:r>
+              <a:rPr lang="en-US" dirty="0"/>
+              <a:t>Drawing markers for landmarks in refined map</a:t>
+            </a:r>
+          </a:p>
+          <a:p>
+            <a:pPr lvl="1"/>
+            <a:r>
+              <a:rPr lang="en-US" dirty="0"/>
+              <a:t>Drawing custom markers (custom landmark locations)</a:t>
+            </a:r>
+          </a:p>
+          <a:p>
+            <a:pPr lvl="1"/>
+            <a:r>
+              <a:rPr lang="en-US" dirty="0"/>
+              <a:t>Retrieving location data from refined map</a:t>
+            </a:r>
+          </a:p>
+          <a:p>
+            <a:endParaRPr lang="en-US" dirty="0"/>
           </a:p>
         </p:txBody>
       </p:sp>
@@ -9832,7 +10246,7 @@
           <p:cNvPr id="4" name="Slide Number Placeholder 3">
             <a:extLst>
               <a:ext uri="{FF2B5EF4-FFF2-40B4-BE49-F238E27FC236}">
-                <a16:creationId xmlns:a16="http://schemas.microsoft.com/office/drawing/2014/main" xmlns="" id="{BB4882C3-32B5-455C-9E1C-9DBFC4D3EA7C}"/>
+                <a16:creationId xmlns:a16="http://schemas.microsoft.com/office/drawing/2014/main" id="{46B07E3D-35B9-4761-9561-21093A66968A}"/>
               </a:ext>
             </a:extLst>
           </p:cNvPr>
@@ -9860,7 +10274,7 @@
     </p:spTree>
     <p:extLst>
       <p:ext uri="{BB962C8B-B14F-4D97-AF65-F5344CB8AC3E}">
-        <p14:creationId xmlns:p14="http://schemas.microsoft.com/office/powerpoint/2010/main" val="4099954266"/>
+        <p14:creationId xmlns:p14="http://schemas.microsoft.com/office/powerpoint/2010/main" val="3591823853"/>
       </p:ext>
     </p:extLst>
   </p:cSld>
@@ -9892,7 +10306,7 @@
           <p:cNvPr id="2" name="Title 1">
             <a:extLst>
               <a:ext uri="{FF2B5EF4-FFF2-40B4-BE49-F238E27FC236}">
-                <a16:creationId xmlns:a16="http://schemas.microsoft.com/office/drawing/2014/main" xmlns="" id="{AD0AB5FE-C138-421F-92EE-1844FDF7256A}"/>
+                <a16:creationId xmlns:a16="http://schemas.microsoft.com/office/drawing/2014/main" id="{0B3AFE50-BDBE-4AED-81A7-0DF1A0F76CDF}"/>
               </a:ext>
             </a:extLst>
           </p:cNvPr>
@@ -9910,7 +10324,7 @@
           <a:p>
             <a:r>
               <a:rPr lang="en-US" dirty="0"/>
-              <a:t>Sprint 2</a:t>
+              <a:t>DEMO TIME</a:t>
             </a:r>
           </a:p>
         </p:txBody>
@@ -9920,7 +10334,7 @@
           <p:cNvPr id="3" name="Content Placeholder 2">
             <a:extLst>
               <a:ext uri="{FF2B5EF4-FFF2-40B4-BE49-F238E27FC236}">
-                <a16:creationId xmlns:a16="http://schemas.microsoft.com/office/drawing/2014/main" xmlns="" id="{903C4FAD-1519-4538-BD82-6A08BE138CB6}"/>
+                <a16:creationId xmlns:a16="http://schemas.microsoft.com/office/drawing/2014/main" id="{80DD7C09-83AA-465B-95B7-B255B8FBA959}"/>
               </a:ext>
             </a:extLst>
           </p:cNvPr>
@@ -9945,7 +10359,7 @@
           <p:cNvPr id="4" name="Slide Number Placeholder 3">
             <a:extLst>
               <a:ext uri="{FF2B5EF4-FFF2-40B4-BE49-F238E27FC236}">
-                <a16:creationId xmlns:a16="http://schemas.microsoft.com/office/drawing/2014/main" xmlns="" id="{2D0C1AF0-2A5F-49B5-B744-94150C0B7BD5}"/>
+                <a16:creationId xmlns:a16="http://schemas.microsoft.com/office/drawing/2014/main" id="{AE31E36E-89F5-4BF3-9156-8D604472F1CC}"/>
               </a:ext>
             </a:extLst>
           </p:cNvPr>
@@ -9973,7 +10387,7 @@
     </p:spTree>
     <p:extLst>
       <p:ext uri="{BB962C8B-B14F-4D97-AF65-F5344CB8AC3E}">
-        <p14:creationId xmlns:p14="http://schemas.microsoft.com/office/powerpoint/2010/main" val="632679123"/>
+        <p14:creationId xmlns:p14="http://schemas.microsoft.com/office/powerpoint/2010/main" val="4021183166"/>
       </p:ext>
     </p:extLst>
   </p:cSld>
@@ -10005,7 +10419,7 @@
           <p:cNvPr id="2" name="Title 1">
             <a:extLst>
               <a:ext uri="{FF2B5EF4-FFF2-40B4-BE49-F238E27FC236}">
-                <a16:creationId xmlns:a16="http://schemas.microsoft.com/office/drawing/2014/main" xmlns="" id="{5DE1D604-AE0D-4070-84FA-E88517FF5DFF}"/>
+                <a16:creationId xmlns:a16="http://schemas.microsoft.com/office/drawing/2014/main" id="{E745B5BA-CEC8-422E-982B-F8BC98723754}"/>
               </a:ext>
             </a:extLst>
           </p:cNvPr>
@@ -10022,7 +10436,7 @@
           <a:lstStyle/>
           <a:p>
             <a:r>
-              <a:rPr lang="en-US"/>
+              <a:rPr lang="en-US" dirty="0"/>
               <a:t>Questions?</a:t>
             </a:r>
           </a:p>
@@ -10033,7 +10447,7 @@
           <p:cNvPr id="3" name="Content Placeholder 2">
             <a:extLst>
               <a:ext uri="{FF2B5EF4-FFF2-40B4-BE49-F238E27FC236}">
-                <a16:creationId xmlns:a16="http://schemas.microsoft.com/office/drawing/2014/main" xmlns="" id="{E38BF89C-DFBF-421E-A964-AE3C9E1FC370}"/>
+                <a16:creationId xmlns:a16="http://schemas.microsoft.com/office/drawing/2014/main" id="{737908CF-DFCF-479E-B76A-2140E612B90F}"/>
               </a:ext>
             </a:extLst>
           </p:cNvPr>
@@ -10058,7 +10472,7 @@
           <p:cNvPr id="4" name="Slide Number Placeholder 3">
             <a:extLst>
               <a:ext uri="{FF2B5EF4-FFF2-40B4-BE49-F238E27FC236}">
-                <a16:creationId xmlns:a16="http://schemas.microsoft.com/office/drawing/2014/main" xmlns="" id="{6DD83CE4-B7F7-4E5E-9EA9-93BC3E139089}"/>
+                <a16:creationId xmlns:a16="http://schemas.microsoft.com/office/drawing/2014/main" id="{DF8C3242-F7F3-4B6D-BE97-C08D1A7EC84D}"/>
               </a:ext>
             </a:extLst>
           </p:cNvPr>
@@ -10078,6 +10492,345 @@
               <a:rPr lang="en-US" smtClean="0"/>
               <a:pPr/>
               <a:t>24</a:t>
+            </a:fld>
+            <a:endParaRPr lang="en-US" dirty="0"/>
+          </a:p>
+        </p:txBody>
+      </p:sp>
+    </p:spTree>
+    <p:extLst>
+      <p:ext uri="{BB962C8B-B14F-4D97-AF65-F5344CB8AC3E}">
+        <p14:creationId xmlns:p14="http://schemas.microsoft.com/office/powerpoint/2010/main" val="1587191523"/>
+      </p:ext>
+    </p:extLst>
+  </p:cSld>
+  <p:clrMapOvr>
+    <a:masterClrMapping/>
+  </p:clrMapOvr>
+</p:sld>
+</file>
+
+<file path=ppt/slides/slide25.xml><?xml version="1.0" encoding="utf-8"?>
+<p:sld xmlns:a="http://schemas.openxmlformats.org/drawingml/2006/main" xmlns:r="http://schemas.openxmlformats.org/officeDocument/2006/relationships" xmlns:p="http://schemas.openxmlformats.org/presentationml/2006/main">
+  <p:cSld>
+    <p:spTree>
+      <p:nvGrpSpPr>
+        <p:cNvPr id="1" name=""/>
+        <p:cNvGrpSpPr/>
+        <p:nvPr/>
+      </p:nvGrpSpPr>
+      <p:grpSpPr>
+        <a:xfrm>
+          <a:off x="0" y="0"/>
+          <a:ext cx="0" cy="0"/>
+          <a:chOff x="0" y="0"/>
+          <a:chExt cx="0" cy="0"/>
+        </a:xfrm>
+      </p:grpSpPr>
+      <p:sp>
+        <p:nvSpPr>
+          <p:cNvPr id="2" name="Title 1">
+            <a:extLst>
+              <a:ext uri="{FF2B5EF4-FFF2-40B4-BE49-F238E27FC236}">
+                <a16:creationId xmlns:a16="http://schemas.microsoft.com/office/drawing/2014/main" id="{0925D358-7D77-482A-BA62-AF4AAB8E726F}"/>
+              </a:ext>
+            </a:extLst>
+          </p:cNvPr>
+          <p:cNvSpPr>
+            <a:spLocks noGrp="1"/>
+          </p:cNvSpPr>
+          <p:nvPr>
+            <p:ph type="title"/>
+          </p:nvPr>
+        </p:nvSpPr>
+        <p:spPr/>
+        <p:txBody>
+          <a:bodyPr/>
+          <a:lstStyle/>
+          <a:p>
+            <a:r>
+              <a:rPr lang="en-US" dirty="0"/>
+              <a:t>Unofficial Sprint</a:t>
+            </a:r>
+          </a:p>
+        </p:txBody>
+      </p:sp>
+      <p:sp>
+        <p:nvSpPr>
+          <p:cNvPr id="3" name="Content Placeholder 2">
+            <a:extLst>
+              <a:ext uri="{FF2B5EF4-FFF2-40B4-BE49-F238E27FC236}">
+                <a16:creationId xmlns:a16="http://schemas.microsoft.com/office/drawing/2014/main" id="{6A41BCA7-F42D-4C14-9EE3-C0604BD1C8ED}"/>
+              </a:ext>
+            </a:extLst>
+          </p:cNvPr>
+          <p:cNvSpPr>
+            <a:spLocks noGrp="1"/>
+          </p:cNvSpPr>
+          <p:nvPr>
+            <p:ph idx="1"/>
+          </p:nvPr>
+        </p:nvSpPr>
+        <p:spPr/>
+        <p:txBody>
+          <a:bodyPr/>
+          <a:lstStyle/>
+          <a:p>
+            <a:endParaRPr lang="en-US"/>
+          </a:p>
+        </p:txBody>
+      </p:sp>
+      <p:sp>
+        <p:nvSpPr>
+          <p:cNvPr id="4" name="Slide Number Placeholder 3">
+            <a:extLst>
+              <a:ext uri="{FF2B5EF4-FFF2-40B4-BE49-F238E27FC236}">
+                <a16:creationId xmlns:a16="http://schemas.microsoft.com/office/drawing/2014/main" id="{BB4882C3-32B5-455C-9E1C-9DBFC4D3EA7C}"/>
+              </a:ext>
+            </a:extLst>
+          </p:cNvPr>
+          <p:cNvSpPr>
+            <a:spLocks noGrp="1"/>
+          </p:cNvSpPr>
+          <p:nvPr>
+            <p:ph type="sldNum" sz="quarter" idx="12"/>
+          </p:nvPr>
+        </p:nvSpPr>
+        <p:spPr/>
+        <p:txBody>
+          <a:bodyPr/>
+          <a:lstStyle/>
+          <a:p>
+            <a:fld id="{D57F1E4F-1CFF-5643-939E-217C01CDF565}" type="slidenum">
+              <a:rPr lang="en-US" smtClean="0"/>
+              <a:pPr/>
+              <a:t>25</a:t>
+            </a:fld>
+            <a:endParaRPr lang="en-US" dirty="0"/>
+          </a:p>
+        </p:txBody>
+      </p:sp>
+    </p:spTree>
+    <p:extLst>
+      <p:ext uri="{BB962C8B-B14F-4D97-AF65-F5344CB8AC3E}">
+        <p14:creationId xmlns:p14="http://schemas.microsoft.com/office/powerpoint/2010/main" val="4099954266"/>
+      </p:ext>
+    </p:extLst>
+  </p:cSld>
+  <p:clrMapOvr>
+    <a:masterClrMapping/>
+  </p:clrMapOvr>
+</p:sld>
+</file>
+
+<file path=ppt/slides/slide26.xml><?xml version="1.0" encoding="utf-8"?>
+<p:sld xmlns:a="http://schemas.openxmlformats.org/drawingml/2006/main" xmlns:r="http://schemas.openxmlformats.org/officeDocument/2006/relationships" xmlns:p="http://schemas.openxmlformats.org/presentationml/2006/main">
+  <p:cSld>
+    <p:spTree>
+      <p:nvGrpSpPr>
+        <p:cNvPr id="1" name=""/>
+        <p:cNvGrpSpPr/>
+        <p:nvPr/>
+      </p:nvGrpSpPr>
+      <p:grpSpPr>
+        <a:xfrm>
+          <a:off x="0" y="0"/>
+          <a:ext cx="0" cy="0"/>
+          <a:chOff x="0" y="0"/>
+          <a:chExt cx="0" cy="0"/>
+        </a:xfrm>
+      </p:grpSpPr>
+      <p:sp>
+        <p:nvSpPr>
+          <p:cNvPr id="2" name="Title 1">
+            <a:extLst>
+              <a:ext uri="{FF2B5EF4-FFF2-40B4-BE49-F238E27FC236}">
+                <a16:creationId xmlns:a16="http://schemas.microsoft.com/office/drawing/2014/main" id="{AD0AB5FE-C138-421F-92EE-1844FDF7256A}"/>
+              </a:ext>
+            </a:extLst>
+          </p:cNvPr>
+          <p:cNvSpPr>
+            <a:spLocks noGrp="1"/>
+          </p:cNvSpPr>
+          <p:nvPr>
+            <p:ph type="title"/>
+          </p:nvPr>
+        </p:nvSpPr>
+        <p:spPr/>
+        <p:txBody>
+          <a:bodyPr/>
+          <a:lstStyle/>
+          <a:p>
+            <a:r>
+              <a:rPr lang="en-US" dirty="0"/>
+              <a:t>Sprint 2</a:t>
+            </a:r>
+          </a:p>
+        </p:txBody>
+      </p:sp>
+      <p:sp>
+        <p:nvSpPr>
+          <p:cNvPr id="3" name="Content Placeholder 2">
+            <a:extLst>
+              <a:ext uri="{FF2B5EF4-FFF2-40B4-BE49-F238E27FC236}">
+                <a16:creationId xmlns:a16="http://schemas.microsoft.com/office/drawing/2014/main" id="{903C4FAD-1519-4538-BD82-6A08BE138CB6}"/>
+              </a:ext>
+            </a:extLst>
+          </p:cNvPr>
+          <p:cNvSpPr>
+            <a:spLocks noGrp="1"/>
+          </p:cNvSpPr>
+          <p:nvPr>
+            <p:ph idx="1"/>
+          </p:nvPr>
+        </p:nvSpPr>
+        <p:spPr/>
+        <p:txBody>
+          <a:bodyPr/>
+          <a:lstStyle/>
+          <a:p>
+            <a:endParaRPr lang="en-US"/>
+          </a:p>
+        </p:txBody>
+      </p:sp>
+      <p:sp>
+        <p:nvSpPr>
+          <p:cNvPr id="4" name="Slide Number Placeholder 3">
+            <a:extLst>
+              <a:ext uri="{FF2B5EF4-FFF2-40B4-BE49-F238E27FC236}">
+                <a16:creationId xmlns:a16="http://schemas.microsoft.com/office/drawing/2014/main" id="{2D0C1AF0-2A5F-49B5-B744-94150C0B7BD5}"/>
+              </a:ext>
+            </a:extLst>
+          </p:cNvPr>
+          <p:cNvSpPr>
+            <a:spLocks noGrp="1"/>
+          </p:cNvSpPr>
+          <p:nvPr>
+            <p:ph type="sldNum" sz="quarter" idx="12"/>
+          </p:nvPr>
+        </p:nvSpPr>
+        <p:spPr/>
+        <p:txBody>
+          <a:bodyPr/>
+          <a:lstStyle/>
+          <a:p>
+            <a:fld id="{D57F1E4F-1CFF-5643-939E-217C01CDF565}" type="slidenum">
+              <a:rPr lang="en-US" smtClean="0"/>
+              <a:pPr/>
+              <a:t>26</a:t>
+            </a:fld>
+            <a:endParaRPr lang="en-US" dirty="0"/>
+          </a:p>
+        </p:txBody>
+      </p:sp>
+    </p:spTree>
+    <p:extLst>
+      <p:ext uri="{BB962C8B-B14F-4D97-AF65-F5344CB8AC3E}">
+        <p14:creationId xmlns:p14="http://schemas.microsoft.com/office/powerpoint/2010/main" val="632679123"/>
+      </p:ext>
+    </p:extLst>
+  </p:cSld>
+  <p:clrMapOvr>
+    <a:masterClrMapping/>
+  </p:clrMapOvr>
+</p:sld>
+</file>
+
+<file path=ppt/slides/slide27.xml><?xml version="1.0" encoding="utf-8"?>
+<p:sld xmlns:a="http://schemas.openxmlformats.org/drawingml/2006/main" xmlns:r="http://schemas.openxmlformats.org/officeDocument/2006/relationships" xmlns:p="http://schemas.openxmlformats.org/presentationml/2006/main">
+  <p:cSld>
+    <p:spTree>
+      <p:nvGrpSpPr>
+        <p:cNvPr id="1" name=""/>
+        <p:cNvGrpSpPr/>
+        <p:nvPr/>
+      </p:nvGrpSpPr>
+      <p:grpSpPr>
+        <a:xfrm>
+          <a:off x="0" y="0"/>
+          <a:ext cx="0" cy="0"/>
+          <a:chOff x="0" y="0"/>
+          <a:chExt cx="0" cy="0"/>
+        </a:xfrm>
+      </p:grpSpPr>
+      <p:sp>
+        <p:nvSpPr>
+          <p:cNvPr id="2" name="Title 1">
+            <a:extLst>
+              <a:ext uri="{FF2B5EF4-FFF2-40B4-BE49-F238E27FC236}">
+                <a16:creationId xmlns:a16="http://schemas.microsoft.com/office/drawing/2014/main" id="{5DE1D604-AE0D-4070-84FA-E88517FF5DFF}"/>
+              </a:ext>
+            </a:extLst>
+          </p:cNvPr>
+          <p:cNvSpPr>
+            <a:spLocks noGrp="1"/>
+          </p:cNvSpPr>
+          <p:nvPr>
+            <p:ph type="title"/>
+          </p:nvPr>
+        </p:nvSpPr>
+        <p:spPr/>
+        <p:txBody>
+          <a:bodyPr/>
+          <a:lstStyle/>
+          <a:p>
+            <a:r>
+              <a:rPr lang="en-US"/>
+              <a:t>Questions?</a:t>
+            </a:r>
+          </a:p>
+        </p:txBody>
+      </p:sp>
+      <p:sp>
+        <p:nvSpPr>
+          <p:cNvPr id="3" name="Content Placeholder 2">
+            <a:extLst>
+              <a:ext uri="{FF2B5EF4-FFF2-40B4-BE49-F238E27FC236}">
+                <a16:creationId xmlns:a16="http://schemas.microsoft.com/office/drawing/2014/main" id="{E38BF89C-DFBF-421E-A964-AE3C9E1FC370}"/>
+              </a:ext>
+            </a:extLst>
+          </p:cNvPr>
+          <p:cNvSpPr>
+            <a:spLocks noGrp="1"/>
+          </p:cNvSpPr>
+          <p:nvPr>
+            <p:ph idx="1"/>
+          </p:nvPr>
+        </p:nvSpPr>
+        <p:spPr/>
+        <p:txBody>
+          <a:bodyPr/>
+          <a:lstStyle/>
+          <a:p>
+            <a:endParaRPr lang="en-US"/>
+          </a:p>
+        </p:txBody>
+      </p:sp>
+      <p:sp>
+        <p:nvSpPr>
+          <p:cNvPr id="4" name="Slide Number Placeholder 3">
+            <a:extLst>
+              <a:ext uri="{FF2B5EF4-FFF2-40B4-BE49-F238E27FC236}">
+                <a16:creationId xmlns:a16="http://schemas.microsoft.com/office/drawing/2014/main" id="{6DD83CE4-B7F7-4E5E-9EA9-93BC3E139089}"/>
+              </a:ext>
+            </a:extLst>
+          </p:cNvPr>
+          <p:cNvSpPr>
+            <a:spLocks noGrp="1"/>
+          </p:cNvSpPr>
+          <p:nvPr>
+            <p:ph type="sldNum" sz="quarter" idx="12"/>
+          </p:nvPr>
+        </p:nvSpPr>
+        <p:spPr/>
+        <p:txBody>
+          <a:bodyPr/>
+          <a:lstStyle/>
+          <a:p>
+            <a:fld id="{D57F1E4F-1CFF-5643-939E-217C01CDF565}" type="slidenum">
+              <a:rPr lang="en-US" smtClean="0"/>
+              <a:pPr/>
+              <a:t>27</a:t>
             </a:fld>
             <a:endParaRPr lang="en-US" dirty="0"/>
           </a:p>
@@ -10118,7 +10871,7 @@
           <p:cNvPr id="2" name="Title 1">
             <a:extLst>
               <a:ext uri="{FF2B5EF4-FFF2-40B4-BE49-F238E27FC236}">
-                <a16:creationId xmlns:a16="http://schemas.microsoft.com/office/drawing/2014/main" xmlns="" id="{F2D35386-6553-4F40-B13E-39127AE27598}"/>
+                <a16:creationId xmlns:a16="http://schemas.microsoft.com/office/drawing/2014/main" id="{F2D35386-6553-4F40-B13E-39127AE27598}"/>
               </a:ext>
             </a:extLst>
           </p:cNvPr>
@@ -10146,7 +10899,7 @@
           <p:cNvPr id="3" name="Content Placeholder 2">
             <a:extLst>
               <a:ext uri="{FF2B5EF4-FFF2-40B4-BE49-F238E27FC236}">
-                <a16:creationId xmlns:a16="http://schemas.microsoft.com/office/drawing/2014/main" xmlns="" id="{B215CA30-6357-4A93-9C6E-ABDCF65F48B0}"/>
+                <a16:creationId xmlns:a16="http://schemas.microsoft.com/office/drawing/2014/main" id="{B215CA30-6357-4A93-9C6E-ABDCF65F48B0}"/>
               </a:ext>
             </a:extLst>
           </p:cNvPr>
@@ -10227,7 +10980,7 @@
           <p:cNvPr id="4" name="Slide Number Placeholder 3">
             <a:extLst>
               <a:ext uri="{FF2B5EF4-FFF2-40B4-BE49-F238E27FC236}">
-                <a16:creationId xmlns:a16="http://schemas.microsoft.com/office/drawing/2014/main" xmlns="" id="{367A8BEF-7F6E-4089-833F-9809F9A867A4}"/>
+                <a16:creationId xmlns:a16="http://schemas.microsoft.com/office/drawing/2014/main" id="{367A8BEF-7F6E-4089-833F-9809F9A867A4}"/>
               </a:ext>
             </a:extLst>
           </p:cNvPr>
@@ -10287,7 +11040,7 @@
           <p:cNvPr id="2" name="Title 1">
             <a:extLst>
               <a:ext uri="{FF2B5EF4-FFF2-40B4-BE49-F238E27FC236}">
-                <a16:creationId xmlns:a16="http://schemas.microsoft.com/office/drawing/2014/main" xmlns="" id="{5199C9B0-06E2-410E-8DDA-ABF5228032EA}"/>
+                <a16:creationId xmlns:a16="http://schemas.microsoft.com/office/drawing/2014/main" id="{5199C9B0-06E2-410E-8DDA-ABF5228032EA}"/>
               </a:ext>
             </a:extLst>
           </p:cNvPr>
@@ -10315,7 +11068,7 @@
           <p:cNvPr id="3" name="Content Placeholder 2">
             <a:extLst>
               <a:ext uri="{FF2B5EF4-FFF2-40B4-BE49-F238E27FC236}">
-                <a16:creationId xmlns:a16="http://schemas.microsoft.com/office/drawing/2014/main" xmlns="" id="{0EA9F7AB-C9CE-47FF-B6ED-B5BF71D63066}"/>
+                <a16:creationId xmlns:a16="http://schemas.microsoft.com/office/drawing/2014/main" id="{0EA9F7AB-C9CE-47FF-B6ED-B5BF71D63066}"/>
               </a:ext>
             </a:extLst>
           </p:cNvPr>
@@ -10340,7 +11093,7 @@
           <p:cNvPr id="4" name="Slide Number Placeholder 3">
             <a:extLst>
               <a:ext uri="{FF2B5EF4-FFF2-40B4-BE49-F238E27FC236}">
-                <a16:creationId xmlns:a16="http://schemas.microsoft.com/office/drawing/2014/main" xmlns="" id="{41E5440E-F403-4B49-B638-14435F8F2B1D}"/>
+                <a16:creationId xmlns:a16="http://schemas.microsoft.com/office/drawing/2014/main" id="{41E5440E-F403-4B49-B638-14435F8F2B1D}"/>
               </a:ext>
             </a:extLst>
           </p:cNvPr>
@@ -10400,7 +11153,7 @@
           <p:cNvPr id="2" name="Title 1">
             <a:extLst>
               <a:ext uri="{FF2B5EF4-FFF2-40B4-BE49-F238E27FC236}">
-                <a16:creationId xmlns:a16="http://schemas.microsoft.com/office/drawing/2014/main" xmlns="" id="{B42A0C66-3F52-409A-9CE7-5570CF118EC1}"/>
+                <a16:creationId xmlns:a16="http://schemas.microsoft.com/office/drawing/2014/main" id="{B42A0C66-3F52-409A-9CE7-5570CF118EC1}"/>
               </a:ext>
             </a:extLst>
           </p:cNvPr>
@@ -10428,7 +11181,7 @@
           <p:cNvPr id="3" name="Content Placeholder 2">
             <a:extLst>
               <a:ext uri="{FF2B5EF4-FFF2-40B4-BE49-F238E27FC236}">
-                <a16:creationId xmlns:a16="http://schemas.microsoft.com/office/drawing/2014/main" xmlns="" id="{453B0361-81CA-4B36-98AD-8CDC7D18FD88}"/>
+                <a16:creationId xmlns:a16="http://schemas.microsoft.com/office/drawing/2014/main" id="{453B0361-81CA-4B36-98AD-8CDC7D18FD88}"/>
               </a:ext>
             </a:extLst>
           </p:cNvPr>
@@ -10483,7 +11236,7 @@
           <p:cNvPr id="4" name="Slide Number Placeholder 3">
             <a:extLst>
               <a:ext uri="{FF2B5EF4-FFF2-40B4-BE49-F238E27FC236}">
-                <a16:creationId xmlns:a16="http://schemas.microsoft.com/office/drawing/2014/main" xmlns="" id="{68400699-93C1-43CE-9C6D-F2E00C8FCA2F}"/>
+                <a16:creationId xmlns:a16="http://schemas.microsoft.com/office/drawing/2014/main" id="{68400699-93C1-43CE-9C6D-F2E00C8FCA2F}"/>
               </a:ext>
             </a:extLst>
           </p:cNvPr>
@@ -10543,7 +11296,7 @@
           <p:cNvPr id="2" name="Title 1">
             <a:extLst>
               <a:ext uri="{FF2B5EF4-FFF2-40B4-BE49-F238E27FC236}">
-                <a16:creationId xmlns:a16="http://schemas.microsoft.com/office/drawing/2014/main" xmlns="" id="{97A51132-5F7C-4458-A7CA-40C03DC63E1A}"/>
+                <a16:creationId xmlns:a16="http://schemas.microsoft.com/office/drawing/2014/main" id="{97A51132-5F7C-4458-A7CA-40C03DC63E1A}"/>
               </a:ext>
             </a:extLst>
           </p:cNvPr>
@@ -10579,7 +11332,7 @@
           <p:cNvPr id="3" name="Content Placeholder 2">
             <a:extLst>
               <a:ext uri="{FF2B5EF4-FFF2-40B4-BE49-F238E27FC236}">
-                <a16:creationId xmlns:a16="http://schemas.microsoft.com/office/drawing/2014/main" xmlns="" id="{AC52C316-830D-462A-8F67-9BA0E80F4A72}"/>
+                <a16:creationId xmlns:a16="http://schemas.microsoft.com/office/drawing/2014/main" id="{AC52C316-830D-462A-8F67-9BA0E80F4A72}"/>
               </a:ext>
             </a:extLst>
           </p:cNvPr>
@@ -10628,7 +11381,7 @@
           <p:cNvPr id="4" name="Slide Number Placeholder 3">
             <a:extLst>
               <a:ext uri="{FF2B5EF4-FFF2-40B4-BE49-F238E27FC236}">
-                <a16:creationId xmlns:a16="http://schemas.microsoft.com/office/drawing/2014/main" xmlns="" id="{7DC007F5-0198-4CE9-837A-8E4EBDFB3638}"/>
+                <a16:creationId xmlns:a16="http://schemas.microsoft.com/office/drawing/2014/main" id="{7DC007F5-0198-4CE9-837A-8E4EBDFB3638}"/>
               </a:ext>
             </a:extLst>
           </p:cNvPr>
@@ -10688,7 +11441,7 @@
           <p:cNvPr id="2" name="Title 1">
             <a:extLst>
               <a:ext uri="{FF2B5EF4-FFF2-40B4-BE49-F238E27FC236}">
-                <a16:creationId xmlns:a16="http://schemas.microsoft.com/office/drawing/2014/main" xmlns="" id="{8B25CC60-678F-4ABC-A286-B6474D7DA369}"/>
+                <a16:creationId xmlns:a16="http://schemas.microsoft.com/office/drawing/2014/main" id="{8B25CC60-678F-4ABC-A286-B6474D7DA369}"/>
               </a:ext>
             </a:extLst>
           </p:cNvPr>
@@ -10724,7 +11477,7 @@
           <p:cNvPr id="3" name="Content Placeholder 2">
             <a:extLst>
               <a:ext uri="{FF2B5EF4-FFF2-40B4-BE49-F238E27FC236}">
-                <a16:creationId xmlns:a16="http://schemas.microsoft.com/office/drawing/2014/main" xmlns="" id="{A4A95409-D15F-4ACF-B8E2-B483B69F471C}"/>
+                <a16:creationId xmlns:a16="http://schemas.microsoft.com/office/drawing/2014/main" id="{A4A95409-D15F-4ACF-B8E2-B483B69F471C}"/>
               </a:ext>
             </a:extLst>
           </p:cNvPr>
@@ -10778,7 +11531,7 @@
           <p:cNvPr id="4" name="Slide Number Placeholder 3">
             <a:extLst>
               <a:ext uri="{FF2B5EF4-FFF2-40B4-BE49-F238E27FC236}">
-                <a16:creationId xmlns:a16="http://schemas.microsoft.com/office/drawing/2014/main" xmlns="" id="{2E8DA2EF-A6B0-4094-B638-5C0BABA0F1E5}"/>
+                <a16:creationId xmlns:a16="http://schemas.microsoft.com/office/drawing/2014/main" id="{2E8DA2EF-A6B0-4094-B638-5C0BABA0F1E5}"/>
               </a:ext>
             </a:extLst>
           </p:cNvPr>
@@ -10838,7 +11591,7 @@
           <p:cNvPr id="2" name="Title 1">
             <a:extLst>
               <a:ext uri="{FF2B5EF4-FFF2-40B4-BE49-F238E27FC236}">
-                <a16:creationId xmlns:a16="http://schemas.microsoft.com/office/drawing/2014/main" xmlns="" id="{48FF45B5-D5FA-460B-991C-2FA108E3A3F1}"/>
+                <a16:creationId xmlns:a16="http://schemas.microsoft.com/office/drawing/2014/main" id="{48FF45B5-D5FA-460B-991C-2FA108E3A3F1}"/>
               </a:ext>
             </a:extLst>
           </p:cNvPr>
@@ -10874,7 +11627,7 @@
           <p:cNvPr id="3" name="Content Placeholder 2">
             <a:extLst>
               <a:ext uri="{FF2B5EF4-FFF2-40B4-BE49-F238E27FC236}">
-                <a16:creationId xmlns:a16="http://schemas.microsoft.com/office/drawing/2014/main" xmlns="" id="{E78EFE23-8489-47D3-809F-724D797C3D7A}"/>
+                <a16:creationId xmlns:a16="http://schemas.microsoft.com/office/drawing/2014/main" id="{E78EFE23-8489-47D3-809F-724D797C3D7A}"/>
               </a:ext>
             </a:extLst>
           </p:cNvPr>
@@ -10939,7 +11692,7 @@
           <p:cNvPr id="4" name="Slide Number Placeholder 3">
             <a:extLst>
               <a:ext uri="{FF2B5EF4-FFF2-40B4-BE49-F238E27FC236}">
-                <a16:creationId xmlns:a16="http://schemas.microsoft.com/office/drawing/2014/main" xmlns="" id="{7DB99A5F-00D7-4971-A7FF-A69FAA2A03B7}"/>
+                <a16:creationId xmlns:a16="http://schemas.microsoft.com/office/drawing/2014/main" id="{7DB99A5F-00D7-4971-A7FF-A69FAA2A03B7}"/>
               </a:ext>
             </a:extLst>
           </p:cNvPr>
@@ -10999,7 +11752,7 @@
           <p:cNvPr id="2" name="Title 1">
             <a:extLst>
               <a:ext uri="{FF2B5EF4-FFF2-40B4-BE49-F238E27FC236}">
-                <a16:creationId xmlns:a16="http://schemas.microsoft.com/office/drawing/2014/main" xmlns="" id="{FAB11C2D-EE05-4A0B-8CD0-4ED2F65CAE8A}"/>
+                <a16:creationId xmlns:a16="http://schemas.microsoft.com/office/drawing/2014/main" id="{FAB11C2D-EE05-4A0B-8CD0-4ED2F65CAE8A}"/>
               </a:ext>
             </a:extLst>
           </p:cNvPr>
@@ -11027,7 +11780,7 @@
           <p:cNvPr id="3" name="Content Placeholder 2">
             <a:extLst>
               <a:ext uri="{FF2B5EF4-FFF2-40B4-BE49-F238E27FC236}">
-                <a16:creationId xmlns:a16="http://schemas.microsoft.com/office/drawing/2014/main" xmlns="" id="{76C92324-9BA2-4470-8199-AB38945929FA}"/>
+                <a16:creationId xmlns:a16="http://schemas.microsoft.com/office/drawing/2014/main" id="{76C92324-9BA2-4470-8199-AB38945929FA}"/>
               </a:ext>
             </a:extLst>
           </p:cNvPr>
@@ -11052,7 +11805,7 @@
           <p:cNvPr id="4" name="Slide Number Placeholder 3">
             <a:extLst>
               <a:ext uri="{FF2B5EF4-FFF2-40B4-BE49-F238E27FC236}">
-                <a16:creationId xmlns:a16="http://schemas.microsoft.com/office/drawing/2014/main" xmlns="" id="{20D3C6AF-E7A8-4C54-8F7F-CCCED9070700}"/>
+                <a16:creationId xmlns:a16="http://schemas.microsoft.com/office/drawing/2014/main" id="{20D3C6AF-E7A8-4C54-8F7F-CCCED9070700}"/>
               </a:ext>
             </a:extLst>
           </p:cNvPr>
@@ -11327,7 +12080,7 @@
   <a:extraClrSchemeLst/>
   <a:extLst>
     <a:ext uri="{05A4C25C-085E-4340-85A3-A5531E510DB2}">
-      <thm15:themeFamily xmlns:thm15="http://schemas.microsoft.com/office/thememl/2012/main" xmlns="" name="Wisp" id="{7CB32D59-10C0-40DD-B7BD-2E94284A981C}" vid="{24B1A44C-C006-48B2-A4D7-E5549B3D8CD4}"/>
+      <thm15:themeFamily xmlns:thm15="http://schemas.microsoft.com/office/thememl/2012/main" name="Wisp" id="{7CB32D59-10C0-40DD-B7BD-2E94284A981C}" vid="{24B1A44C-C006-48B2-A4D7-E5549B3D8CD4}"/>
     </a:ext>
   </a:extLst>
 </a:theme>
@@ -11622,7 +12375,7 @@
   <a:extraClrSchemeLst/>
   <a:extLst>
     <a:ext uri="{05A4C25C-085E-4340-85A3-A5531E510DB2}">
-      <thm15:themeFamily xmlns:thm15="http://schemas.microsoft.com/office/thememl/2012/main" xmlns="" name="Office Theme" id="{62F939B6-93AF-4DB8-9C6B-D6C7DFDC589F}" vid="{4A3C46E8-61CC-4603-A589-7422A47A8E4A}"/>
+      <thm15:themeFamily xmlns:thm15="http://schemas.microsoft.com/office/thememl/2012/main" name="Office Theme" id="{62F939B6-93AF-4DB8-9C6B-D6C7DFDC589F}" vid="{4A3C46E8-61CC-4603-A589-7422A47A8E4A}"/>
     </a:ext>
   </a:extLst>
 </a:theme>

</xml_diff>

<commit_message>
Rolled back Sprint01 Review Presentation
</commit_message>
<xml_diff>
--- a/Presentations/Sprint01 ReviewMeeting.pptx
+++ b/Presentations/Sprint01 ReviewMeeting.pptx
@@ -5,7 +5,7 @@
     <p:sldMasterId id="2147483648" r:id="rId1"/>
   </p:sldMasterIdLst>
   <p:notesMasterIdLst>
-    <p:notesMasterId r:id="rId26"/>
+    <p:notesMasterId r:id="rId29"/>
   </p:notesMasterIdLst>
   <p:sldIdLst>
     <p:sldId id="256" r:id="rId2"/>
@@ -23,15 +23,18 @@
     <p:sldId id="265" r:id="rId14"/>
     <p:sldId id="279" r:id="rId15"/>
     <p:sldId id="275" r:id="rId16"/>
-    <p:sldId id="266" r:id="rId17"/>
-    <p:sldId id="276" r:id="rId18"/>
-    <p:sldId id="269" r:id="rId19"/>
-    <p:sldId id="270" r:id="rId20"/>
-    <p:sldId id="267" r:id="rId21"/>
-    <p:sldId id="277" r:id="rId22"/>
-    <p:sldId id="268" r:id="rId23"/>
-    <p:sldId id="273" r:id="rId24"/>
-    <p:sldId id="278" r:id="rId25"/>
+    <p:sldId id="267" r:id="rId17"/>
+    <p:sldId id="280" r:id="rId18"/>
+    <p:sldId id="281" r:id="rId19"/>
+    <p:sldId id="276" r:id="rId20"/>
+    <p:sldId id="266" r:id="rId21"/>
+    <p:sldId id="269" r:id="rId22"/>
+    <p:sldId id="270" r:id="rId23"/>
+    <p:sldId id="282" r:id="rId24"/>
+    <p:sldId id="277" r:id="rId25"/>
+    <p:sldId id="268" r:id="rId26"/>
+    <p:sldId id="273" r:id="rId27"/>
+    <p:sldId id="278" r:id="rId28"/>
   </p:sldIdLst>
   <p:sldSz cx="12192000" cy="6858000"/>
   <p:notesSz cx="6858000" cy="9144000"/>
@@ -150,11 +153,14 @@
             <p14:sldId id="265"/>
             <p14:sldId id="279"/>
             <p14:sldId id="275"/>
+            <p14:sldId id="267"/>
+            <p14:sldId id="280"/>
+            <p14:sldId id="281"/>
+            <p14:sldId id="276"/>
             <p14:sldId id="266"/>
-            <p14:sldId id="276"/>
             <p14:sldId id="269"/>
             <p14:sldId id="270"/>
-            <p14:sldId id="267"/>
+            <p14:sldId id="282"/>
             <p14:sldId id="277"/>
             <p14:sldId id="268"/>
             <p14:sldId id="273"/>
@@ -162,6 +168,20 @@
           </p14:sldIdLst>
         </p14:section>
       </p14:sectionLst>
+    </p:ext>
+    <p:ext uri="{EFAFB233-063F-42B5-8137-9DF3F51BA10A}">
+      <p15:sldGuideLst xmlns:p15="http://schemas.microsoft.com/office/powerpoint/2012/main">
+        <p15:guide id="1" orient="horz" pos="2160">
+          <p15:clr>
+            <a:srgbClr val="A4A3A4"/>
+          </p15:clr>
+        </p15:guide>
+        <p15:guide id="2" pos="3840">
+          <p15:clr>
+            <a:srgbClr val="A4A3A4"/>
+          </p15:clr>
+        </p15:guide>
+      </p15:sldGuideLst>
     </p:ext>
   </p:extLst>
 </p:presentation>
@@ -282,7 +302,7 @@
           <a:p>
             <a:fld id="{19BF4C59-5F08-44C4-B153-33D13F8820E2}" type="datetimeFigureOut">
               <a:rPr lang="en-US" smtClean="0"/>
-              <a:t>11/27/2018</a:t>
+              <a:t>26/11/2018</a:t>
             </a:fld>
             <a:endParaRPr lang="en-US"/>
           </a:p>
@@ -737,7 +757,7 @@
           <a:p>
             <a:fld id="{F496603D-C74F-4091-A2D3-4695C477BDF9}" type="datetime1">
               <a:rPr lang="en-US" smtClean="0"/>
-              <a:t>11/27/2018</a:t>
+              <a:t>26/11/2018</a:t>
             </a:fld>
             <a:endParaRPr lang="en-US" dirty="0"/>
           </a:p>
@@ -1071,7 +1091,7 @@
           <a:p>
             <a:fld id="{59B7F04C-D88F-4E87-8405-047FE8998599}" type="datetime1">
               <a:rPr lang="en-US" smtClean="0"/>
-              <a:t>11/27/2018</a:t>
+              <a:t>26/11/2018</a:t>
             </a:fld>
             <a:endParaRPr lang="en-US" dirty="0"/>
           </a:p>
@@ -1468,7 +1488,7 @@
           <a:p>
             <a:fld id="{F53A2574-81AC-4C8C-9315-A798CBD15508}" type="datetime1">
               <a:rPr lang="en-US" smtClean="0"/>
-              <a:t>11/27/2018</a:t>
+              <a:t>26/11/2018</a:t>
             </a:fld>
             <a:endParaRPr lang="en-US" dirty="0"/>
           </a:p>
@@ -1800,7 +1820,7 @@
           <a:p>
             <a:fld id="{9F79353D-7D17-4E5D-B6AA-BEFF3E0E4AED}" type="datetime1">
               <a:rPr lang="en-US" smtClean="0"/>
-              <a:t>11/27/2018</a:t>
+              <a:t>26/11/2018</a:t>
             </a:fld>
             <a:endParaRPr lang="en-US" dirty="0"/>
           </a:p>
@@ -2116,7 +2136,7 @@
           <a:p>
             <a:fld id="{62E83889-C6FA-4794-A93A-78152215D16A}" type="datetime1">
               <a:rPr lang="en-US" smtClean="0"/>
-              <a:t>11/27/2018</a:t>
+              <a:t>26/11/2018</a:t>
             </a:fld>
             <a:endParaRPr lang="en-US" dirty="0"/>
           </a:p>
@@ -2508,7 +2528,7 @@
           <a:p>
             <a:fld id="{A0ED2F6D-E95C-4D36-9BBD-35E186A95236}" type="datetime1">
               <a:rPr lang="en-US" smtClean="0"/>
-              <a:t>11/27/2018</a:t>
+              <a:t>26/11/2018</a:t>
             </a:fld>
             <a:endParaRPr lang="en-US" dirty="0"/>
           </a:p>
@@ -2761,7 +2781,7 @@
           <a:p>
             <a:fld id="{3F053689-2F89-4CD8-BBCC-628181C06D6F}" type="datetime1">
               <a:rPr lang="en-US" smtClean="0"/>
-              <a:t>11/27/2018</a:t>
+              <a:t>26/11/2018</a:t>
             </a:fld>
             <a:endParaRPr lang="en-US" dirty="0"/>
           </a:p>
@@ -3019,7 +3039,7 @@
           <a:p>
             <a:fld id="{97B04EC7-3A70-4154-BE8C-716D5F7D393A}" type="datetime1">
               <a:rPr lang="en-US" smtClean="0"/>
-              <a:t>11/27/2018</a:t>
+              <a:t>26/11/2018</a:t>
             </a:fld>
             <a:endParaRPr lang="en-US" dirty="0"/>
           </a:p>
@@ -3277,7 +3297,7 @@
           <a:p>
             <a:fld id="{324BC052-11CD-4DCD-ACF1-8E2FFA6E860A}" type="datetime1">
               <a:rPr lang="en-US" smtClean="0"/>
-              <a:t>11/27/2018</a:t>
+              <a:t>26/11/2018</a:t>
             </a:fld>
             <a:endParaRPr lang="en-US" dirty="0"/>
           </a:p>
@@ -3602,7 +3622,7 @@
           <a:p>
             <a:fld id="{76C8D67C-A063-467C-BC65-C57E079F80F5}" type="datetime1">
               <a:rPr lang="en-US" smtClean="0"/>
-              <a:t>11/27/2018</a:t>
+              <a:t>26/11/2018</a:t>
             </a:fld>
             <a:endParaRPr lang="en-US" dirty="0"/>
           </a:p>
@@ -3921,7 +3941,7 @@
           <a:p>
             <a:fld id="{B9D1D154-EC59-400A-90AD-D66E129D1C81}" type="datetime1">
               <a:rPr lang="en-US" smtClean="0"/>
-              <a:t>11/27/2018</a:t>
+              <a:t>26/11/2018</a:t>
             </a:fld>
             <a:endParaRPr lang="en-US" dirty="0"/>
           </a:p>
@@ -4374,7 +4394,7 @@
           <a:p>
             <a:fld id="{1289DCF8-DDB3-4ED6-91C7-A41042BCCEC0}" type="datetime1">
               <a:rPr lang="en-US" smtClean="0"/>
-              <a:t>11/27/2018</a:t>
+              <a:t>26/11/2018</a:t>
             </a:fld>
             <a:endParaRPr lang="en-US" dirty="0"/>
           </a:p>
@@ -4575,7 +4595,7 @@
           <a:p>
             <a:fld id="{B7D66469-CA9A-4262-8925-C1B460FFD1FE}" type="datetime1">
               <a:rPr lang="en-US" smtClean="0"/>
-              <a:t>11/27/2018</a:t>
+              <a:t>26/11/2018</a:t>
             </a:fld>
             <a:endParaRPr lang="en-US" dirty="0"/>
           </a:p>
@@ -4748,7 +4768,7 @@
           <a:p>
             <a:fld id="{8FFB0B98-420B-4669-A38B-6EA24DD00E40}" type="datetime1">
               <a:rPr lang="en-US" smtClean="0"/>
-              <a:t>11/27/2018</a:t>
+              <a:t>26/11/2018</a:t>
             </a:fld>
             <a:endParaRPr lang="en-US" dirty="0"/>
           </a:p>
@@ -5077,7 +5097,7 @@
           <a:p>
             <a:fld id="{57A84040-A505-4603-8AF8-947AF9A8C6B0}" type="datetime1">
               <a:rPr lang="en-US" smtClean="0"/>
-              <a:t>11/27/2018</a:t>
+              <a:t>26/11/2018</a:t>
             </a:fld>
             <a:endParaRPr lang="en-US" dirty="0"/>
           </a:p>
@@ -5418,7 +5438,7 @@
           <a:p>
             <a:fld id="{C257B495-959E-4C32-9725-73949DB74722}" type="datetime1">
               <a:rPr lang="en-US" smtClean="0"/>
-              <a:t>11/27/2018</a:t>
+              <a:t>26/11/2018</a:t>
             </a:fld>
             <a:endParaRPr lang="en-US" dirty="0"/>
           </a:p>
@@ -7531,7 +7551,7 @@
           <a:p>
             <a:fld id="{FC130E8E-EE4B-4D52-BAF0-F4AA6E538D19}" type="datetime1">
               <a:rPr lang="en-US" smtClean="0"/>
-              <a:t>11/27/2018</a:t>
+              <a:t>26/11/2018</a:t>
             </a:fld>
             <a:endParaRPr lang="en-US" dirty="0"/>
           </a:p>
@@ -8051,7 +8071,7 @@
           <p:cNvPr id="2" name="Title 1">
             <a:extLst>
               <a:ext uri="{FF2B5EF4-FFF2-40B4-BE49-F238E27FC236}">
-                <a16:creationId xmlns="" xmlns:a16="http://schemas.microsoft.com/office/drawing/2014/main" id="{13E98B89-0AC8-4AF8-8E51-2CB8CB9E04D8}"/>
+                <a16:creationId xmlns:a16="http://schemas.microsoft.com/office/drawing/2014/main" id="{13E98B89-0AC8-4AF8-8E51-2CB8CB9E04D8}"/>
               </a:ext>
             </a:extLst>
           </p:cNvPr>
@@ -8079,7 +8099,7 @@
           <p:cNvPr id="3" name="Subtitle 2">
             <a:extLst>
               <a:ext uri="{FF2B5EF4-FFF2-40B4-BE49-F238E27FC236}">
-                <a16:creationId xmlns="" xmlns:a16="http://schemas.microsoft.com/office/drawing/2014/main" id="{9FD722E2-C498-4E60-B7CA-E3B851CB0315}"/>
+                <a16:creationId xmlns:a16="http://schemas.microsoft.com/office/drawing/2014/main" id="{9FD722E2-C498-4E60-B7CA-E3B851CB0315}"/>
               </a:ext>
             </a:extLst>
           </p:cNvPr>
@@ -8104,7 +8124,7 @@
           <p:cNvPr id="4" name="Slide Number Placeholder 3">
             <a:extLst>
               <a:ext uri="{FF2B5EF4-FFF2-40B4-BE49-F238E27FC236}">
-                <a16:creationId xmlns="" xmlns:a16="http://schemas.microsoft.com/office/drawing/2014/main" id="{B56306B9-7F0A-418D-8206-B5F8585FB3ED}"/>
+                <a16:creationId xmlns:a16="http://schemas.microsoft.com/office/drawing/2014/main" id="{B56306B9-7F0A-418D-8206-B5F8585FB3ED}"/>
               </a:ext>
             </a:extLst>
           </p:cNvPr>
@@ -8164,7 +8184,7 @@
           <p:cNvPr id="2" name="Title 1">
             <a:extLst>
               <a:ext uri="{FF2B5EF4-FFF2-40B4-BE49-F238E27FC236}">
-                <a16:creationId xmlns="" xmlns:a16="http://schemas.microsoft.com/office/drawing/2014/main" id="{499DD049-749B-4076-B464-014F8ADDE19C}"/>
+                <a16:creationId xmlns:a16="http://schemas.microsoft.com/office/drawing/2014/main" id="{499DD049-749B-4076-B464-014F8ADDE19C}"/>
               </a:ext>
             </a:extLst>
           </p:cNvPr>
@@ -8181,10 +8201,9 @@
           <a:lstStyle/>
           <a:p>
             <a:r>
-              <a:rPr lang="en-US" dirty="0" smtClean="0"/>
+              <a:rPr lang="en-US" dirty="0"/>
               <a:t>Problems in the beginning</a:t>
             </a:r>
-            <a:endParaRPr lang="en-US" dirty="0"/>
           </a:p>
         </p:txBody>
       </p:sp>
@@ -8193,7 +8212,7 @@
           <p:cNvPr id="3" name="Content Placeholder 2">
             <a:extLst>
               <a:ext uri="{FF2B5EF4-FFF2-40B4-BE49-F238E27FC236}">
-                <a16:creationId xmlns="" xmlns:a16="http://schemas.microsoft.com/office/drawing/2014/main" id="{01E73AF8-E079-4E3C-B6BD-0E836196367F}"/>
+                <a16:creationId xmlns:a16="http://schemas.microsoft.com/office/drawing/2014/main" id="{01E73AF8-E079-4E3C-B6BD-0E836196367F}"/>
               </a:ext>
             </a:extLst>
           </p:cNvPr>
@@ -8210,32 +8229,27 @@
           <a:lstStyle/>
           <a:p>
             <a:r>
-              <a:rPr lang="en-US" dirty="0" smtClean="0"/>
+              <a:rPr lang="en-US" dirty="0"/>
               <a:t>Started building without enough design work</a:t>
             </a:r>
           </a:p>
           <a:p>
             <a:r>
-              <a:rPr lang="en-US" dirty="0" smtClean="0"/>
+              <a:rPr lang="en-US" dirty="0"/>
               <a:t>Led to wasted time </a:t>
             </a:r>
           </a:p>
           <a:p>
             <a:r>
-              <a:rPr lang="en-US" dirty="0" smtClean="0"/>
-              <a:t>Refocus </a:t>
-            </a:r>
-            <a:r>
-              <a:rPr lang="en-US" dirty="0"/>
-              <a:t>at 1.5-2 weeks into sprint</a:t>
-            </a:r>
-          </a:p>
-          <a:p>
-            <a:r>
-              <a:rPr lang="en-US" dirty="0" smtClean="0"/>
+              <a:rPr lang="en-US" dirty="0"/>
+              <a:t>Refocus at 1.5-2 weeks into sprint</a:t>
+            </a:r>
+          </a:p>
+          <a:p>
+            <a:r>
+              <a:rPr lang="en-US" dirty="0"/>
               <a:t>Shifted focus to focus on core functionality must-haves</a:t>
             </a:r>
-            <a:endParaRPr lang="en-US" dirty="0"/>
           </a:p>
         </p:txBody>
       </p:sp>
@@ -8244,7 +8258,7 @@
           <p:cNvPr id="4" name="Slide Number Placeholder 3">
             <a:extLst>
               <a:ext uri="{FF2B5EF4-FFF2-40B4-BE49-F238E27FC236}">
-                <a16:creationId xmlns="" xmlns:a16="http://schemas.microsoft.com/office/drawing/2014/main" id="{F641D3F2-75C5-40F6-80C4-E394B00EBE2F}"/>
+                <a16:creationId xmlns:a16="http://schemas.microsoft.com/office/drawing/2014/main" id="{F641D3F2-75C5-40F6-80C4-E394B00EBE2F}"/>
               </a:ext>
             </a:extLst>
           </p:cNvPr>
@@ -8304,7 +8318,7 @@
           <p:cNvPr id="2" name="Title 1">
             <a:extLst>
               <a:ext uri="{FF2B5EF4-FFF2-40B4-BE49-F238E27FC236}">
-                <a16:creationId xmlns="" xmlns:a16="http://schemas.microsoft.com/office/drawing/2014/main" id="{E7B8949F-0B31-4A8B-88CD-BCF7FDCCDC8C}"/>
+                <a16:creationId xmlns:a16="http://schemas.microsoft.com/office/drawing/2014/main" id="{E7B8949F-0B31-4A8B-88CD-BCF7FDCCDC8C}"/>
               </a:ext>
             </a:extLst>
           </p:cNvPr>
@@ -8332,7 +8346,7 @@
           <p:cNvPr id="3" name="Content Placeholder 2">
             <a:extLst>
               <a:ext uri="{FF2B5EF4-FFF2-40B4-BE49-F238E27FC236}">
-                <a16:creationId xmlns="" xmlns:a16="http://schemas.microsoft.com/office/drawing/2014/main" id="{5018D8C8-31EA-4094-A891-253AAD5D26D8}"/>
+                <a16:creationId xmlns:a16="http://schemas.microsoft.com/office/drawing/2014/main" id="{5018D8C8-31EA-4094-A891-253AAD5D26D8}"/>
               </a:ext>
             </a:extLst>
           </p:cNvPr>
@@ -8357,7 +8371,7 @@
           <p:cNvPr id="4" name="Slide Number Placeholder 3">
             <a:extLst>
               <a:ext uri="{FF2B5EF4-FFF2-40B4-BE49-F238E27FC236}">
-                <a16:creationId xmlns="" xmlns:a16="http://schemas.microsoft.com/office/drawing/2014/main" id="{7DEE7B36-887B-4747-AD42-46A4BE37CE1D}"/>
+                <a16:creationId xmlns:a16="http://schemas.microsoft.com/office/drawing/2014/main" id="{7DEE7B36-887B-4747-AD42-46A4BE37CE1D}"/>
               </a:ext>
             </a:extLst>
           </p:cNvPr>
@@ -8417,7 +8431,7 @@
           <p:cNvPr id="2" name="Title 1">
             <a:extLst>
               <a:ext uri="{FF2B5EF4-FFF2-40B4-BE49-F238E27FC236}">
-                <a16:creationId xmlns="" xmlns:a16="http://schemas.microsoft.com/office/drawing/2014/main" id="{CF6EE8FB-D3EC-4DF0-BE35-2EAA1E9F1208}"/>
+                <a16:creationId xmlns:a16="http://schemas.microsoft.com/office/drawing/2014/main" id="{CF6EE8FB-D3EC-4DF0-BE35-2EAA1E9F1208}"/>
               </a:ext>
             </a:extLst>
           </p:cNvPr>
@@ -8445,7 +8459,7 @@
           <p:cNvPr id="3" name="Content Placeholder 2">
             <a:extLst>
               <a:ext uri="{FF2B5EF4-FFF2-40B4-BE49-F238E27FC236}">
-                <a16:creationId xmlns="" xmlns:a16="http://schemas.microsoft.com/office/drawing/2014/main" id="{65B46963-A67E-46F8-8ACF-E50284148EC5}"/>
+                <a16:creationId xmlns:a16="http://schemas.microsoft.com/office/drawing/2014/main" id="{65B46963-A67E-46F8-8ACF-E50284148EC5}"/>
               </a:ext>
             </a:extLst>
           </p:cNvPr>
@@ -8470,7 +8484,7 @@
           <p:cNvPr id="4" name="Slide Number Placeholder 3">
             <a:extLst>
               <a:ext uri="{FF2B5EF4-FFF2-40B4-BE49-F238E27FC236}">
-                <a16:creationId xmlns="" xmlns:a16="http://schemas.microsoft.com/office/drawing/2014/main" id="{4FAAFCB4-B201-4C0B-A29A-0D298A2342C1}"/>
+                <a16:creationId xmlns:a16="http://schemas.microsoft.com/office/drawing/2014/main" id="{4FAAFCB4-B201-4C0B-A29A-0D298A2342C1}"/>
               </a:ext>
             </a:extLst>
           </p:cNvPr>
@@ -8530,7 +8544,7 @@
           <p:cNvPr id="2" name="Title 1">
             <a:extLst>
               <a:ext uri="{FF2B5EF4-FFF2-40B4-BE49-F238E27FC236}">
-                <a16:creationId xmlns="" xmlns:a16="http://schemas.microsoft.com/office/drawing/2014/main" id="{E2708479-A9AB-4BF8-A44B-937AE89AEBFF}"/>
+                <a16:creationId xmlns:a16="http://schemas.microsoft.com/office/drawing/2014/main" id="{E2708479-A9AB-4BF8-A44B-937AE89AEBFF}"/>
               </a:ext>
             </a:extLst>
           </p:cNvPr>
@@ -8558,7 +8572,7 @@
           <p:cNvPr id="3" name="Content Placeholder 2">
             <a:extLst>
               <a:ext uri="{FF2B5EF4-FFF2-40B4-BE49-F238E27FC236}">
-                <a16:creationId xmlns="" xmlns:a16="http://schemas.microsoft.com/office/drawing/2014/main" id="{9B55791B-E2AF-4809-A81A-750947D90409}"/>
+                <a16:creationId xmlns:a16="http://schemas.microsoft.com/office/drawing/2014/main" id="{9B55791B-E2AF-4809-A81A-750947D90409}"/>
               </a:ext>
             </a:extLst>
           </p:cNvPr>
@@ -8575,31 +8589,31 @@
           <a:lstStyle/>
           <a:p>
             <a:r>
-              <a:rPr lang="en-US" dirty="0" smtClean="0"/>
+              <a:rPr lang="en-US" dirty="0"/>
               <a:t>Designed a UML style layout of our app navigation</a:t>
             </a:r>
           </a:p>
           <a:p>
             <a:r>
-              <a:rPr lang="en-US" dirty="0" smtClean="0"/>
+              <a:rPr lang="en-US" dirty="0"/>
               <a:t>Emphasis on need vs want</a:t>
             </a:r>
           </a:p>
           <a:p>
             <a:r>
-              <a:rPr lang="en-US" dirty="0" smtClean="0"/>
+              <a:rPr lang="en-US" dirty="0"/>
               <a:t>Grab bag of features</a:t>
             </a:r>
           </a:p>
           <a:p>
             <a:r>
-              <a:rPr lang="en-US" dirty="0" smtClean="0"/>
+              <a:rPr lang="en-US" dirty="0"/>
               <a:t>Accommodating user stories</a:t>
             </a:r>
           </a:p>
           <a:p>
             <a:r>
-              <a:rPr lang="en-US" dirty="0" smtClean="0"/>
+              <a:rPr lang="en-US" dirty="0"/>
               <a:t>Removed areas that weren’t justified by a user story</a:t>
             </a:r>
           </a:p>
@@ -8613,7 +8627,7 @@
           <p:cNvPr id="4" name="Slide Number Placeholder 3">
             <a:extLst>
               <a:ext uri="{FF2B5EF4-FFF2-40B4-BE49-F238E27FC236}">
-                <a16:creationId xmlns="" xmlns:a16="http://schemas.microsoft.com/office/drawing/2014/main" id="{25F31333-FA60-4DDE-860A-723484BDC712}"/>
+                <a16:creationId xmlns:a16="http://schemas.microsoft.com/office/drawing/2014/main" id="{25F31333-FA60-4DDE-860A-723484BDC712}"/>
               </a:ext>
             </a:extLst>
           </p:cNvPr>
@@ -8781,7 +8795,7 @@
           <p:cNvPr id="2" name="Title 1">
             <a:extLst>
               <a:ext uri="{FF2B5EF4-FFF2-40B4-BE49-F238E27FC236}">
-                <a16:creationId xmlns="" xmlns:a16="http://schemas.microsoft.com/office/drawing/2014/main" id="{D96EBD93-1E0F-4715-BA1C-4AB9A43FEEDE}"/>
+                <a16:creationId xmlns:a16="http://schemas.microsoft.com/office/drawing/2014/main" id="{D96EBD93-1E0F-4715-BA1C-4AB9A43FEEDE}"/>
               </a:ext>
             </a:extLst>
           </p:cNvPr>
@@ -8809,7 +8823,7 @@
           <p:cNvPr id="3" name="Content Placeholder 2">
             <a:extLst>
               <a:ext uri="{FF2B5EF4-FFF2-40B4-BE49-F238E27FC236}">
-                <a16:creationId xmlns="" xmlns:a16="http://schemas.microsoft.com/office/drawing/2014/main" id="{1DAF5560-583E-4CB6-A740-F6B3808FA9A7}"/>
+                <a16:creationId xmlns:a16="http://schemas.microsoft.com/office/drawing/2014/main" id="{1DAF5560-583E-4CB6-A740-F6B3808FA9A7}"/>
               </a:ext>
             </a:extLst>
           </p:cNvPr>
@@ -8834,7 +8848,7 @@
           <p:cNvPr id="4" name="Slide Number Placeholder 3">
             <a:extLst>
               <a:ext uri="{FF2B5EF4-FFF2-40B4-BE49-F238E27FC236}">
-                <a16:creationId xmlns="" xmlns:a16="http://schemas.microsoft.com/office/drawing/2014/main" id="{F2E49AE3-63D3-4DD3-818F-6E7B5C470582}"/>
+                <a16:creationId xmlns:a16="http://schemas.microsoft.com/office/drawing/2014/main" id="{F2E49AE3-63D3-4DD3-818F-6E7B5C470582}"/>
               </a:ext>
             </a:extLst>
           </p:cNvPr>
@@ -8894,7 +8908,7 @@
           <p:cNvPr id="2" name="Title 1">
             <a:extLst>
               <a:ext uri="{FF2B5EF4-FFF2-40B4-BE49-F238E27FC236}">
-                <a16:creationId xmlns="" xmlns:a16="http://schemas.microsoft.com/office/drawing/2014/main" id="{83DFF23D-959A-44BC-BE78-1D0330CDF164}"/>
+                <a16:creationId xmlns:a16="http://schemas.microsoft.com/office/drawing/2014/main" id="{F2AB9014-8A31-4680-8991-595A8A0A7749}"/>
               </a:ext>
             </a:extLst>
           </p:cNvPr>
@@ -8912,7 +8926,7 @@
           <a:p>
             <a:r>
               <a:rPr lang="en-US" dirty="0"/>
-              <a:t>Algorithm</a:t>
+              <a:t>Possible Cloud Hosts for Databases</a:t>
             </a:r>
           </a:p>
         </p:txBody>
@@ -8922,7 +8936,7 @@
           <p:cNvPr id="3" name="Content Placeholder 2">
             <a:extLst>
               <a:ext uri="{FF2B5EF4-FFF2-40B4-BE49-F238E27FC236}">
-                <a16:creationId xmlns="" xmlns:a16="http://schemas.microsoft.com/office/drawing/2014/main" id="{706A48C4-F2C9-48C7-B302-4ADE777DDB2E}"/>
+                <a16:creationId xmlns:a16="http://schemas.microsoft.com/office/drawing/2014/main" id="{943385D6-20E6-41CB-94E2-C41E10317A02}"/>
               </a:ext>
             </a:extLst>
           </p:cNvPr>
@@ -8933,12 +8947,105 @@
             <p:ph idx="1"/>
           </p:nvPr>
         </p:nvSpPr>
-        <p:spPr/>
-        <p:txBody>
-          <a:bodyPr/>
-          <a:lstStyle/>
-          <a:p>
-            <a:endParaRPr lang="en-US"/>
+        <p:spPr>
+          <a:xfrm>
+            <a:off x="2589212" y="1394012"/>
+            <a:ext cx="8915400" cy="4554069"/>
+          </a:xfrm>
+        </p:spPr>
+        <p:txBody>
+          <a:bodyPr>
+            <a:normAutofit/>
+          </a:bodyPr>
+          <a:lstStyle/>
+          <a:p>
+            <a:r>
+              <a:rPr lang="en-US" dirty="0"/>
+              <a:t>Amazon Web Services</a:t>
+            </a:r>
+          </a:p>
+          <a:p>
+            <a:pPr lvl="1"/>
+            <a:r>
+              <a:rPr lang="en-US" dirty="0"/>
+              <a:t>Pros</a:t>
+            </a:r>
+            <a:endParaRPr lang="en-US" sz="1400" dirty="0"/>
+          </a:p>
+          <a:p>
+            <a:pPr lvl="2"/>
+            <a:r>
+              <a:rPr lang="en-US" dirty="0"/>
+              <a:t>Free trial</a:t>
+            </a:r>
+            <a:endParaRPr lang="en-US" sz="1200" dirty="0"/>
+          </a:p>
+          <a:p>
+            <a:pPr lvl="2"/>
+            <a:r>
+              <a:rPr lang="en-US" dirty="0"/>
+              <a:t>Supports multiple database types</a:t>
+            </a:r>
+            <a:endParaRPr lang="en-US" sz="1200" dirty="0"/>
+          </a:p>
+          <a:p>
+            <a:pPr lvl="1"/>
+            <a:r>
+              <a:rPr lang="en-US" dirty="0"/>
+              <a:t>Cons</a:t>
+            </a:r>
+            <a:endParaRPr lang="en-US" sz="1400" dirty="0"/>
+          </a:p>
+          <a:p>
+            <a:pPr lvl="2"/>
+            <a:r>
+              <a:rPr lang="en-US" dirty="0"/>
+              <a:t>Difficult to learn</a:t>
+            </a:r>
+          </a:p>
+          <a:p>
+            <a:r>
+              <a:rPr lang="en-US" dirty="0"/>
+              <a:t>Microsoft Azure</a:t>
+            </a:r>
+          </a:p>
+          <a:p>
+            <a:pPr lvl="1"/>
+            <a:r>
+              <a:rPr lang="en-US" dirty="0"/>
+              <a:t>Pros</a:t>
+            </a:r>
+            <a:endParaRPr lang="en-US" sz="1400" dirty="0"/>
+          </a:p>
+          <a:p>
+            <a:pPr lvl="2"/>
+            <a:r>
+              <a:rPr lang="en-US" dirty="0"/>
+              <a:t>Free trial</a:t>
+            </a:r>
+            <a:endParaRPr lang="en-US" sz="1200" dirty="0"/>
+          </a:p>
+          <a:p>
+            <a:pPr lvl="1"/>
+            <a:r>
+              <a:rPr lang="en-US" dirty="0"/>
+              <a:t>Cons</a:t>
+            </a:r>
+            <a:endParaRPr lang="en-US" sz="1400" dirty="0"/>
+          </a:p>
+          <a:p>
+            <a:pPr lvl="2"/>
+            <a:r>
+              <a:rPr lang="en-US" dirty="0"/>
+              <a:t>Support issues</a:t>
+            </a:r>
+            <a:endParaRPr lang="en-US" sz="1200" dirty="0"/>
+          </a:p>
+          <a:p>
+            <a:pPr marL="0" indent="0">
+              <a:buNone/>
+            </a:pPr>
+            <a:endParaRPr lang="en-US" dirty="0"/>
           </a:p>
         </p:txBody>
       </p:sp>
@@ -8947,7 +9054,7 @@
           <p:cNvPr id="4" name="Slide Number Placeholder 3">
             <a:extLst>
               <a:ext uri="{FF2B5EF4-FFF2-40B4-BE49-F238E27FC236}">
-                <a16:creationId xmlns="" xmlns:a16="http://schemas.microsoft.com/office/drawing/2014/main" id="{8BA44F56-3ECD-42B0-A9A9-E5F99872401B}"/>
+                <a16:creationId xmlns:a16="http://schemas.microsoft.com/office/drawing/2014/main" id="{D85744C6-A06A-4F75-9D77-276BE5D6962F}"/>
               </a:ext>
             </a:extLst>
           </p:cNvPr>
@@ -8975,7 +9082,7 @@
     </p:spTree>
     <p:extLst>
       <p:ext uri="{BB962C8B-B14F-4D97-AF65-F5344CB8AC3E}">
-        <p14:creationId xmlns:p14="http://schemas.microsoft.com/office/powerpoint/2010/main" val="230190470"/>
+        <p14:creationId xmlns:p14="http://schemas.microsoft.com/office/powerpoint/2010/main" val="735481043"/>
       </p:ext>
     </p:extLst>
   </p:cSld>
@@ -9007,7 +9114,7 @@
           <p:cNvPr id="2" name="Title 1">
             <a:extLst>
               <a:ext uri="{FF2B5EF4-FFF2-40B4-BE49-F238E27FC236}">
-                <a16:creationId xmlns="" xmlns:a16="http://schemas.microsoft.com/office/drawing/2014/main" id="{4E96F21E-1AFE-4A04-8BD0-C88D1D2DA52C}"/>
+                <a16:creationId xmlns:a16="http://schemas.microsoft.com/office/drawing/2014/main" id="{F2AB9014-8A31-4680-8991-595A8A0A7749}"/>
               </a:ext>
             </a:extLst>
           </p:cNvPr>
@@ -9018,14 +9125,19 @@
             <p:ph type="title"/>
           </p:nvPr>
         </p:nvSpPr>
-        <p:spPr/>
-        <p:txBody>
-          <a:bodyPr/>
-          <a:lstStyle/>
-          <a:p>
-            <a:r>
-              <a:rPr lang="en-US" dirty="0"/>
-              <a:t>Questions?</a:t>
+        <p:spPr>
+          <a:xfrm>
+            <a:off x="2592925" y="624110"/>
+            <a:ext cx="9236004" cy="1280890"/>
+          </a:xfrm>
+        </p:spPr>
+        <p:txBody>
+          <a:bodyPr/>
+          <a:lstStyle/>
+          <a:p>
+            <a:r>
+              <a:rPr lang="en-US" dirty="0"/>
+              <a:t>Possible Cloud Hosts for Databases cont.</a:t>
             </a:r>
           </a:p>
         </p:txBody>
@@ -9035,7 +9147,7 @@
           <p:cNvPr id="3" name="Content Placeholder 2">
             <a:extLst>
               <a:ext uri="{FF2B5EF4-FFF2-40B4-BE49-F238E27FC236}">
-                <a16:creationId xmlns="" xmlns:a16="http://schemas.microsoft.com/office/drawing/2014/main" id="{C6D9C712-7144-4100-BCDB-F2CFAF7A1F31}"/>
+                <a16:creationId xmlns:a16="http://schemas.microsoft.com/office/drawing/2014/main" id="{943385D6-20E6-41CB-94E2-C41E10317A02}"/>
               </a:ext>
             </a:extLst>
           </p:cNvPr>
@@ -9046,12 +9158,136 @@
             <p:ph idx="1"/>
           </p:nvPr>
         </p:nvSpPr>
-        <p:spPr/>
-        <p:txBody>
-          <a:bodyPr/>
-          <a:lstStyle/>
-          <a:p>
-            <a:endParaRPr lang="en-US"/>
+        <p:spPr>
+          <a:xfrm>
+            <a:off x="2589212" y="1394012"/>
+            <a:ext cx="8915400" cy="5396753"/>
+          </a:xfrm>
+        </p:spPr>
+        <p:txBody>
+          <a:bodyPr>
+            <a:normAutofit fontScale="92500" lnSpcReduction="10000"/>
+          </a:bodyPr>
+          <a:lstStyle/>
+          <a:p>
+            <a:r>
+              <a:rPr lang="en-US" dirty="0"/>
+              <a:t>Rackspace Cloud</a:t>
+            </a:r>
+          </a:p>
+          <a:p>
+            <a:pPr lvl="1"/>
+            <a:r>
+              <a:rPr lang="en-US" dirty="0"/>
+              <a:t>Pros</a:t>
+            </a:r>
+            <a:endParaRPr lang="en-US" sz="1400" dirty="0"/>
+          </a:p>
+          <a:p>
+            <a:pPr lvl="2"/>
+            <a:r>
+              <a:rPr lang="en-US" dirty="0"/>
+              <a:t>Supports multiple database types</a:t>
+            </a:r>
+            <a:endParaRPr lang="en-US" sz="1200" dirty="0"/>
+          </a:p>
+          <a:p>
+            <a:pPr lvl="1"/>
+            <a:r>
+              <a:rPr lang="en-US" dirty="0"/>
+              <a:t>Cons</a:t>
+            </a:r>
+            <a:endParaRPr lang="en-US" sz="1400" dirty="0"/>
+          </a:p>
+          <a:p>
+            <a:pPr lvl="2"/>
+            <a:r>
+              <a:rPr lang="en-US" dirty="0"/>
+              <a:t>Low documentation</a:t>
+            </a:r>
+          </a:p>
+          <a:p>
+            <a:r>
+              <a:rPr lang="en-US" dirty="0"/>
+              <a:t>Oracle Database Cloud</a:t>
+            </a:r>
+          </a:p>
+          <a:p>
+            <a:pPr lvl="1"/>
+            <a:r>
+              <a:rPr lang="en-US" dirty="0"/>
+              <a:t>Pros</a:t>
+            </a:r>
+            <a:endParaRPr lang="en-US" sz="1400" dirty="0"/>
+          </a:p>
+          <a:p>
+            <a:pPr lvl="2"/>
+            <a:r>
+              <a:rPr lang="en-US" dirty="0"/>
+              <a:t>Easy maintenance</a:t>
+            </a:r>
+            <a:endParaRPr lang="en-US" sz="1200" dirty="0"/>
+          </a:p>
+          <a:p>
+            <a:pPr lvl="2"/>
+            <a:r>
+              <a:rPr lang="en-US" dirty="0"/>
+              <a:t>Secure encryption</a:t>
+            </a:r>
+            <a:endParaRPr lang="en-US" sz="1200" dirty="0"/>
+          </a:p>
+          <a:p>
+            <a:pPr lvl="1"/>
+            <a:r>
+              <a:rPr lang="en-US" dirty="0"/>
+              <a:t>Cons</a:t>
+            </a:r>
+            <a:endParaRPr lang="en-US" sz="1400" dirty="0"/>
+          </a:p>
+          <a:p>
+            <a:pPr lvl="2"/>
+            <a:r>
+              <a:rPr lang="en-US" dirty="0"/>
+              <a:t>Support issues</a:t>
+            </a:r>
+          </a:p>
+          <a:p>
+            <a:r>
+              <a:rPr lang="en-US" dirty="0"/>
+              <a:t>SAP Cloud Platform</a:t>
+            </a:r>
+          </a:p>
+          <a:p>
+            <a:pPr lvl="1"/>
+            <a:r>
+              <a:rPr lang="en-US" dirty="0"/>
+              <a:t>Pros</a:t>
+            </a:r>
+            <a:endParaRPr lang="en-US" sz="1400" dirty="0"/>
+          </a:p>
+          <a:p>
+            <a:pPr lvl="2"/>
+            <a:r>
+              <a:rPr lang="en-US" dirty="0"/>
+              <a:t>Free trial</a:t>
+            </a:r>
+            <a:endParaRPr lang="en-US" sz="1200" dirty="0"/>
+          </a:p>
+          <a:p>
+            <a:pPr lvl="1"/>
+            <a:r>
+              <a:rPr lang="en-US" dirty="0"/>
+              <a:t>Cons</a:t>
+            </a:r>
+            <a:endParaRPr lang="en-US" sz="1400" dirty="0"/>
+          </a:p>
+          <a:p>
+            <a:pPr lvl="2"/>
+            <a:r>
+              <a:rPr lang="en-US" dirty="0"/>
+              <a:t>Expensive</a:t>
+            </a:r>
+            <a:endParaRPr lang="en-US" sz="1200" dirty="0"/>
           </a:p>
         </p:txBody>
       </p:sp>
@@ -9060,7 +9296,7 @@
           <p:cNvPr id="4" name="Slide Number Placeholder 3">
             <a:extLst>
               <a:ext uri="{FF2B5EF4-FFF2-40B4-BE49-F238E27FC236}">
-                <a16:creationId xmlns="" xmlns:a16="http://schemas.microsoft.com/office/drawing/2014/main" id="{ABDB7F91-3EE4-476A-9661-1648C797CBD1}"/>
+                <a16:creationId xmlns:a16="http://schemas.microsoft.com/office/drawing/2014/main" id="{D85744C6-A06A-4F75-9D77-276BE5D6962F}"/>
               </a:ext>
             </a:extLst>
           </p:cNvPr>
@@ -9088,7 +9324,7 @@
     </p:spTree>
     <p:extLst>
       <p:ext uri="{BB962C8B-B14F-4D97-AF65-F5344CB8AC3E}">
-        <p14:creationId xmlns:p14="http://schemas.microsoft.com/office/powerpoint/2010/main" val="1700607014"/>
+        <p14:creationId xmlns:p14="http://schemas.microsoft.com/office/powerpoint/2010/main" val="2279213441"/>
       </p:ext>
     </p:extLst>
   </p:cSld>
@@ -9120,7 +9356,7 @@
           <p:cNvPr id="2" name="Title 1">
             <a:extLst>
               <a:ext uri="{FF2B5EF4-FFF2-40B4-BE49-F238E27FC236}">
-                <a16:creationId xmlns="" xmlns:a16="http://schemas.microsoft.com/office/drawing/2014/main" id="{1183D399-4942-4C83-BF24-B436160EB419}"/>
+                <a16:creationId xmlns:a16="http://schemas.microsoft.com/office/drawing/2014/main" id="{FB48C855-54F0-48EC-A7CC-6354BCB305D5}"/>
               </a:ext>
             </a:extLst>
           </p:cNvPr>
@@ -9138,7 +9374,7 @@
           <a:p>
             <a:r>
               <a:rPr lang="en-US" dirty="0"/>
-              <a:t>Sensors</a:t>
+              <a:t>Chosen Database</a:t>
             </a:r>
           </a:p>
         </p:txBody>
@@ -9148,7 +9384,7 @@
           <p:cNvPr id="3" name="Content Placeholder 2">
             <a:extLst>
               <a:ext uri="{FF2B5EF4-FFF2-40B4-BE49-F238E27FC236}">
-                <a16:creationId xmlns="" xmlns:a16="http://schemas.microsoft.com/office/drawing/2014/main" id="{0DD74EA9-167B-4010-AF9E-BA2A7445C522}"/>
+                <a16:creationId xmlns:a16="http://schemas.microsoft.com/office/drawing/2014/main" id="{182AB522-2226-4EFD-823D-D450755C3706}"/>
               </a:ext>
             </a:extLst>
           </p:cNvPr>
@@ -9164,7 +9400,37 @@
           <a:bodyPr/>
           <a:lstStyle/>
           <a:p>
-            <a:endParaRPr lang="en-US"/>
+            <a:r>
+              <a:rPr lang="en-US" dirty="0"/>
+              <a:t>Azure SQL Database</a:t>
+            </a:r>
+          </a:p>
+          <a:p>
+            <a:endParaRPr lang="en-US" dirty="0"/>
+          </a:p>
+          <a:p>
+            <a:r>
+              <a:rPr lang="en-US" dirty="0"/>
+              <a:t>Free trial gives 250GB of storage on cloud</a:t>
+            </a:r>
+          </a:p>
+          <a:p>
+            <a:r>
+              <a:rPr lang="en-US" dirty="0"/>
+              <a:t>Shares same codebase with SQL Server</a:t>
+            </a:r>
+          </a:p>
+          <a:p>
+            <a:endParaRPr lang="en-US" dirty="0"/>
+          </a:p>
+          <a:p>
+            <a:endParaRPr lang="en-US" dirty="0"/>
+          </a:p>
+          <a:p>
+            <a:r>
+              <a:rPr lang="en-US" dirty="0"/>
+              <a:t>Prefer cloud as users could literally be anywhere</a:t>
+            </a:r>
           </a:p>
         </p:txBody>
       </p:sp>
@@ -9173,7 +9439,7 @@
           <p:cNvPr id="4" name="Slide Number Placeholder 3">
             <a:extLst>
               <a:ext uri="{FF2B5EF4-FFF2-40B4-BE49-F238E27FC236}">
-                <a16:creationId xmlns="" xmlns:a16="http://schemas.microsoft.com/office/drawing/2014/main" id="{54E49C07-2ECF-4660-8582-3A662CD53904}"/>
+                <a16:creationId xmlns:a16="http://schemas.microsoft.com/office/drawing/2014/main" id="{67A54C74-446F-4283-A614-DCD1E307638E}"/>
               </a:ext>
             </a:extLst>
           </p:cNvPr>
@@ -9201,7 +9467,7 @@
     </p:spTree>
     <p:extLst>
       <p:ext uri="{BB962C8B-B14F-4D97-AF65-F5344CB8AC3E}">
-        <p14:creationId xmlns:p14="http://schemas.microsoft.com/office/powerpoint/2010/main" val="3652658612"/>
+        <p14:creationId xmlns:p14="http://schemas.microsoft.com/office/powerpoint/2010/main" val="1065244771"/>
       </p:ext>
     </p:extLst>
   </p:cSld>
@@ -9233,7 +9499,7 @@
           <p:cNvPr id="2" name="Title 1">
             <a:extLst>
               <a:ext uri="{FF2B5EF4-FFF2-40B4-BE49-F238E27FC236}">
-                <a16:creationId xmlns="" xmlns:a16="http://schemas.microsoft.com/office/drawing/2014/main" id="{AB1A53DB-70FB-432D-BCAF-DCFBCCE6B023}"/>
+                <a16:creationId xmlns:a16="http://schemas.microsoft.com/office/drawing/2014/main" id="{4E96F21E-1AFE-4A04-8BD0-C88D1D2DA52C}"/>
               </a:ext>
             </a:extLst>
           </p:cNvPr>
@@ -9250,12 +9516,8 @@
           <a:lstStyle/>
           <a:p>
             <a:r>
-              <a:rPr lang="en-US" dirty="0" err="1"/>
-              <a:t>MapBox</a:t>
-            </a:r>
-            <a:r>
-              <a:rPr lang="en-US" dirty="0"/>
-              <a:t> API</a:t>
+              <a:rPr lang="en-US" dirty="0"/>
+              <a:t>Questions?</a:t>
             </a:r>
           </a:p>
         </p:txBody>
@@ -9265,7 +9527,7 @@
           <p:cNvPr id="3" name="Content Placeholder 2">
             <a:extLst>
               <a:ext uri="{FF2B5EF4-FFF2-40B4-BE49-F238E27FC236}">
-                <a16:creationId xmlns="" xmlns:a16="http://schemas.microsoft.com/office/drawing/2014/main" id="{A6866161-0CFB-4603-9213-EC107AF2D1E8}"/>
+                <a16:creationId xmlns:a16="http://schemas.microsoft.com/office/drawing/2014/main" id="{C6D9C712-7144-4100-BCDB-F2CFAF7A1F31}"/>
               </a:ext>
             </a:extLst>
           </p:cNvPr>
@@ -9278,70 +9540,10 @@
         </p:nvSpPr>
         <p:spPr/>
         <p:txBody>
-          <a:bodyPr>
-            <a:normAutofit/>
-          </a:bodyPr>
-          <a:lstStyle/>
-          <a:p>
-            <a:r>
-              <a:rPr lang="en-US" dirty="0" smtClean="0"/>
-              <a:t>Dove into documentation</a:t>
-            </a:r>
-          </a:p>
-          <a:p>
-            <a:r>
-              <a:rPr lang="en-US" dirty="0" smtClean="0"/>
-              <a:t>Used our acquired key to interact with the API</a:t>
-            </a:r>
-          </a:p>
-          <a:p>
-            <a:r>
-              <a:rPr lang="en-US" dirty="0" smtClean="0"/>
-              <a:t>Implemented drawing a map</a:t>
-            </a:r>
-          </a:p>
-          <a:p>
-            <a:r>
-              <a:rPr lang="en-US" dirty="0" smtClean="0"/>
-              <a:t>Current points are arbitrary, but easily modified to reflect points produced by algorithm </a:t>
-            </a:r>
-          </a:p>
-          <a:p>
-            <a:r>
-              <a:rPr lang="en-US" dirty="0" smtClean="0"/>
-              <a:t>Currently working on:</a:t>
-            </a:r>
-          </a:p>
-          <a:p>
-            <a:pPr lvl="1"/>
-            <a:r>
-              <a:rPr lang="en-US" dirty="0" smtClean="0"/>
-              <a:t>Refining large map into a rectangular shaped map in direction phone is pointing</a:t>
-            </a:r>
-          </a:p>
-          <a:p>
-            <a:pPr lvl="1"/>
-            <a:r>
-              <a:rPr lang="en-US" dirty="0" smtClean="0"/>
-              <a:t>Drawing markers for landmarks in refined map</a:t>
-            </a:r>
-          </a:p>
-          <a:p>
-            <a:pPr lvl="1"/>
-            <a:r>
-              <a:rPr lang="en-US" dirty="0" smtClean="0"/>
-              <a:t>Drawing custom markers (custom landmark locations)</a:t>
-            </a:r>
-          </a:p>
-          <a:p>
-            <a:pPr lvl="1"/>
-            <a:r>
-              <a:rPr lang="en-US" dirty="0" smtClean="0"/>
-              <a:t>Retrieving location data from refined map</a:t>
-            </a:r>
-          </a:p>
-          <a:p>
-            <a:endParaRPr lang="en-US" dirty="0"/>
+          <a:bodyPr/>
+          <a:lstStyle/>
+          <a:p>
+            <a:endParaRPr lang="en-US"/>
           </a:p>
         </p:txBody>
       </p:sp>
@@ -9350,7 +9552,7 @@
           <p:cNvPr id="4" name="Slide Number Placeholder 3">
             <a:extLst>
               <a:ext uri="{FF2B5EF4-FFF2-40B4-BE49-F238E27FC236}">
-                <a16:creationId xmlns="" xmlns:a16="http://schemas.microsoft.com/office/drawing/2014/main" id="{46B07E3D-35B9-4761-9561-21093A66968A}"/>
+                <a16:creationId xmlns:a16="http://schemas.microsoft.com/office/drawing/2014/main" id="{ABDB7F91-3EE4-476A-9661-1648C797CBD1}"/>
               </a:ext>
             </a:extLst>
           </p:cNvPr>
@@ -9378,7 +9580,7 @@
     </p:spTree>
     <p:extLst>
       <p:ext uri="{BB962C8B-B14F-4D97-AF65-F5344CB8AC3E}">
-        <p14:creationId xmlns:p14="http://schemas.microsoft.com/office/powerpoint/2010/main" val="3591823853"/>
+        <p14:creationId xmlns:p14="http://schemas.microsoft.com/office/powerpoint/2010/main" val="1700607014"/>
       </p:ext>
     </p:extLst>
   </p:cSld>
@@ -9410,7 +9612,7 @@
           <p:cNvPr id="2" name="Title 1">
             <a:extLst>
               <a:ext uri="{FF2B5EF4-FFF2-40B4-BE49-F238E27FC236}">
-                <a16:creationId xmlns="" xmlns:a16="http://schemas.microsoft.com/office/drawing/2014/main" id="{A9659006-5658-41C1-A6C3-449E86D35AC0}"/>
+                <a16:creationId xmlns:a16="http://schemas.microsoft.com/office/drawing/2014/main" id="{A9659006-5658-41C1-A6C3-449E86D35AC0}"/>
               </a:ext>
             </a:extLst>
           </p:cNvPr>
@@ -9438,7 +9640,7 @@
           <p:cNvPr id="3" name="Content Placeholder 2">
             <a:extLst>
               <a:ext uri="{FF2B5EF4-FFF2-40B4-BE49-F238E27FC236}">
-                <a16:creationId xmlns="" xmlns:a16="http://schemas.microsoft.com/office/drawing/2014/main" id="{73DD2599-6704-444D-B198-A61017C68022}"/>
+                <a16:creationId xmlns:a16="http://schemas.microsoft.com/office/drawing/2014/main" id="{73DD2599-6704-444D-B198-A61017C68022}"/>
               </a:ext>
             </a:extLst>
           </p:cNvPr>
@@ -9456,48 +9658,8 @@
           <a:p>
             <a:r>
               <a:rPr lang="en-US" dirty="0"/>
-              <a:t>Kickstart development on Landmarked Core Functionality and supporting technologies for future development</a:t>
-            </a:r>
-            <a:r>
-              <a:rPr lang="en-US" dirty="0" smtClean="0"/>
-              <a:t>.</a:t>
-            </a:r>
-          </a:p>
-          <a:p>
-            <a:r>
-              <a:rPr lang="en-US" dirty="0" smtClean="0"/>
-              <a:t>Develop an algorithm that will get coordinates for drawing our maps</a:t>
-            </a:r>
-          </a:p>
-          <a:p>
-            <a:r>
-              <a:rPr lang="en-US" dirty="0" smtClean="0"/>
-              <a:t>Design a GUI around our user stories</a:t>
-            </a:r>
-            <a:endParaRPr lang="en-US" dirty="0"/>
-          </a:p>
-          <a:p>
-            <a:r>
-              <a:rPr lang="en-US" dirty="0" smtClean="0"/>
-              <a:t>Configure </a:t>
-            </a:r>
-            <a:r>
-              <a:rPr lang="en-US" dirty="0" err="1" smtClean="0"/>
-              <a:t>Mapbox</a:t>
-            </a:r>
-            <a:r>
-              <a:rPr lang="en-US" dirty="0" smtClean="0"/>
-              <a:t> API</a:t>
-            </a:r>
-          </a:p>
-          <a:p>
-            <a:r>
-              <a:rPr lang="en-US" dirty="0" smtClean="0"/>
-              <a:t>Retrieve data from hardware sensors</a:t>
-            </a:r>
-          </a:p>
-          <a:p>
-            <a:endParaRPr lang="en-US" dirty="0" smtClean="0"/>
+              <a:t>Kickstart development on Landmarked Core Functionality and supporting technologies for future development.</a:t>
+            </a:r>
           </a:p>
         </p:txBody>
       </p:sp>
@@ -9506,7 +9668,7 @@
           <p:cNvPr id="4" name="Slide Number Placeholder 3">
             <a:extLst>
               <a:ext uri="{FF2B5EF4-FFF2-40B4-BE49-F238E27FC236}">
-                <a16:creationId xmlns="" xmlns:a16="http://schemas.microsoft.com/office/drawing/2014/main" id="{1648D571-E13E-4175-B1E8-3DF13ABB935A}"/>
+                <a16:creationId xmlns:a16="http://schemas.microsoft.com/office/drawing/2014/main" id="{1648D571-E13E-4175-B1E8-3DF13ABB935A}"/>
               </a:ext>
             </a:extLst>
           </p:cNvPr>
@@ -9566,7 +9728,7 @@
           <p:cNvPr id="2" name="Title 1">
             <a:extLst>
               <a:ext uri="{FF2B5EF4-FFF2-40B4-BE49-F238E27FC236}">
-                <a16:creationId xmlns="" xmlns:a16="http://schemas.microsoft.com/office/drawing/2014/main" id="{F2AB9014-8A31-4680-8991-595A8A0A7749}"/>
+                <a16:creationId xmlns:a16="http://schemas.microsoft.com/office/drawing/2014/main" id="{83DFF23D-959A-44BC-BE78-1D0330CDF164}"/>
               </a:ext>
             </a:extLst>
           </p:cNvPr>
@@ -9584,7 +9746,7 @@
           <a:p>
             <a:r>
               <a:rPr lang="en-US" dirty="0"/>
-              <a:t>Database</a:t>
+              <a:t>Algorithm</a:t>
             </a:r>
           </a:p>
         </p:txBody>
@@ -9594,7 +9756,7 @@
           <p:cNvPr id="3" name="Content Placeholder 2">
             <a:extLst>
               <a:ext uri="{FF2B5EF4-FFF2-40B4-BE49-F238E27FC236}">
-                <a16:creationId xmlns="" xmlns:a16="http://schemas.microsoft.com/office/drawing/2014/main" id="{943385D6-20E6-41CB-94E2-C41E10317A02}"/>
+                <a16:creationId xmlns:a16="http://schemas.microsoft.com/office/drawing/2014/main" id="{706A48C4-F2C9-48C7-B302-4ADE777DDB2E}"/>
               </a:ext>
             </a:extLst>
           </p:cNvPr>
@@ -9605,12 +9767,103 @@
             <p:ph idx="1"/>
           </p:nvPr>
         </p:nvSpPr>
-        <p:spPr/>
-        <p:txBody>
-          <a:bodyPr/>
-          <a:lstStyle/>
-          <a:p>
-            <a:endParaRPr lang="en-US"/>
+        <p:spPr>
+          <a:xfrm>
+            <a:off x="2589212" y="1752599"/>
+            <a:ext cx="8915400" cy="4285129"/>
+          </a:xfrm>
+        </p:spPr>
+        <p:txBody>
+          <a:bodyPr>
+            <a:normAutofit/>
+          </a:bodyPr>
+          <a:lstStyle/>
+          <a:p>
+            <a:r>
+              <a:rPr lang="en-US" dirty="0"/>
+              <a:t>Get relevant sensor information</a:t>
+            </a:r>
+          </a:p>
+          <a:p>
+            <a:pPr lvl="1"/>
+            <a:r>
+              <a:rPr lang="en-US" dirty="0"/>
+              <a:t>Get elevation </a:t>
+            </a:r>
+          </a:p>
+          <a:p>
+            <a:pPr lvl="1"/>
+            <a:r>
+              <a:rPr lang="en-US" dirty="0"/>
+              <a:t>Get location</a:t>
+            </a:r>
+          </a:p>
+          <a:p>
+            <a:pPr lvl="1"/>
+            <a:r>
+              <a:rPr lang="en-US" dirty="0"/>
+              <a:t>Get orientation</a:t>
+            </a:r>
+          </a:p>
+          <a:p>
+            <a:r>
+              <a:rPr lang="en-US" dirty="0"/>
+              <a:t>Find landmarks in orientation</a:t>
+            </a:r>
+          </a:p>
+          <a:p>
+            <a:pPr lvl="1"/>
+            <a:r>
+              <a:rPr lang="en-US" dirty="0"/>
+              <a:t>Find Line of Sight (</a:t>
+            </a:r>
+            <a:r>
+              <a:rPr lang="en-US" dirty="0" err="1"/>
+              <a:t>LoS</a:t>
+            </a:r>
+            <a:r>
+              <a:rPr lang="en-US" dirty="0"/>
+              <a:t>) by numerical method</a:t>
+            </a:r>
+          </a:p>
+          <a:p>
+            <a:pPr lvl="1"/>
+            <a:r>
+              <a:rPr lang="en-US" dirty="0"/>
+              <a:t>Find landmarks between location and </a:t>
+            </a:r>
+            <a:r>
+              <a:rPr lang="en-US" dirty="0" err="1"/>
+              <a:t>LoS</a:t>
+            </a:r>
+            <a:endParaRPr lang="en-US" dirty="0"/>
+          </a:p>
+          <a:p>
+            <a:pPr lvl="1"/>
+            <a:r>
+              <a:rPr lang="en-US" dirty="0"/>
+              <a:t>Output landmarks to user</a:t>
+            </a:r>
+          </a:p>
+          <a:p>
+            <a:pPr lvl="1"/>
+            <a:r>
+              <a:rPr lang="en-US" dirty="0"/>
+              <a:t>Allow user to select landmark </a:t>
+            </a:r>
+          </a:p>
+          <a:p>
+            <a:pPr lvl="1"/>
+            <a:r>
+              <a:rPr lang="en-US" dirty="0"/>
+              <a:t>Pull information about landmark</a:t>
+            </a:r>
+          </a:p>
+          <a:p>
+            <a:r>
+              <a:rPr lang="en-US" dirty="0"/>
+              <a:t>Find distance between current location and landmark</a:t>
+            </a:r>
           </a:p>
         </p:txBody>
       </p:sp>
@@ -9619,7 +9872,7 @@
           <p:cNvPr id="4" name="Slide Number Placeholder 3">
             <a:extLst>
               <a:ext uri="{FF2B5EF4-FFF2-40B4-BE49-F238E27FC236}">
-                <a16:creationId xmlns="" xmlns:a16="http://schemas.microsoft.com/office/drawing/2014/main" id="{D85744C6-A06A-4F75-9D77-276BE5D6962F}"/>
+                <a16:creationId xmlns:a16="http://schemas.microsoft.com/office/drawing/2014/main" id="{8BA44F56-3ECD-42B0-A9A9-E5F99872401B}"/>
               </a:ext>
             </a:extLst>
           </p:cNvPr>
@@ -9647,7 +9900,7 @@
     </p:spTree>
     <p:extLst>
       <p:ext uri="{BB962C8B-B14F-4D97-AF65-F5344CB8AC3E}">
-        <p14:creationId xmlns:p14="http://schemas.microsoft.com/office/powerpoint/2010/main" val="735481043"/>
+        <p14:creationId xmlns:p14="http://schemas.microsoft.com/office/powerpoint/2010/main" val="230190470"/>
       </p:ext>
     </p:extLst>
   </p:cSld>
@@ -9679,7 +9932,7 @@
           <p:cNvPr id="2" name="Title 1">
             <a:extLst>
               <a:ext uri="{FF2B5EF4-FFF2-40B4-BE49-F238E27FC236}">
-                <a16:creationId xmlns="" xmlns:a16="http://schemas.microsoft.com/office/drawing/2014/main" id="{E745B5BA-CEC8-422E-982B-F8BC98723754}"/>
+                <a16:creationId xmlns:a16="http://schemas.microsoft.com/office/drawing/2014/main" id="{1183D399-4942-4C83-BF24-B436160EB419}"/>
               </a:ext>
             </a:extLst>
           </p:cNvPr>
@@ -9697,7 +9950,7 @@
           <a:p>
             <a:r>
               <a:rPr lang="en-US" dirty="0"/>
-              <a:t>Questions?</a:t>
+              <a:t>Sensors</a:t>
             </a:r>
           </a:p>
         </p:txBody>
@@ -9707,7 +9960,7 @@
           <p:cNvPr id="3" name="Content Placeholder 2">
             <a:extLst>
               <a:ext uri="{FF2B5EF4-FFF2-40B4-BE49-F238E27FC236}">
-                <a16:creationId xmlns="" xmlns:a16="http://schemas.microsoft.com/office/drawing/2014/main" id="{737908CF-DFCF-479E-B76A-2140E612B90F}"/>
+                <a16:creationId xmlns:a16="http://schemas.microsoft.com/office/drawing/2014/main" id="{0DD74EA9-167B-4010-AF9E-BA2A7445C522}"/>
               </a:ext>
             </a:extLst>
           </p:cNvPr>
@@ -9718,12 +9971,96 @@
             <p:ph idx="1"/>
           </p:nvPr>
         </p:nvSpPr>
-        <p:spPr/>
-        <p:txBody>
-          <a:bodyPr/>
-          <a:lstStyle/>
-          <a:p>
-            <a:endParaRPr lang="en-US"/>
+        <p:spPr>
+          <a:xfrm>
+            <a:off x="2589212" y="1564344"/>
+            <a:ext cx="8915400" cy="4509244"/>
+          </a:xfrm>
+        </p:spPr>
+        <p:txBody>
+          <a:bodyPr/>
+          <a:lstStyle/>
+          <a:p>
+            <a:r>
+              <a:rPr lang="en-US" dirty="0"/>
+              <a:t>Accelerometer and Magnetometer</a:t>
+            </a:r>
+          </a:p>
+          <a:p>
+            <a:pPr lvl="1"/>
+            <a:r>
+              <a:rPr lang="en-US" dirty="0"/>
+              <a:t>Used to calculate the orientation of the phone</a:t>
+            </a:r>
+          </a:p>
+          <a:p>
+            <a:pPr lvl="1"/>
+            <a:r>
+              <a:rPr lang="en-US" dirty="0"/>
+              <a:t>Gives access to:</a:t>
+            </a:r>
+          </a:p>
+          <a:p>
+            <a:pPr lvl="2"/>
+            <a:r>
+              <a:rPr lang="en-US" dirty="0"/>
+              <a:t>Azimuth</a:t>
+            </a:r>
+          </a:p>
+          <a:p>
+            <a:pPr lvl="2"/>
+            <a:r>
+              <a:rPr lang="en-US" dirty="0"/>
+              <a:t>Pitch</a:t>
+            </a:r>
+          </a:p>
+          <a:p>
+            <a:pPr lvl="2"/>
+            <a:r>
+              <a:rPr lang="en-US" dirty="0"/>
+              <a:t>Roll</a:t>
+            </a:r>
+          </a:p>
+          <a:p>
+            <a:r>
+              <a:rPr lang="en-US" dirty="0"/>
+              <a:t>GPS</a:t>
+            </a:r>
+          </a:p>
+          <a:p>
+            <a:pPr lvl="1"/>
+            <a:r>
+              <a:rPr lang="en-US" dirty="0"/>
+              <a:t>Requires explicit user permission</a:t>
+            </a:r>
+          </a:p>
+          <a:p>
+            <a:pPr lvl="1"/>
+            <a:r>
+              <a:rPr lang="en-US" dirty="0"/>
+              <a:t>Gives access to:</a:t>
+            </a:r>
+          </a:p>
+          <a:p>
+            <a:pPr lvl="2"/>
+            <a:r>
+              <a:rPr lang="en-US" dirty="0"/>
+              <a:t>Latitude</a:t>
+            </a:r>
+          </a:p>
+          <a:p>
+            <a:pPr lvl="2"/>
+            <a:r>
+              <a:rPr lang="en-US" dirty="0"/>
+              <a:t>Longitude</a:t>
+            </a:r>
+          </a:p>
+          <a:p>
+            <a:pPr lvl="2"/>
+            <a:r>
+              <a:rPr lang="en-US" dirty="0"/>
+              <a:t>Elevation</a:t>
+            </a:r>
           </a:p>
         </p:txBody>
       </p:sp>
@@ -9732,7 +10069,7 @@
           <p:cNvPr id="4" name="Slide Number Placeholder 3">
             <a:extLst>
               <a:ext uri="{FF2B5EF4-FFF2-40B4-BE49-F238E27FC236}">
-                <a16:creationId xmlns="" xmlns:a16="http://schemas.microsoft.com/office/drawing/2014/main" id="{DF8C3242-F7F3-4B6D-BE97-C08D1A7EC84D}"/>
+                <a16:creationId xmlns:a16="http://schemas.microsoft.com/office/drawing/2014/main" id="{54E49C07-2ECF-4660-8582-3A662CD53904}"/>
               </a:ext>
             </a:extLst>
           </p:cNvPr>
@@ -9760,7 +10097,7 @@
     </p:spTree>
     <p:extLst>
       <p:ext uri="{BB962C8B-B14F-4D97-AF65-F5344CB8AC3E}">
-        <p14:creationId xmlns:p14="http://schemas.microsoft.com/office/powerpoint/2010/main" val="1587191523"/>
+        <p14:creationId xmlns:p14="http://schemas.microsoft.com/office/powerpoint/2010/main" val="3652658612"/>
       </p:ext>
     </p:extLst>
   </p:cSld>
@@ -9792,7 +10129,7 @@
           <p:cNvPr id="2" name="Title 1">
             <a:extLst>
               <a:ext uri="{FF2B5EF4-FFF2-40B4-BE49-F238E27FC236}">
-                <a16:creationId xmlns="" xmlns:a16="http://schemas.microsoft.com/office/drawing/2014/main" id="{0925D358-7D77-482A-BA62-AF4AAB8E726F}"/>
+                <a16:creationId xmlns:a16="http://schemas.microsoft.com/office/drawing/2014/main" id="{AB1A53DB-70FB-432D-BCAF-DCFBCCE6B023}"/>
               </a:ext>
             </a:extLst>
           </p:cNvPr>
@@ -9809,8 +10146,12 @@
           <a:lstStyle/>
           <a:p>
             <a:r>
-              <a:rPr lang="en-US" dirty="0"/>
-              <a:t>Unofficial Sprint</a:t>
+              <a:rPr lang="en-US" dirty="0" err="1"/>
+              <a:t>MapBox</a:t>
+            </a:r>
+            <a:r>
+              <a:rPr lang="en-US" dirty="0"/>
+              <a:t> API</a:t>
             </a:r>
           </a:p>
         </p:txBody>
@@ -9820,7 +10161,7 @@
           <p:cNvPr id="3" name="Content Placeholder 2">
             <a:extLst>
               <a:ext uri="{FF2B5EF4-FFF2-40B4-BE49-F238E27FC236}">
-                <a16:creationId xmlns="" xmlns:a16="http://schemas.microsoft.com/office/drawing/2014/main" id="{6A41BCA7-F42D-4C14-9EE3-C0604BD1C8ED}"/>
+                <a16:creationId xmlns:a16="http://schemas.microsoft.com/office/drawing/2014/main" id="{A6866161-0CFB-4603-9213-EC107AF2D1E8}"/>
               </a:ext>
             </a:extLst>
           </p:cNvPr>
@@ -9833,10 +10174,70 @@
         </p:nvSpPr>
         <p:spPr/>
         <p:txBody>
-          <a:bodyPr/>
-          <a:lstStyle/>
-          <a:p>
-            <a:endParaRPr lang="en-US"/>
+          <a:bodyPr>
+            <a:normAutofit/>
+          </a:bodyPr>
+          <a:lstStyle/>
+          <a:p>
+            <a:r>
+              <a:rPr lang="en-US" dirty="0"/>
+              <a:t>Dove into documentation</a:t>
+            </a:r>
+          </a:p>
+          <a:p>
+            <a:r>
+              <a:rPr lang="en-US" dirty="0"/>
+              <a:t>Used our acquired key to interact with the API</a:t>
+            </a:r>
+          </a:p>
+          <a:p>
+            <a:r>
+              <a:rPr lang="en-US" dirty="0"/>
+              <a:t>Implemented drawing a map</a:t>
+            </a:r>
+          </a:p>
+          <a:p>
+            <a:r>
+              <a:rPr lang="en-US" dirty="0"/>
+              <a:t>Current points are arbitrary, but easily modified to reflect points produced by algorithm </a:t>
+            </a:r>
+          </a:p>
+          <a:p>
+            <a:r>
+              <a:rPr lang="en-US" dirty="0"/>
+              <a:t>Currently working on:</a:t>
+            </a:r>
+          </a:p>
+          <a:p>
+            <a:pPr lvl="1"/>
+            <a:r>
+              <a:rPr lang="en-US" dirty="0"/>
+              <a:t>Refining large map into a rectangular shaped map in direction phone is pointing</a:t>
+            </a:r>
+          </a:p>
+          <a:p>
+            <a:pPr lvl="1"/>
+            <a:r>
+              <a:rPr lang="en-US" dirty="0"/>
+              <a:t>Drawing markers for landmarks in refined map</a:t>
+            </a:r>
+          </a:p>
+          <a:p>
+            <a:pPr lvl="1"/>
+            <a:r>
+              <a:rPr lang="en-US" dirty="0"/>
+              <a:t>Drawing custom markers (custom landmark locations)</a:t>
+            </a:r>
+          </a:p>
+          <a:p>
+            <a:pPr lvl="1"/>
+            <a:r>
+              <a:rPr lang="en-US" dirty="0"/>
+              <a:t>Retrieving location data from refined map</a:t>
+            </a:r>
+          </a:p>
+          <a:p>
+            <a:endParaRPr lang="en-US" dirty="0"/>
           </a:p>
         </p:txBody>
       </p:sp>
@@ -9845,7 +10246,7 @@
           <p:cNvPr id="4" name="Slide Number Placeholder 3">
             <a:extLst>
               <a:ext uri="{FF2B5EF4-FFF2-40B4-BE49-F238E27FC236}">
-                <a16:creationId xmlns="" xmlns:a16="http://schemas.microsoft.com/office/drawing/2014/main" id="{BB4882C3-32B5-455C-9E1C-9DBFC4D3EA7C}"/>
+                <a16:creationId xmlns:a16="http://schemas.microsoft.com/office/drawing/2014/main" id="{46B07E3D-35B9-4761-9561-21093A66968A}"/>
               </a:ext>
             </a:extLst>
           </p:cNvPr>
@@ -9873,7 +10274,7 @@
     </p:spTree>
     <p:extLst>
       <p:ext uri="{BB962C8B-B14F-4D97-AF65-F5344CB8AC3E}">
-        <p14:creationId xmlns:p14="http://schemas.microsoft.com/office/powerpoint/2010/main" val="4099954266"/>
+        <p14:creationId xmlns:p14="http://schemas.microsoft.com/office/powerpoint/2010/main" val="3591823853"/>
       </p:ext>
     </p:extLst>
   </p:cSld>
@@ -9905,7 +10306,7 @@
           <p:cNvPr id="2" name="Title 1">
             <a:extLst>
               <a:ext uri="{FF2B5EF4-FFF2-40B4-BE49-F238E27FC236}">
-                <a16:creationId xmlns="" xmlns:a16="http://schemas.microsoft.com/office/drawing/2014/main" id="{AD0AB5FE-C138-421F-92EE-1844FDF7256A}"/>
+                <a16:creationId xmlns:a16="http://schemas.microsoft.com/office/drawing/2014/main" id="{0B3AFE50-BDBE-4AED-81A7-0DF1A0F76CDF}"/>
               </a:ext>
             </a:extLst>
           </p:cNvPr>
@@ -9923,7 +10324,7 @@
           <a:p>
             <a:r>
               <a:rPr lang="en-US" dirty="0"/>
-              <a:t>Sprint 2</a:t>
+              <a:t>DEMO TIME</a:t>
             </a:r>
           </a:p>
         </p:txBody>
@@ -9933,7 +10334,7 @@
           <p:cNvPr id="3" name="Content Placeholder 2">
             <a:extLst>
               <a:ext uri="{FF2B5EF4-FFF2-40B4-BE49-F238E27FC236}">
-                <a16:creationId xmlns="" xmlns:a16="http://schemas.microsoft.com/office/drawing/2014/main" id="{903C4FAD-1519-4538-BD82-6A08BE138CB6}"/>
+                <a16:creationId xmlns:a16="http://schemas.microsoft.com/office/drawing/2014/main" id="{80DD7C09-83AA-465B-95B7-B255B8FBA959}"/>
               </a:ext>
             </a:extLst>
           </p:cNvPr>
@@ -9958,7 +10359,7 @@
           <p:cNvPr id="4" name="Slide Number Placeholder 3">
             <a:extLst>
               <a:ext uri="{FF2B5EF4-FFF2-40B4-BE49-F238E27FC236}">
-                <a16:creationId xmlns="" xmlns:a16="http://schemas.microsoft.com/office/drawing/2014/main" id="{2D0C1AF0-2A5F-49B5-B744-94150C0B7BD5}"/>
+                <a16:creationId xmlns:a16="http://schemas.microsoft.com/office/drawing/2014/main" id="{AE31E36E-89F5-4BF3-9156-8D604472F1CC}"/>
               </a:ext>
             </a:extLst>
           </p:cNvPr>
@@ -9986,7 +10387,7 @@
     </p:spTree>
     <p:extLst>
       <p:ext uri="{BB962C8B-B14F-4D97-AF65-F5344CB8AC3E}">
-        <p14:creationId xmlns:p14="http://schemas.microsoft.com/office/powerpoint/2010/main" val="632679123"/>
+        <p14:creationId xmlns:p14="http://schemas.microsoft.com/office/powerpoint/2010/main" val="4021183166"/>
       </p:ext>
     </p:extLst>
   </p:cSld>
@@ -10018,7 +10419,7 @@
           <p:cNvPr id="2" name="Title 1">
             <a:extLst>
               <a:ext uri="{FF2B5EF4-FFF2-40B4-BE49-F238E27FC236}">
-                <a16:creationId xmlns="" xmlns:a16="http://schemas.microsoft.com/office/drawing/2014/main" id="{5DE1D604-AE0D-4070-84FA-E88517FF5DFF}"/>
+                <a16:creationId xmlns:a16="http://schemas.microsoft.com/office/drawing/2014/main" id="{E745B5BA-CEC8-422E-982B-F8BC98723754}"/>
               </a:ext>
             </a:extLst>
           </p:cNvPr>
@@ -10035,7 +10436,7 @@
           <a:lstStyle/>
           <a:p>
             <a:r>
-              <a:rPr lang="en-US"/>
+              <a:rPr lang="en-US" dirty="0"/>
               <a:t>Questions?</a:t>
             </a:r>
           </a:p>
@@ -10046,7 +10447,7 @@
           <p:cNvPr id="3" name="Content Placeholder 2">
             <a:extLst>
               <a:ext uri="{FF2B5EF4-FFF2-40B4-BE49-F238E27FC236}">
-                <a16:creationId xmlns="" xmlns:a16="http://schemas.microsoft.com/office/drawing/2014/main" id="{E38BF89C-DFBF-421E-A964-AE3C9E1FC370}"/>
+                <a16:creationId xmlns:a16="http://schemas.microsoft.com/office/drawing/2014/main" id="{737908CF-DFCF-479E-B76A-2140E612B90F}"/>
               </a:ext>
             </a:extLst>
           </p:cNvPr>
@@ -10071,7 +10472,7 @@
           <p:cNvPr id="4" name="Slide Number Placeholder 3">
             <a:extLst>
               <a:ext uri="{FF2B5EF4-FFF2-40B4-BE49-F238E27FC236}">
-                <a16:creationId xmlns="" xmlns:a16="http://schemas.microsoft.com/office/drawing/2014/main" id="{6DD83CE4-B7F7-4E5E-9EA9-93BC3E139089}"/>
+                <a16:creationId xmlns:a16="http://schemas.microsoft.com/office/drawing/2014/main" id="{DF8C3242-F7F3-4B6D-BE97-C08D1A7EC84D}"/>
               </a:ext>
             </a:extLst>
           </p:cNvPr>
@@ -10091,6 +10492,345 @@
               <a:rPr lang="en-US" smtClean="0"/>
               <a:pPr/>
               <a:t>24</a:t>
+            </a:fld>
+            <a:endParaRPr lang="en-US" dirty="0"/>
+          </a:p>
+        </p:txBody>
+      </p:sp>
+    </p:spTree>
+    <p:extLst>
+      <p:ext uri="{BB962C8B-B14F-4D97-AF65-F5344CB8AC3E}">
+        <p14:creationId xmlns:p14="http://schemas.microsoft.com/office/powerpoint/2010/main" val="1587191523"/>
+      </p:ext>
+    </p:extLst>
+  </p:cSld>
+  <p:clrMapOvr>
+    <a:masterClrMapping/>
+  </p:clrMapOvr>
+</p:sld>
+</file>
+
+<file path=ppt/slides/slide25.xml><?xml version="1.0" encoding="utf-8"?>
+<p:sld xmlns:a="http://schemas.openxmlformats.org/drawingml/2006/main" xmlns:r="http://schemas.openxmlformats.org/officeDocument/2006/relationships" xmlns:p="http://schemas.openxmlformats.org/presentationml/2006/main">
+  <p:cSld>
+    <p:spTree>
+      <p:nvGrpSpPr>
+        <p:cNvPr id="1" name=""/>
+        <p:cNvGrpSpPr/>
+        <p:nvPr/>
+      </p:nvGrpSpPr>
+      <p:grpSpPr>
+        <a:xfrm>
+          <a:off x="0" y="0"/>
+          <a:ext cx="0" cy="0"/>
+          <a:chOff x="0" y="0"/>
+          <a:chExt cx="0" cy="0"/>
+        </a:xfrm>
+      </p:grpSpPr>
+      <p:sp>
+        <p:nvSpPr>
+          <p:cNvPr id="2" name="Title 1">
+            <a:extLst>
+              <a:ext uri="{FF2B5EF4-FFF2-40B4-BE49-F238E27FC236}">
+                <a16:creationId xmlns:a16="http://schemas.microsoft.com/office/drawing/2014/main" id="{0925D358-7D77-482A-BA62-AF4AAB8E726F}"/>
+              </a:ext>
+            </a:extLst>
+          </p:cNvPr>
+          <p:cNvSpPr>
+            <a:spLocks noGrp="1"/>
+          </p:cNvSpPr>
+          <p:nvPr>
+            <p:ph type="title"/>
+          </p:nvPr>
+        </p:nvSpPr>
+        <p:spPr/>
+        <p:txBody>
+          <a:bodyPr/>
+          <a:lstStyle/>
+          <a:p>
+            <a:r>
+              <a:rPr lang="en-US" dirty="0"/>
+              <a:t>Unofficial Sprint</a:t>
+            </a:r>
+          </a:p>
+        </p:txBody>
+      </p:sp>
+      <p:sp>
+        <p:nvSpPr>
+          <p:cNvPr id="3" name="Content Placeholder 2">
+            <a:extLst>
+              <a:ext uri="{FF2B5EF4-FFF2-40B4-BE49-F238E27FC236}">
+                <a16:creationId xmlns:a16="http://schemas.microsoft.com/office/drawing/2014/main" id="{6A41BCA7-F42D-4C14-9EE3-C0604BD1C8ED}"/>
+              </a:ext>
+            </a:extLst>
+          </p:cNvPr>
+          <p:cNvSpPr>
+            <a:spLocks noGrp="1"/>
+          </p:cNvSpPr>
+          <p:nvPr>
+            <p:ph idx="1"/>
+          </p:nvPr>
+        </p:nvSpPr>
+        <p:spPr/>
+        <p:txBody>
+          <a:bodyPr/>
+          <a:lstStyle/>
+          <a:p>
+            <a:endParaRPr lang="en-US"/>
+          </a:p>
+        </p:txBody>
+      </p:sp>
+      <p:sp>
+        <p:nvSpPr>
+          <p:cNvPr id="4" name="Slide Number Placeholder 3">
+            <a:extLst>
+              <a:ext uri="{FF2B5EF4-FFF2-40B4-BE49-F238E27FC236}">
+                <a16:creationId xmlns:a16="http://schemas.microsoft.com/office/drawing/2014/main" id="{BB4882C3-32B5-455C-9E1C-9DBFC4D3EA7C}"/>
+              </a:ext>
+            </a:extLst>
+          </p:cNvPr>
+          <p:cNvSpPr>
+            <a:spLocks noGrp="1"/>
+          </p:cNvSpPr>
+          <p:nvPr>
+            <p:ph type="sldNum" sz="quarter" idx="12"/>
+          </p:nvPr>
+        </p:nvSpPr>
+        <p:spPr/>
+        <p:txBody>
+          <a:bodyPr/>
+          <a:lstStyle/>
+          <a:p>
+            <a:fld id="{D57F1E4F-1CFF-5643-939E-217C01CDF565}" type="slidenum">
+              <a:rPr lang="en-US" smtClean="0"/>
+              <a:pPr/>
+              <a:t>25</a:t>
+            </a:fld>
+            <a:endParaRPr lang="en-US" dirty="0"/>
+          </a:p>
+        </p:txBody>
+      </p:sp>
+    </p:spTree>
+    <p:extLst>
+      <p:ext uri="{BB962C8B-B14F-4D97-AF65-F5344CB8AC3E}">
+        <p14:creationId xmlns:p14="http://schemas.microsoft.com/office/powerpoint/2010/main" val="4099954266"/>
+      </p:ext>
+    </p:extLst>
+  </p:cSld>
+  <p:clrMapOvr>
+    <a:masterClrMapping/>
+  </p:clrMapOvr>
+</p:sld>
+</file>
+
+<file path=ppt/slides/slide26.xml><?xml version="1.0" encoding="utf-8"?>
+<p:sld xmlns:a="http://schemas.openxmlformats.org/drawingml/2006/main" xmlns:r="http://schemas.openxmlformats.org/officeDocument/2006/relationships" xmlns:p="http://schemas.openxmlformats.org/presentationml/2006/main">
+  <p:cSld>
+    <p:spTree>
+      <p:nvGrpSpPr>
+        <p:cNvPr id="1" name=""/>
+        <p:cNvGrpSpPr/>
+        <p:nvPr/>
+      </p:nvGrpSpPr>
+      <p:grpSpPr>
+        <a:xfrm>
+          <a:off x="0" y="0"/>
+          <a:ext cx="0" cy="0"/>
+          <a:chOff x="0" y="0"/>
+          <a:chExt cx="0" cy="0"/>
+        </a:xfrm>
+      </p:grpSpPr>
+      <p:sp>
+        <p:nvSpPr>
+          <p:cNvPr id="2" name="Title 1">
+            <a:extLst>
+              <a:ext uri="{FF2B5EF4-FFF2-40B4-BE49-F238E27FC236}">
+                <a16:creationId xmlns:a16="http://schemas.microsoft.com/office/drawing/2014/main" id="{AD0AB5FE-C138-421F-92EE-1844FDF7256A}"/>
+              </a:ext>
+            </a:extLst>
+          </p:cNvPr>
+          <p:cNvSpPr>
+            <a:spLocks noGrp="1"/>
+          </p:cNvSpPr>
+          <p:nvPr>
+            <p:ph type="title"/>
+          </p:nvPr>
+        </p:nvSpPr>
+        <p:spPr/>
+        <p:txBody>
+          <a:bodyPr/>
+          <a:lstStyle/>
+          <a:p>
+            <a:r>
+              <a:rPr lang="en-US" dirty="0"/>
+              <a:t>Sprint 2</a:t>
+            </a:r>
+          </a:p>
+        </p:txBody>
+      </p:sp>
+      <p:sp>
+        <p:nvSpPr>
+          <p:cNvPr id="3" name="Content Placeholder 2">
+            <a:extLst>
+              <a:ext uri="{FF2B5EF4-FFF2-40B4-BE49-F238E27FC236}">
+                <a16:creationId xmlns:a16="http://schemas.microsoft.com/office/drawing/2014/main" id="{903C4FAD-1519-4538-BD82-6A08BE138CB6}"/>
+              </a:ext>
+            </a:extLst>
+          </p:cNvPr>
+          <p:cNvSpPr>
+            <a:spLocks noGrp="1"/>
+          </p:cNvSpPr>
+          <p:nvPr>
+            <p:ph idx="1"/>
+          </p:nvPr>
+        </p:nvSpPr>
+        <p:spPr/>
+        <p:txBody>
+          <a:bodyPr/>
+          <a:lstStyle/>
+          <a:p>
+            <a:endParaRPr lang="en-US"/>
+          </a:p>
+        </p:txBody>
+      </p:sp>
+      <p:sp>
+        <p:nvSpPr>
+          <p:cNvPr id="4" name="Slide Number Placeholder 3">
+            <a:extLst>
+              <a:ext uri="{FF2B5EF4-FFF2-40B4-BE49-F238E27FC236}">
+                <a16:creationId xmlns:a16="http://schemas.microsoft.com/office/drawing/2014/main" id="{2D0C1AF0-2A5F-49B5-B744-94150C0B7BD5}"/>
+              </a:ext>
+            </a:extLst>
+          </p:cNvPr>
+          <p:cNvSpPr>
+            <a:spLocks noGrp="1"/>
+          </p:cNvSpPr>
+          <p:nvPr>
+            <p:ph type="sldNum" sz="quarter" idx="12"/>
+          </p:nvPr>
+        </p:nvSpPr>
+        <p:spPr/>
+        <p:txBody>
+          <a:bodyPr/>
+          <a:lstStyle/>
+          <a:p>
+            <a:fld id="{D57F1E4F-1CFF-5643-939E-217C01CDF565}" type="slidenum">
+              <a:rPr lang="en-US" smtClean="0"/>
+              <a:pPr/>
+              <a:t>26</a:t>
+            </a:fld>
+            <a:endParaRPr lang="en-US" dirty="0"/>
+          </a:p>
+        </p:txBody>
+      </p:sp>
+    </p:spTree>
+    <p:extLst>
+      <p:ext uri="{BB962C8B-B14F-4D97-AF65-F5344CB8AC3E}">
+        <p14:creationId xmlns:p14="http://schemas.microsoft.com/office/powerpoint/2010/main" val="632679123"/>
+      </p:ext>
+    </p:extLst>
+  </p:cSld>
+  <p:clrMapOvr>
+    <a:masterClrMapping/>
+  </p:clrMapOvr>
+</p:sld>
+</file>
+
+<file path=ppt/slides/slide27.xml><?xml version="1.0" encoding="utf-8"?>
+<p:sld xmlns:a="http://schemas.openxmlformats.org/drawingml/2006/main" xmlns:r="http://schemas.openxmlformats.org/officeDocument/2006/relationships" xmlns:p="http://schemas.openxmlformats.org/presentationml/2006/main">
+  <p:cSld>
+    <p:spTree>
+      <p:nvGrpSpPr>
+        <p:cNvPr id="1" name=""/>
+        <p:cNvGrpSpPr/>
+        <p:nvPr/>
+      </p:nvGrpSpPr>
+      <p:grpSpPr>
+        <a:xfrm>
+          <a:off x="0" y="0"/>
+          <a:ext cx="0" cy="0"/>
+          <a:chOff x="0" y="0"/>
+          <a:chExt cx="0" cy="0"/>
+        </a:xfrm>
+      </p:grpSpPr>
+      <p:sp>
+        <p:nvSpPr>
+          <p:cNvPr id="2" name="Title 1">
+            <a:extLst>
+              <a:ext uri="{FF2B5EF4-FFF2-40B4-BE49-F238E27FC236}">
+                <a16:creationId xmlns:a16="http://schemas.microsoft.com/office/drawing/2014/main" id="{5DE1D604-AE0D-4070-84FA-E88517FF5DFF}"/>
+              </a:ext>
+            </a:extLst>
+          </p:cNvPr>
+          <p:cNvSpPr>
+            <a:spLocks noGrp="1"/>
+          </p:cNvSpPr>
+          <p:nvPr>
+            <p:ph type="title"/>
+          </p:nvPr>
+        </p:nvSpPr>
+        <p:spPr/>
+        <p:txBody>
+          <a:bodyPr/>
+          <a:lstStyle/>
+          <a:p>
+            <a:r>
+              <a:rPr lang="en-US"/>
+              <a:t>Questions?</a:t>
+            </a:r>
+          </a:p>
+        </p:txBody>
+      </p:sp>
+      <p:sp>
+        <p:nvSpPr>
+          <p:cNvPr id="3" name="Content Placeholder 2">
+            <a:extLst>
+              <a:ext uri="{FF2B5EF4-FFF2-40B4-BE49-F238E27FC236}">
+                <a16:creationId xmlns:a16="http://schemas.microsoft.com/office/drawing/2014/main" id="{E38BF89C-DFBF-421E-A964-AE3C9E1FC370}"/>
+              </a:ext>
+            </a:extLst>
+          </p:cNvPr>
+          <p:cNvSpPr>
+            <a:spLocks noGrp="1"/>
+          </p:cNvSpPr>
+          <p:nvPr>
+            <p:ph idx="1"/>
+          </p:nvPr>
+        </p:nvSpPr>
+        <p:spPr/>
+        <p:txBody>
+          <a:bodyPr/>
+          <a:lstStyle/>
+          <a:p>
+            <a:endParaRPr lang="en-US"/>
+          </a:p>
+        </p:txBody>
+      </p:sp>
+      <p:sp>
+        <p:nvSpPr>
+          <p:cNvPr id="4" name="Slide Number Placeholder 3">
+            <a:extLst>
+              <a:ext uri="{FF2B5EF4-FFF2-40B4-BE49-F238E27FC236}">
+                <a16:creationId xmlns:a16="http://schemas.microsoft.com/office/drawing/2014/main" id="{6DD83CE4-B7F7-4E5E-9EA9-93BC3E139089}"/>
+              </a:ext>
+            </a:extLst>
+          </p:cNvPr>
+          <p:cNvSpPr>
+            <a:spLocks noGrp="1"/>
+          </p:cNvSpPr>
+          <p:nvPr>
+            <p:ph type="sldNum" sz="quarter" idx="12"/>
+          </p:nvPr>
+        </p:nvSpPr>
+        <p:spPr/>
+        <p:txBody>
+          <a:bodyPr/>
+          <a:lstStyle/>
+          <a:p>
+            <a:fld id="{D57F1E4F-1CFF-5643-939E-217C01CDF565}" type="slidenum">
+              <a:rPr lang="en-US" smtClean="0"/>
+              <a:pPr/>
+              <a:t>27</a:t>
             </a:fld>
             <a:endParaRPr lang="en-US" dirty="0"/>
           </a:p>
@@ -10131,7 +10871,7 @@
           <p:cNvPr id="2" name="Title 1">
             <a:extLst>
               <a:ext uri="{FF2B5EF4-FFF2-40B4-BE49-F238E27FC236}">
-                <a16:creationId xmlns="" xmlns:a16="http://schemas.microsoft.com/office/drawing/2014/main" id="{F2D35386-6553-4F40-B13E-39127AE27598}"/>
+                <a16:creationId xmlns:a16="http://schemas.microsoft.com/office/drawing/2014/main" id="{F2D35386-6553-4F40-B13E-39127AE27598}"/>
               </a:ext>
             </a:extLst>
           </p:cNvPr>
@@ -10159,7 +10899,7 @@
           <p:cNvPr id="3" name="Content Placeholder 2">
             <a:extLst>
               <a:ext uri="{FF2B5EF4-FFF2-40B4-BE49-F238E27FC236}">
-                <a16:creationId xmlns="" xmlns:a16="http://schemas.microsoft.com/office/drawing/2014/main" id="{B215CA30-6357-4A93-9C6E-ABDCF65F48B0}"/>
+                <a16:creationId xmlns:a16="http://schemas.microsoft.com/office/drawing/2014/main" id="{B215CA30-6357-4A93-9C6E-ABDCF65F48B0}"/>
               </a:ext>
             </a:extLst>
           </p:cNvPr>
@@ -10240,7 +10980,7 @@
           <p:cNvPr id="4" name="Slide Number Placeholder 3">
             <a:extLst>
               <a:ext uri="{FF2B5EF4-FFF2-40B4-BE49-F238E27FC236}">
-                <a16:creationId xmlns="" xmlns:a16="http://schemas.microsoft.com/office/drawing/2014/main" id="{367A8BEF-7F6E-4089-833F-9809F9A867A4}"/>
+                <a16:creationId xmlns:a16="http://schemas.microsoft.com/office/drawing/2014/main" id="{367A8BEF-7F6E-4089-833F-9809F9A867A4}"/>
               </a:ext>
             </a:extLst>
           </p:cNvPr>
@@ -10300,7 +11040,7 @@
           <p:cNvPr id="2" name="Title 1">
             <a:extLst>
               <a:ext uri="{FF2B5EF4-FFF2-40B4-BE49-F238E27FC236}">
-                <a16:creationId xmlns="" xmlns:a16="http://schemas.microsoft.com/office/drawing/2014/main" id="{5199C9B0-06E2-410E-8DDA-ABF5228032EA}"/>
+                <a16:creationId xmlns:a16="http://schemas.microsoft.com/office/drawing/2014/main" id="{5199C9B0-06E2-410E-8DDA-ABF5228032EA}"/>
               </a:ext>
             </a:extLst>
           </p:cNvPr>
@@ -10328,7 +11068,7 @@
           <p:cNvPr id="3" name="Content Placeholder 2">
             <a:extLst>
               <a:ext uri="{FF2B5EF4-FFF2-40B4-BE49-F238E27FC236}">
-                <a16:creationId xmlns="" xmlns:a16="http://schemas.microsoft.com/office/drawing/2014/main" id="{0EA9F7AB-C9CE-47FF-B6ED-B5BF71D63066}"/>
+                <a16:creationId xmlns:a16="http://schemas.microsoft.com/office/drawing/2014/main" id="{0EA9F7AB-C9CE-47FF-B6ED-B5BF71D63066}"/>
               </a:ext>
             </a:extLst>
           </p:cNvPr>
@@ -10353,7 +11093,7 @@
           <p:cNvPr id="4" name="Slide Number Placeholder 3">
             <a:extLst>
               <a:ext uri="{FF2B5EF4-FFF2-40B4-BE49-F238E27FC236}">
-                <a16:creationId xmlns="" xmlns:a16="http://schemas.microsoft.com/office/drawing/2014/main" id="{41E5440E-F403-4B49-B638-14435F8F2B1D}"/>
+                <a16:creationId xmlns:a16="http://schemas.microsoft.com/office/drawing/2014/main" id="{41E5440E-F403-4B49-B638-14435F8F2B1D}"/>
               </a:ext>
             </a:extLst>
           </p:cNvPr>
@@ -10413,7 +11153,7 @@
           <p:cNvPr id="2" name="Title 1">
             <a:extLst>
               <a:ext uri="{FF2B5EF4-FFF2-40B4-BE49-F238E27FC236}">
-                <a16:creationId xmlns="" xmlns:a16="http://schemas.microsoft.com/office/drawing/2014/main" id="{B42A0C66-3F52-409A-9CE7-5570CF118EC1}"/>
+                <a16:creationId xmlns:a16="http://schemas.microsoft.com/office/drawing/2014/main" id="{B42A0C66-3F52-409A-9CE7-5570CF118EC1}"/>
               </a:ext>
             </a:extLst>
           </p:cNvPr>
@@ -10441,7 +11181,7 @@
           <p:cNvPr id="3" name="Content Placeholder 2">
             <a:extLst>
               <a:ext uri="{FF2B5EF4-FFF2-40B4-BE49-F238E27FC236}">
-                <a16:creationId xmlns="" xmlns:a16="http://schemas.microsoft.com/office/drawing/2014/main" id="{453B0361-81CA-4B36-98AD-8CDC7D18FD88}"/>
+                <a16:creationId xmlns:a16="http://schemas.microsoft.com/office/drawing/2014/main" id="{453B0361-81CA-4B36-98AD-8CDC7D18FD88}"/>
               </a:ext>
             </a:extLst>
           </p:cNvPr>
@@ -10496,7 +11236,7 @@
           <p:cNvPr id="4" name="Slide Number Placeholder 3">
             <a:extLst>
               <a:ext uri="{FF2B5EF4-FFF2-40B4-BE49-F238E27FC236}">
-                <a16:creationId xmlns="" xmlns:a16="http://schemas.microsoft.com/office/drawing/2014/main" id="{68400699-93C1-43CE-9C6D-F2E00C8FCA2F}"/>
+                <a16:creationId xmlns:a16="http://schemas.microsoft.com/office/drawing/2014/main" id="{68400699-93C1-43CE-9C6D-F2E00C8FCA2F}"/>
               </a:ext>
             </a:extLst>
           </p:cNvPr>
@@ -10556,7 +11296,7 @@
           <p:cNvPr id="2" name="Title 1">
             <a:extLst>
               <a:ext uri="{FF2B5EF4-FFF2-40B4-BE49-F238E27FC236}">
-                <a16:creationId xmlns="" xmlns:a16="http://schemas.microsoft.com/office/drawing/2014/main" id="{97A51132-5F7C-4458-A7CA-40C03DC63E1A}"/>
+                <a16:creationId xmlns:a16="http://schemas.microsoft.com/office/drawing/2014/main" id="{97A51132-5F7C-4458-A7CA-40C03DC63E1A}"/>
               </a:ext>
             </a:extLst>
           </p:cNvPr>
@@ -10592,7 +11332,7 @@
           <p:cNvPr id="3" name="Content Placeholder 2">
             <a:extLst>
               <a:ext uri="{FF2B5EF4-FFF2-40B4-BE49-F238E27FC236}">
-                <a16:creationId xmlns="" xmlns:a16="http://schemas.microsoft.com/office/drawing/2014/main" id="{AC52C316-830D-462A-8F67-9BA0E80F4A72}"/>
+                <a16:creationId xmlns:a16="http://schemas.microsoft.com/office/drawing/2014/main" id="{AC52C316-830D-462A-8F67-9BA0E80F4A72}"/>
               </a:ext>
             </a:extLst>
           </p:cNvPr>
@@ -10641,7 +11381,7 @@
           <p:cNvPr id="4" name="Slide Number Placeholder 3">
             <a:extLst>
               <a:ext uri="{FF2B5EF4-FFF2-40B4-BE49-F238E27FC236}">
-                <a16:creationId xmlns="" xmlns:a16="http://schemas.microsoft.com/office/drawing/2014/main" id="{7DC007F5-0198-4CE9-837A-8E4EBDFB3638}"/>
+                <a16:creationId xmlns:a16="http://schemas.microsoft.com/office/drawing/2014/main" id="{7DC007F5-0198-4CE9-837A-8E4EBDFB3638}"/>
               </a:ext>
             </a:extLst>
           </p:cNvPr>
@@ -10701,7 +11441,7 @@
           <p:cNvPr id="2" name="Title 1">
             <a:extLst>
               <a:ext uri="{FF2B5EF4-FFF2-40B4-BE49-F238E27FC236}">
-                <a16:creationId xmlns="" xmlns:a16="http://schemas.microsoft.com/office/drawing/2014/main" id="{8B25CC60-678F-4ABC-A286-B6474D7DA369}"/>
+                <a16:creationId xmlns:a16="http://schemas.microsoft.com/office/drawing/2014/main" id="{8B25CC60-678F-4ABC-A286-B6474D7DA369}"/>
               </a:ext>
             </a:extLst>
           </p:cNvPr>
@@ -10737,7 +11477,7 @@
           <p:cNvPr id="3" name="Content Placeholder 2">
             <a:extLst>
               <a:ext uri="{FF2B5EF4-FFF2-40B4-BE49-F238E27FC236}">
-                <a16:creationId xmlns="" xmlns:a16="http://schemas.microsoft.com/office/drawing/2014/main" id="{A4A95409-D15F-4ACF-B8E2-B483B69F471C}"/>
+                <a16:creationId xmlns:a16="http://schemas.microsoft.com/office/drawing/2014/main" id="{A4A95409-D15F-4ACF-B8E2-B483B69F471C}"/>
               </a:ext>
             </a:extLst>
           </p:cNvPr>
@@ -10791,7 +11531,7 @@
           <p:cNvPr id="4" name="Slide Number Placeholder 3">
             <a:extLst>
               <a:ext uri="{FF2B5EF4-FFF2-40B4-BE49-F238E27FC236}">
-                <a16:creationId xmlns="" xmlns:a16="http://schemas.microsoft.com/office/drawing/2014/main" id="{2E8DA2EF-A6B0-4094-B638-5C0BABA0F1E5}"/>
+                <a16:creationId xmlns:a16="http://schemas.microsoft.com/office/drawing/2014/main" id="{2E8DA2EF-A6B0-4094-B638-5C0BABA0F1E5}"/>
               </a:ext>
             </a:extLst>
           </p:cNvPr>
@@ -10851,7 +11591,7 @@
           <p:cNvPr id="2" name="Title 1">
             <a:extLst>
               <a:ext uri="{FF2B5EF4-FFF2-40B4-BE49-F238E27FC236}">
-                <a16:creationId xmlns="" xmlns:a16="http://schemas.microsoft.com/office/drawing/2014/main" id="{48FF45B5-D5FA-460B-991C-2FA108E3A3F1}"/>
+                <a16:creationId xmlns:a16="http://schemas.microsoft.com/office/drawing/2014/main" id="{48FF45B5-D5FA-460B-991C-2FA108E3A3F1}"/>
               </a:ext>
             </a:extLst>
           </p:cNvPr>
@@ -10887,7 +11627,7 @@
           <p:cNvPr id="3" name="Content Placeholder 2">
             <a:extLst>
               <a:ext uri="{FF2B5EF4-FFF2-40B4-BE49-F238E27FC236}">
-                <a16:creationId xmlns="" xmlns:a16="http://schemas.microsoft.com/office/drawing/2014/main" id="{E78EFE23-8489-47D3-809F-724D797C3D7A}"/>
+                <a16:creationId xmlns:a16="http://schemas.microsoft.com/office/drawing/2014/main" id="{E78EFE23-8489-47D3-809F-724D797C3D7A}"/>
               </a:ext>
             </a:extLst>
           </p:cNvPr>
@@ -10952,7 +11692,7 @@
           <p:cNvPr id="4" name="Slide Number Placeholder 3">
             <a:extLst>
               <a:ext uri="{FF2B5EF4-FFF2-40B4-BE49-F238E27FC236}">
-                <a16:creationId xmlns="" xmlns:a16="http://schemas.microsoft.com/office/drawing/2014/main" id="{7DB99A5F-00D7-4971-A7FF-A69FAA2A03B7}"/>
+                <a16:creationId xmlns:a16="http://schemas.microsoft.com/office/drawing/2014/main" id="{7DB99A5F-00D7-4971-A7FF-A69FAA2A03B7}"/>
               </a:ext>
             </a:extLst>
           </p:cNvPr>
@@ -11012,7 +11752,7 @@
           <p:cNvPr id="2" name="Title 1">
             <a:extLst>
               <a:ext uri="{FF2B5EF4-FFF2-40B4-BE49-F238E27FC236}">
-                <a16:creationId xmlns="" xmlns:a16="http://schemas.microsoft.com/office/drawing/2014/main" id="{FAB11C2D-EE05-4A0B-8CD0-4ED2F65CAE8A}"/>
+                <a16:creationId xmlns:a16="http://schemas.microsoft.com/office/drawing/2014/main" id="{FAB11C2D-EE05-4A0B-8CD0-4ED2F65CAE8A}"/>
               </a:ext>
             </a:extLst>
           </p:cNvPr>
@@ -11040,7 +11780,7 @@
           <p:cNvPr id="3" name="Content Placeholder 2">
             <a:extLst>
               <a:ext uri="{FF2B5EF4-FFF2-40B4-BE49-F238E27FC236}">
-                <a16:creationId xmlns="" xmlns:a16="http://schemas.microsoft.com/office/drawing/2014/main" id="{76C92324-9BA2-4470-8199-AB38945929FA}"/>
+                <a16:creationId xmlns:a16="http://schemas.microsoft.com/office/drawing/2014/main" id="{76C92324-9BA2-4470-8199-AB38945929FA}"/>
               </a:ext>
             </a:extLst>
           </p:cNvPr>
@@ -11065,7 +11805,7 @@
           <p:cNvPr id="4" name="Slide Number Placeholder 3">
             <a:extLst>
               <a:ext uri="{FF2B5EF4-FFF2-40B4-BE49-F238E27FC236}">
-                <a16:creationId xmlns="" xmlns:a16="http://schemas.microsoft.com/office/drawing/2014/main" id="{20D3C6AF-E7A8-4C54-8F7F-CCCED9070700}"/>
+                <a16:creationId xmlns:a16="http://schemas.microsoft.com/office/drawing/2014/main" id="{20D3C6AF-E7A8-4C54-8F7F-CCCED9070700}"/>
               </a:ext>
             </a:extLst>
           </p:cNvPr>
@@ -11340,7 +12080,7 @@
   <a:extraClrSchemeLst/>
   <a:extLst>
     <a:ext uri="{05A4C25C-085E-4340-85A3-A5531E510DB2}">
-      <thm15:themeFamily xmlns="" xmlns:thm15="http://schemas.microsoft.com/office/thememl/2012/main" name="Wisp" id="{7CB32D59-10C0-40DD-B7BD-2E94284A981C}" vid="{24B1A44C-C006-48B2-A4D7-E5549B3D8CD4}"/>
+      <thm15:themeFamily xmlns:thm15="http://schemas.microsoft.com/office/thememl/2012/main" name="Wisp" id="{7CB32D59-10C0-40DD-B7BD-2E94284A981C}" vid="{24B1A44C-C006-48B2-A4D7-E5549B3D8CD4}"/>
     </a:ext>
   </a:extLst>
 </a:theme>
@@ -11635,7 +12375,7 @@
   <a:extraClrSchemeLst/>
   <a:extLst>
     <a:ext uri="{05A4C25C-085E-4340-85A3-A5531E510DB2}">
-      <thm15:themeFamily xmlns="" xmlns:thm15="http://schemas.microsoft.com/office/thememl/2012/main" name="Office Theme" id="{62F939B6-93AF-4DB8-9C6B-D6C7DFDC589F}" vid="{4A3C46E8-61CC-4603-A589-7422A47A8E4A}"/>
+      <thm15:themeFamily xmlns:thm15="http://schemas.microsoft.com/office/thememl/2012/main" name="Office Theme" id="{62F939B6-93AF-4DB8-9C6B-D6C7DFDC589F}" vid="{4A3C46E8-61CC-4603-A589-7422A47A8E4A}"/>
     </a:ext>
   </a:extLst>
 </a:theme>

</xml_diff>

<commit_message>
Added Visio version of Landmark Data Structure
Added Landmark Data Storage slide to ppt
</commit_message>
<xml_diff>
--- a/Presentations/Sprint01 ReviewMeeting.pptx
+++ b/Presentations/Sprint01 ReviewMeeting.pptx
@@ -5,7 +5,7 @@
     <p:sldMasterId id="2147483648" r:id="rId1"/>
   </p:sldMasterIdLst>
   <p:notesMasterIdLst>
-    <p:notesMasterId r:id="rId29"/>
+    <p:notesMasterId r:id="rId30"/>
   </p:notesMasterIdLst>
   <p:sldIdLst>
     <p:sldId id="256" r:id="rId2"/>
@@ -26,15 +26,16 @@
     <p:sldId id="267" r:id="rId17"/>
     <p:sldId id="280" r:id="rId18"/>
     <p:sldId id="281" r:id="rId19"/>
-    <p:sldId id="276" r:id="rId20"/>
-    <p:sldId id="266" r:id="rId21"/>
-    <p:sldId id="269" r:id="rId22"/>
-    <p:sldId id="270" r:id="rId23"/>
-    <p:sldId id="282" r:id="rId24"/>
-    <p:sldId id="277" r:id="rId25"/>
-    <p:sldId id="268" r:id="rId26"/>
-    <p:sldId id="273" r:id="rId27"/>
-    <p:sldId id="278" r:id="rId28"/>
+    <p:sldId id="283" r:id="rId20"/>
+    <p:sldId id="276" r:id="rId21"/>
+    <p:sldId id="266" r:id="rId22"/>
+    <p:sldId id="269" r:id="rId23"/>
+    <p:sldId id="270" r:id="rId24"/>
+    <p:sldId id="282" r:id="rId25"/>
+    <p:sldId id="277" r:id="rId26"/>
+    <p:sldId id="268" r:id="rId27"/>
+    <p:sldId id="273" r:id="rId28"/>
+    <p:sldId id="278" r:id="rId29"/>
   </p:sldIdLst>
   <p:sldSz cx="12192000" cy="6858000"/>
   <p:notesSz cx="6858000" cy="9144000"/>
@@ -156,6 +157,7 @@
             <p14:sldId id="267"/>
             <p14:sldId id="280"/>
             <p14:sldId id="281"/>
+            <p14:sldId id="283"/>
             <p14:sldId id="276"/>
             <p14:sldId id="266"/>
             <p14:sldId id="269"/>
@@ -302,7 +304,7 @@
           <a:p>
             <a:fld id="{19BF4C59-5F08-44C4-B153-33D13F8820E2}" type="datetimeFigureOut">
               <a:rPr lang="en-US" smtClean="0"/>
-              <a:t>26/11/2018</a:t>
+              <a:t>27/11/2018</a:t>
             </a:fld>
             <a:endParaRPr lang="en-US"/>
           </a:p>
@@ -757,7 +759,7 @@
           <a:p>
             <a:fld id="{F496603D-C74F-4091-A2D3-4695C477BDF9}" type="datetime1">
               <a:rPr lang="en-US" smtClean="0"/>
-              <a:t>26/11/2018</a:t>
+              <a:t>27/11/2018</a:t>
             </a:fld>
             <a:endParaRPr lang="en-US" dirty="0"/>
           </a:p>
@@ -1091,7 +1093,7 @@
           <a:p>
             <a:fld id="{59B7F04C-D88F-4E87-8405-047FE8998599}" type="datetime1">
               <a:rPr lang="en-US" smtClean="0"/>
-              <a:t>26/11/2018</a:t>
+              <a:t>27/11/2018</a:t>
             </a:fld>
             <a:endParaRPr lang="en-US" dirty="0"/>
           </a:p>
@@ -1488,7 +1490,7 @@
           <a:p>
             <a:fld id="{F53A2574-81AC-4C8C-9315-A798CBD15508}" type="datetime1">
               <a:rPr lang="en-US" smtClean="0"/>
-              <a:t>26/11/2018</a:t>
+              <a:t>27/11/2018</a:t>
             </a:fld>
             <a:endParaRPr lang="en-US" dirty="0"/>
           </a:p>
@@ -1820,7 +1822,7 @@
           <a:p>
             <a:fld id="{9F79353D-7D17-4E5D-B6AA-BEFF3E0E4AED}" type="datetime1">
               <a:rPr lang="en-US" smtClean="0"/>
-              <a:t>26/11/2018</a:t>
+              <a:t>27/11/2018</a:t>
             </a:fld>
             <a:endParaRPr lang="en-US" dirty="0"/>
           </a:p>
@@ -2136,7 +2138,7 @@
           <a:p>
             <a:fld id="{62E83889-C6FA-4794-A93A-78152215D16A}" type="datetime1">
               <a:rPr lang="en-US" smtClean="0"/>
-              <a:t>26/11/2018</a:t>
+              <a:t>27/11/2018</a:t>
             </a:fld>
             <a:endParaRPr lang="en-US" dirty="0"/>
           </a:p>
@@ -2528,7 +2530,7 @@
           <a:p>
             <a:fld id="{A0ED2F6D-E95C-4D36-9BBD-35E186A95236}" type="datetime1">
               <a:rPr lang="en-US" smtClean="0"/>
-              <a:t>26/11/2018</a:t>
+              <a:t>27/11/2018</a:t>
             </a:fld>
             <a:endParaRPr lang="en-US" dirty="0"/>
           </a:p>
@@ -2781,7 +2783,7 @@
           <a:p>
             <a:fld id="{3F053689-2F89-4CD8-BBCC-628181C06D6F}" type="datetime1">
               <a:rPr lang="en-US" smtClean="0"/>
-              <a:t>26/11/2018</a:t>
+              <a:t>27/11/2018</a:t>
             </a:fld>
             <a:endParaRPr lang="en-US" dirty="0"/>
           </a:p>
@@ -3039,7 +3041,7 @@
           <a:p>
             <a:fld id="{97B04EC7-3A70-4154-BE8C-716D5F7D393A}" type="datetime1">
               <a:rPr lang="en-US" smtClean="0"/>
-              <a:t>26/11/2018</a:t>
+              <a:t>27/11/2018</a:t>
             </a:fld>
             <a:endParaRPr lang="en-US" dirty="0"/>
           </a:p>
@@ -3297,7 +3299,7 @@
           <a:p>
             <a:fld id="{324BC052-11CD-4DCD-ACF1-8E2FFA6E860A}" type="datetime1">
               <a:rPr lang="en-US" smtClean="0"/>
-              <a:t>26/11/2018</a:t>
+              <a:t>27/11/2018</a:t>
             </a:fld>
             <a:endParaRPr lang="en-US" dirty="0"/>
           </a:p>
@@ -3622,7 +3624,7 @@
           <a:p>
             <a:fld id="{76C8D67C-A063-467C-BC65-C57E079F80F5}" type="datetime1">
               <a:rPr lang="en-US" smtClean="0"/>
-              <a:t>26/11/2018</a:t>
+              <a:t>27/11/2018</a:t>
             </a:fld>
             <a:endParaRPr lang="en-US" dirty="0"/>
           </a:p>
@@ -3941,7 +3943,7 @@
           <a:p>
             <a:fld id="{B9D1D154-EC59-400A-90AD-D66E129D1C81}" type="datetime1">
               <a:rPr lang="en-US" smtClean="0"/>
-              <a:t>26/11/2018</a:t>
+              <a:t>27/11/2018</a:t>
             </a:fld>
             <a:endParaRPr lang="en-US" dirty="0"/>
           </a:p>
@@ -4394,7 +4396,7 @@
           <a:p>
             <a:fld id="{1289DCF8-DDB3-4ED6-91C7-A41042BCCEC0}" type="datetime1">
               <a:rPr lang="en-US" smtClean="0"/>
-              <a:t>26/11/2018</a:t>
+              <a:t>27/11/2018</a:t>
             </a:fld>
             <a:endParaRPr lang="en-US" dirty="0"/>
           </a:p>
@@ -4595,7 +4597,7 @@
           <a:p>
             <a:fld id="{B7D66469-CA9A-4262-8925-C1B460FFD1FE}" type="datetime1">
               <a:rPr lang="en-US" smtClean="0"/>
-              <a:t>26/11/2018</a:t>
+              <a:t>27/11/2018</a:t>
             </a:fld>
             <a:endParaRPr lang="en-US" dirty="0"/>
           </a:p>
@@ -4768,7 +4770,7 @@
           <a:p>
             <a:fld id="{8FFB0B98-420B-4669-A38B-6EA24DD00E40}" type="datetime1">
               <a:rPr lang="en-US" smtClean="0"/>
-              <a:t>26/11/2018</a:t>
+              <a:t>27/11/2018</a:t>
             </a:fld>
             <a:endParaRPr lang="en-US" dirty="0"/>
           </a:p>
@@ -5097,7 +5099,7 @@
           <a:p>
             <a:fld id="{57A84040-A505-4603-8AF8-947AF9A8C6B0}" type="datetime1">
               <a:rPr lang="en-US" smtClean="0"/>
-              <a:t>26/11/2018</a:t>
+              <a:t>27/11/2018</a:t>
             </a:fld>
             <a:endParaRPr lang="en-US" dirty="0"/>
           </a:p>
@@ -5438,7 +5440,7 @@
           <a:p>
             <a:fld id="{C257B495-959E-4C32-9725-73949DB74722}" type="datetime1">
               <a:rPr lang="en-US" smtClean="0"/>
-              <a:t>26/11/2018</a:t>
+              <a:t>27/11/2018</a:t>
             </a:fld>
             <a:endParaRPr lang="en-US" dirty="0"/>
           </a:p>
@@ -7551,7 +7553,7 @@
           <a:p>
             <a:fld id="{FC130E8E-EE4B-4D52-BAF0-F4AA6E538D19}" type="datetime1">
               <a:rPr lang="en-US" smtClean="0"/>
-              <a:t>26/11/2018</a:t>
+              <a:t>27/11/2018</a:t>
             </a:fld>
             <a:endParaRPr lang="en-US" dirty="0"/>
           </a:p>
@@ -9499,7 +9501,7 @@
           <p:cNvPr id="2" name="Title 1">
             <a:extLst>
               <a:ext uri="{FF2B5EF4-FFF2-40B4-BE49-F238E27FC236}">
-                <a16:creationId xmlns:a16="http://schemas.microsoft.com/office/drawing/2014/main" id="{4E96F21E-1AFE-4A04-8BD0-C88D1D2DA52C}"/>
+                <a16:creationId xmlns:a16="http://schemas.microsoft.com/office/drawing/2014/main" id="{099D98AF-3E4D-488E-B8C3-C0381CA48597}"/>
               </a:ext>
             </a:extLst>
           </p:cNvPr>
@@ -9517,7 +9519,7 @@
           <a:p>
             <a:r>
               <a:rPr lang="en-US" dirty="0"/>
-              <a:t>Questions?</a:t>
+              <a:t>Landmark Data Storage</a:t>
             </a:r>
           </a:p>
         </p:txBody>
@@ -9527,7 +9529,7 @@
           <p:cNvPr id="3" name="Content Placeholder 2">
             <a:extLst>
               <a:ext uri="{FF2B5EF4-FFF2-40B4-BE49-F238E27FC236}">
-                <a16:creationId xmlns:a16="http://schemas.microsoft.com/office/drawing/2014/main" id="{C6D9C712-7144-4100-BCDB-F2CFAF7A1F31}"/>
+                <a16:creationId xmlns:a16="http://schemas.microsoft.com/office/drawing/2014/main" id="{9B7F757E-BE2B-46DF-A69B-CF16514EFAD2}"/>
               </a:ext>
             </a:extLst>
           </p:cNvPr>
@@ -9543,7 +9545,57 @@
           <a:bodyPr/>
           <a:lstStyle/>
           <a:p>
-            <a:endParaRPr lang="en-US"/>
+            <a:r>
+              <a:rPr lang="en-US" dirty="0"/>
+              <a:t>Structure for Landmarks and Custom Landmarks</a:t>
+            </a:r>
+          </a:p>
+          <a:p>
+            <a:endParaRPr lang="en-US" dirty="0"/>
+          </a:p>
+          <a:p>
+            <a:r>
+              <a:rPr lang="en-US" dirty="0"/>
+              <a:t>Local storage:</a:t>
+            </a:r>
+          </a:p>
+          <a:p>
+            <a:pPr lvl="1"/>
+            <a:r>
+              <a:rPr lang="en-US" dirty="0"/>
+              <a:t>Internal File Storage</a:t>
+            </a:r>
+          </a:p>
+          <a:p>
+            <a:pPr lvl="1"/>
+            <a:r>
+              <a:rPr lang="en-US" dirty="0"/>
+              <a:t>External File Storage</a:t>
+            </a:r>
+          </a:p>
+          <a:p>
+            <a:pPr lvl="1"/>
+            <a:r>
+              <a:rPr lang="en-US" dirty="0"/>
+              <a:t>Shared Preferences</a:t>
+            </a:r>
+          </a:p>
+          <a:p>
+            <a:pPr lvl="1"/>
+            <a:r>
+              <a:rPr lang="en-US" dirty="0"/>
+              <a:t>Private Databases</a:t>
+            </a:r>
+          </a:p>
+          <a:p>
+            <a:pPr lvl="1"/>
+            <a:endParaRPr lang="en-US" dirty="0"/>
+          </a:p>
+          <a:p>
+            <a:r>
+              <a:rPr lang="en-US" dirty="0"/>
+              <a:t>Chosen SQLite</a:t>
+            </a:r>
           </a:p>
         </p:txBody>
       </p:sp>
@@ -9552,7 +9604,7 @@
           <p:cNvPr id="4" name="Slide Number Placeholder 3">
             <a:extLst>
               <a:ext uri="{FF2B5EF4-FFF2-40B4-BE49-F238E27FC236}">
-                <a16:creationId xmlns:a16="http://schemas.microsoft.com/office/drawing/2014/main" id="{ABDB7F91-3EE4-476A-9661-1648C797CBD1}"/>
+                <a16:creationId xmlns:a16="http://schemas.microsoft.com/office/drawing/2014/main" id="{70E8CCED-2F50-4A4F-B670-22D17EBEAE96}"/>
               </a:ext>
             </a:extLst>
           </p:cNvPr>
@@ -9577,10 +9629,70 @@
           </a:p>
         </p:txBody>
       </p:sp>
+      <p:pic>
+        <p:nvPicPr>
+          <p:cNvPr id="6" name="Picture 5">
+            <a:extLst>
+              <a:ext uri="{FF2B5EF4-FFF2-40B4-BE49-F238E27FC236}">
+                <a16:creationId xmlns:a16="http://schemas.microsoft.com/office/drawing/2014/main" id="{93E2551E-FDDB-4CF9-9037-E0DF2C45FC2E}"/>
+              </a:ext>
+            </a:extLst>
+          </p:cNvPr>
+          <p:cNvPicPr>
+            <a:picLocks noChangeAspect="1"/>
+          </p:cNvPicPr>
+          <p:nvPr/>
+        </p:nvPicPr>
+        <p:blipFill>
+          <a:blip r:embed="rId2"/>
+          <a:stretch>
+            <a:fillRect/>
+          </a:stretch>
+        </p:blipFill>
+        <p:spPr>
+          <a:xfrm>
+            <a:off x="6518654" y="2754888"/>
+            <a:ext cx="2414676" cy="3156334"/>
+          </a:xfrm>
+          <a:prstGeom prst="rect">
+            <a:avLst/>
+          </a:prstGeom>
+        </p:spPr>
+      </p:pic>
+      <p:pic>
+        <p:nvPicPr>
+          <p:cNvPr id="7" name="Picture 6">
+            <a:extLst>
+              <a:ext uri="{FF2B5EF4-FFF2-40B4-BE49-F238E27FC236}">
+                <a16:creationId xmlns:a16="http://schemas.microsoft.com/office/drawing/2014/main" id="{25861022-A0F3-459D-B689-E05BCF818561}"/>
+              </a:ext>
+            </a:extLst>
+          </p:cNvPr>
+          <p:cNvPicPr>
+            <a:picLocks noChangeAspect="1"/>
+          </p:cNvPicPr>
+          <p:nvPr/>
+        </p:nvPicPr>
+        <p:blipFill>
+          <a:blip r:embed="rId3"/>
+          <a:stretch>
+            <a:fillRect/>
+          </a:stretch>
+        </p:blipFill>
+        <p:spPr>
+          <a:xfrm>
+            <a:off x="9048621" y="1827543"/>
+            <a:ext cx="2455991" cy="4083679"/>
+          </a:xfrm>
+          <a:prstGeom prst="rect">
+            <a:avLst/>
+          </a:prstGeom>
+        </p:spPr>
+      </p:pic>
     </p:spTree>
     <p:extLst>
       <p:ext uri="{BB962C8B-B14F-4D97-AF65-F5344CB8AC3E}">
-        <p14:creationId xmlns:p14="http://schemas.microsoft.com/office/powerpoint/2010/main" val="1700607014"/>
+        <p14:creationId xmlns:p14="http://schemas.microsoft.com/office/powerpoint/2010/main" val="1449601278"/>
       </p:ext>
     </p:extLst>
   </p:cSld>
@@ -9728,7 +9840,7 @@
           <p:cNvPr id="2" name="Title 1">
             <a:extLst>
               <a:ext uri="{FF2B5EF4-FFF2-40B4-BE49-F238E27FC236}">
-                <a16:creationId xmlns:a16="http://schemas.microsoft.com/office/drawing/2014/main" id="{83DFF23D-959A-44BC-BE78-1D0330CDF164}"/>
+                <a16:creationId xmlns:a16="http://schemas.microsoft.com/office/drawing/2014/main" id="{4E96F21E-1AFE-4A04-8BD0-C88D1D2DA52C}"/>
               </a:ext>
             </a:extLst>
           </p:cNvPr>
@@ -9746,7 +9858,7 @@
           <a:p>
             <a:r>
               <a:rPr lang="en-US" dirty="0"/>
-              <a:t>Algorithm</a:t>
+              <a:t>Questions?</a:t>
             </a:r>
           </a:p>
         </p:txBody>
@@ -9756,7 +9868,7 @@
           <p:cNvPr id="3" name="Content Placeholder 2">
             <a:extLst>
               <a:ext uri="{FF2B5EF4-FFF2-40B4-BE49-F238E27FC236}">
-                <a16:creationId xmlns:a16="http://schemas.microsoft.com/office/drawing/2014/main" id="{706A48C4-F2C9-48C7-B302-4ADE777DDB2E}"/>
+                <a16:creationId xmlns:a16="http://schemas.microsoft.com/office/drawing/2014/main" id="{C6D9C712-7144-4100-BCDB-F2CFAF7A1F31}"/>
               </a:ext>
             </a:extLst>
           </p:cNvPr>
@@ -9767,103 +9879,12 @@
             <p:ph idx="1"/>
           </p:nvPr>
         </p:nvSpPr>
-        <p:spPr>
-          <a:xfrm>
-            <a:off x="2589212" y="1752599"/>
-            <a:ext cx="8915400" cy="4285129"/>
-          </a:xfrm>
-        </p:spPr>
-        <p:txBody>
-          <a:bodyPr>
-            <a:normAutofit/>
-          </a:bodyPr>
-          <a:lstStyle/>
-          <a:p>
-            <a:r>
-              <a:rPr lang="en-US" dirty="0"/>
-              <a:t>Get relevant sensor information</a:t>
-            </a:r>
-          </a:p>
-          <a:p>
-            <a:pPr lvl="1"/>
-            <a:r>
-              <a:rPr lang="en-US" dirty="0"/>
-              <a:t>Get elevation </a:t>
-            </a:r>
-          </a:p>
-          <a:p>
-            <a:pPr lvl="1"/>
-            <a:r>
-              <a:rPr lang="en-US" dirty="0"/>
-              <a:t>Get location</a:t>
-            </a:r>
-          </a:p>
-          <a:p>
-            <a:pPr lvl="1"/>
-            <a:r>
-              <a:rPr lang="en-US" dirty="0"/>
-              <a:t>Get orientation</a:t>
-            </a:r>
-          </a:p>
-          <a:p>
-            <a:r>
-              <a:rPr lang="en-US" dirty="0"/>
-              <a:t>Find landmarks in orientation</a:t>
-            </a:r>
-          </a:p>
-          <a:p>
-            <a:pPr lvl="1"/>
-            <a:r>
-              <a:rPr lang="en-US" dirty="0"/>
-              <a:t>Find Line of Sight (</a:t>
-            </a:r>
-            <a:r>
-              <a:rPr lang="en-US" dirty="0" err="1"/>
-              <a:t>LoS</a:t>
-            </a:r>
-            <a:r>
-              <a:rPr lang="en-US" dirty="0"/>
-              <a:t>) by numerical method</a:t>
-            </a:r>
-          </a:p>
-          <a:p>
-            <a:pPr lvl="1"/>
-            <a:r>
-              <a:rPr lang="en-US" dirty="0"/>
-              <a:t>Find landmarks between location and </a:t>
-            </a:r>
-            <a:r>
-              <a:rPr lang="en-US" dirty="0" err="1"/>
-              <a:t>LoS</a:t>
-            </a:r>
-            <a:endParaRPr lang="en-US" dirty="0"/>
-          </a:p>
-          <a:p>
-            <a:pPr lvl="1"/>
-            <a:r>
-              <a:rPr lang="en-US" dirty="0"/>
-              <a:t>Output landmarks to user</a:t>
-            </a:r>
-          </a:p>
-          <a:p>
-            <a:pPr lvl="1"/>
-            <a:r>
-              <a:rPr lang="en-US" dirty="0"/>
-              <a:t>Allow user to select landmark </a:t>
-            </a:r>
-          </a:p>
-          <a:p>
-            <a:pPr lvl="1"/>
-            <a:r>
-              <a:rPr lang="en-US" dirty="0"/>
-              <a:t>Pull information about landmark</a:t>
-            </a:r>
-          </a:p>
-          <a:p>
-            <a:r>
-              <a:rPr lang="en-US" dirty="0"/>
-              <a:t>Find distance between current location and landmark</a:t>
-            </a:r>
+        <p:spPr/>
+        <p:txBody>
+          <a:bodyPr/>
+          <a:lstStyle/>
+          <a:p>
+            <a:endParaRPr lang="en-US"/>
           </a:p>
         </p:txBody>
       </p:sp>
@@ -9872,7 +9893,7 @@
           <p:cNvPr id="4" name="Slide Number Placeholder 3">
             <a:extLst>
               <a:ext uri="{FF2B5EF4-FFF2-40B4-BE49-F238E27FC236}">
-                <a16:creationId xmlns:a16="http://schemas.microsoft.com/office/drawing/2014/main" id="{8BA44F56-3ECD-42B0-A9A9-E5F99872401B}"/>
+                <a16:creationId xmlns:a16="http://schemas.microsoft.com/office/drawing/2014/main" id="{ABDB7F91-3EE4-476A-9661-1648C797CBD1}"/>
               </a:ext>
             </a:extLst>
           </p:cNvPr>
@@ -9900,7 +9921,7 @@
     </p:spTree>
     <p:extLst>
       <p:ext uri="{BB962C8B-B14F-4D97-AF65-F5344CB8AC3E}">
-        <p14:creationId xmlns:p14="http://schemas.microsoft.com/office/powerpoint/2010/main" val="230190470"/>
+        <p14:creationId xmlns:p14="http://schemas.microsoft.com/office/powerpoint/2010/main" val="1700607014"/>
       </p:ext>
     </p:extLst>
   </p:cSld>
@@ -9932,7 +9953,7 @@
           <p:cNvPr id="2" name="Title 1">
             <a:extLst>
               <a:ext uri="{FF2B5EF4-FFF2-40B4-BE49-F238E27FC236}">
-                <a16:creationId xmlns:a16="http://schemas.microsoft.com/office/drawing/2014/main" id="{1183D399-4942-4C83-BF24-B436160EB419}"/>
+                <a16:creationId xmlns:a16="http://schemas.microsoft.com/office/drawing/2014/main" id="{83DFF23D-959A-44BC-BE78-1D0330CDF164}"/>
               </a:ext>
             </a:extLst>
           </p:cNvPr>
@@ -9950,7 +9971,7 @@
           <a:p>
             <a:r>
               <a:rPr lang="en-US" dirty="0"/>
-              <a:t>Sensors</a:t>
+              <a:t>Algorithm</a:t>
             </a:r>
           </a:p>
         </p:txBody>
@@ -9960,7 +9981,7 @@
           <p:cNvPr id="3" name="Content Placeholder 2">
             <a:extLst>
               <a:ext uri="{FF2B5EF4-FFF2-40B4-BE49-F238E27FC236}">
-                <a16:creationId xmlns:a16="http://schemas.microsoft.com/office/drawing/2014/main" id="{0DD74EA9-167B-4010-AF9E-BA2A7445C522}"/>
+                <a16:creationId xmlns:a16="http://schemas.microsoft.com/office/drawing/2014/main" id="{706A48C4-F2C9-48C7-B302-4ADE777DDB2E}"/>
               </a:ext>
             </a:extLst>
           </p:cNvPr>
@@ -9973,93 +9994,100 @@
         </p:nvSpPr>
         <p:spPr>
           <a:xfrm>
-            <a:off x="2589212" y="1564344"/>
-            <a:ext cx="8915400" cy="4509244"/>
+            <a:off x="2589212" y="1752599"/>
+            <a:ext cx="8915400" cy="4285129"/>
           </a:xfrm>
         </p:spPr>
         <p:txBody>
-          <a:bodyPr/>
-          <a:lstStyle/>
-          <a:p>
-            <a:r>
-              <a:rPr lang="en-US" dirty="0"/>
-              <a:t>Accelerometer and Magnetometer</a:t>
+          <a:bodyPr>
+            <a:normAutofit/>
+          </a:bodyPr>
+          <a:lstStyle/>
+          <a:p>
+            <a:r>
+              <a:rPr lang="en-US" dirty="0"/>
+              <a:t>Get relevant sensor information</a:t>
             </a:r>
           </a:p>
           <a:p>
             <a:pPr lvl="1"/>
             <a:r>
               <a:rPr lang="en-US" dirty="0"/>
-              <a:t>Used to calculate the orientation of the phone</a:t>
+              <a:t>Get elevation </a:t>
             </a:r>
           </a:p>
           <a:p>
             <a:pPr lvl="1"/>
             <a:r>
               <a:rPr lang="en-US" dirty="0"/>
-              <a:t>Gives access to:</a:t>
-            </a:r>
-          </a:p>
-          <a:p>
-            <a:pPr lvl="2"/>
-            <a:r>
-              <a:rPr lang="en-US" dirty="0"/>
-              <a:t>Azimuth</a:t>
-            </a:r>
-          </a:p>
-          <a:p>
-            <a:pPr lvl="2"/>
-            <a:r>
-              <a:rPr lang="en-US" dirty="0"/>
-              <a:t>Pitch</a:t>
-            </a:r>
-          </a:p>
-          <a:p>
-            <a:pPr lvl="2"/>
-            <a:r>
-              <a:rPr lang="en-US" dirty="0"/>
-              <a:t>Roll</a:t>
-            </a:r>
-          </a:p>
-          <a:p>
-            <a:r>
-              <a:rPr lang="en-US" dirty="0"/>
-              <a:t>GPS</a:t>
+              <a:t>Get location</a:t>
             </a:r>
           </a:p>
           <a:p>
             <a:pPr lvl="1"/>
             <a:r>
               <a:rPr lang="en-US" dirty="0"/>
-              <a:t>Requires explicit user permission</a:t>
+              <a:t>Get orientation</a:t>
+            </a:r>
+          </a:p>
+          <a:p>
+            <a:r>
+              <a:rPr lang="en-US" dirty="0"/>
+              <a:t>Find landmarks in orientation</a:t>
             </a:r>
           </a:p>
           <a:p>
             <a:pPr lvl="1"/>
             <a:r>
               <a:rPr lang="en-US" dirty="0"/>
-              <a:t>Gives access to:</a:t>
-            </a:r>
-          </a:p>
-          <a:p>
-            <a:pPr lvl="2"/>
-            <a:r>
-              <a:rPr lang="en-US" dirty="0"/>
-              <a:t>Latitude</a:t>
-            </a:r>
-          </a:p>
-          <a:p>
-            <a:pPr lvl="2"/>
-            <a:r>
-              <a:rPr lang="en-US" dirty="0"/>
-              <a:t>Longitude</a:t>
-            </a:r>
-          </a:p>
-          <a:p>
-            <a:pPr lvl="2"/>
-            <a:r>
-              <a:rPr lang="en-US" dirty="0"/>
-              <a:t>Elevation</a:t>
+              <a:t>Find Line of Sight (</a:t>
+            </a:r>
+            <a:r>
+              <a:rPr lang="en-US" dirty="0" err="1"/>
+              <a:t>LoS</a:t>
+            </a:r>
+            <a:r>
+              <a:rPr lang="en-US" dirty="0"/>
+              <a:t>) by numerical method</a:t>
+            </a:r>
+          </a:p>
+          <a:p>
+            <a:pPr lvl="1"/>
+            <a:r>
+              <a:rPr lang="en-US" dirty="0"/>
+              <a:t>Find landmarks between location and </a:t>
+            </a:r>
+            <a:r>
+              <a:rPr lang="en-US" dirty="0" err="1"/>
+              <a:t>LoS</a:t>
+            </a:r>
+            <a:endParaRPr lang="en-US" dirty="0"/>
+          </a:p>
+          <a:p>
+            <a:pPr lvl="1"/>
+            <a:r>
+              <a:rPr lang="en-US" dirty="0"/>
+              <a:t>Output landmarks to user</a:t>
+            </a:r>
+          </a:p>
+          <a:p>
+            <a:pPr lvl="1"/>
+            <a:r>
+              <a:rPr lang="en-US" dirty="0"/>
+              <a:t>Allow user to select landmark </a:t>
+            </a:r>
+          </a:p>
+          <a:p>
+            <a:pPr lvl="1"/>
+            <a:r>
+              <a:rPr lang="en-US" dirty="0"/>
+              <a:t>Pull information about landmark</a:t>
+            </a:r>
+          </a:p>
+          <a:p>
+            <a:r>
+              <a:rPr lang="en-US" dirty="0"/>
+              <a:t>Find distance between current location and landmark</a:t>
             </a:r>
           </a:p>
         </p:txBody>
@@ -10069,7 +10097,7 @@
           <p:cNvPr id="4" name="Slide Number Placeholder 3">
             <a:extLst>
               <a:ext uri="{FF2B5EF4-FFF2-40B4-BE49-F238E27FC236}">
-                <a16:creationId xmlns:a16="http://schemas.microsoft.com/office/drawing/2014/main" id="{54E49C07-2ECF-4660-8582-3A662CD53904}"/>
+                <a16:creationId xmlns:a16="http://schemas.microsoft.com/office/drawing/2014/main" id="{8BA44F56-3ECD-42B0-A9A9-E5F99872401B}"/>
               </a:ext>
             </a:extLst>
           </p:cNvPr>
@@ -10097,7 +10125,7 @@
     </p:spTree>
     <p:extLst>
       <p:ext uri="{BB962C8B-B14F-4D97-AF65-F5344CB8AC3E}">
-        <p14:creationId xmlns:p14="http://schemas.microsoft.com/office/powerpoint/2010/main" val="3652658612"/>
+        <p14:creationId xmlns:p14="http://schemas.microsoft.com/office/powerpoint/2010/main" val="230190470"/>
       </p:ext>
     </p:extLst>
   </p:cSld>
@@ -10129,7 +10157,7 @@
           <p:cNvPr id="2" name="Title 1">
             <a:extLst>
               <a:ext uri="{FF2B5EF4-FFF2-40B4-BE49-F238E27FC236}">
-                <a16:creationId xmlns:a16="http://schemas.microsoft.com/office/drawing/2014/main" id="{AB1A53DB-70FB-432D-BCAF-DCFBCCE6B023}"/>
+                <a16:creationId xmlns:a16="http://schemas.microsoft.com/office/drawing/2014/main" id="{1183D399-4942-4C83-BF24-B436160EB419}"/>
               </a:ext>
             </a:extLst>
           </p:cNvPr>
@@ -10146,12 +10174,8 @@
           <a:lstStyle/>
           <a:p>
             <a:r>
-              <a:rPr lang="en-US" dirty="0" err="1"/>
-              <a:t>MapBox</a:t>
-            </a:r>
-            <a:r>
-              <a:rPr lang="en-US" dirty="0"/>
-              <a:t> API</a:t>
+              <a:rPr lang="en-US" dirty="0"/>
+              <a:t>Sensors</a:t>
             </a:r>
           </a:p>
         </p:txBody>
@@ -10161,7 +10185,7 @@
           <p:cNvPr id="3" name="Content Placeholder 2">
             <a:extLst>
               <a:ext uri="{FF2B5EF4-FFF2-40B4-BE49-F238E27FC236}">
-                <a16:creationId xmlns:a16="http://schemas.microsoft.com/office/drawing/2014/main" id="{A6866161-0CFB-4603-9213-EC107AF2D1E8}"/>
+                <a16:creationId xmlns:a16="http://schemas.microsoft.com/office/drawing/2014/main" id="{0DD74EA9-167B-4010-AF9E-BA2A7445C522}"/>
               </a:ext>
             </a:extLst>
           </p:cNvPr>
@@ -10172,72 +10196,96 @@
             <p:ph idx="1"/>
           </p:nvPr>
         </p:nvSpPr>
-        <p:spPr/>
-        <p:txBody>
-          <a:bodyPr>
-            <a:normAutofit/>
-          </a:bodyPr>
-          <a:lstStyle/>
-          <a:p>
-            <a:r>
-              <a:rPr lang="en-US" dirty="0"/>
-              <a:t>Dove into documentation</a:t>
-            </a:r>
-          </a:p>
-          <a:p>
-            <a:r>
-              <a:rPr lang="en-US" dirty="0"/>
-              <a:t>Used our acquired key to interact with the API</a:t>
-            </a:r>
-          </a:p>
-          <a:p>
-            <a:r>
-              <a:rPr lang="en-US" dirty="0"/>
-              <a:t>Implemented drawing a map</a:t>
-            </a:r>
-          </a:p>
-          <a:p>
-            <a:r>
-              <a:rPr lang="en-US" dirty="0"/>
-              <a:t>Current points are arbitrary, but easily modified to reflect points produced by algorithm </a:t>
-            </a:r>
-          </a:p>
-          <a:p>
-            <a:r>
-              <a:rPr lang="en-US" dirty="0"/>
-              <a:t>Currently working on:</a:t>
+        <p:spPr>
+          <a:xfrm>
+            <a:off x="2589212" y="1564344"/>
+            <a:ext cx="8915400" cy="4509244"/>
+          </a:xfrm>
+        </p:spPr>
+        <p:txBody>
+          <a:bodyPr/>
+          <a:lstStyle/>
+          <a:p>
+            <a:r>
+              <a:rPr lang="en-US" dirty="0"/>
+              <a:t>Accelerometer and Magnetometer</a:t>
             </a:r>
           </a:p>
           <a:p>
             <a:pPr lvl="1"/>
             <a:r>
               <a:rPr lang="en-US" dirty="0"/>
-              <a:t>Refining large map into a rectangular shaped map in direction phone is pointing</a:t>
+              <a:t>Used to calculate the orientation of the phone</a:t>
             </a:r>
           </a:p>
           <a:p>
             <a:pPr lvl="1"/>
             <a:r>
               <a:rPr lang="en-US" dirty="0"/>
-              <a:t>Drawing markers for landmarks in refined map</a:t>
+              <a:t>Gives access to:</a:t>
+            </a:r>
+          </a:p>
+          <a:p>
+            <a:pPr lvl="2"/>
+            <a:r>
+              <a:rPr lang="en-US" dirty="0"/>
+              <a:t>Azimuth</a:t>
+            </a:r>
+          </a:p>
+          <a:p>
+            <a:pPr lvl="2"/>
+            <a:r>
+              <a:rPr lang="en-US" dirty="0"/>
+              <a:t>Pitch</a:t>
+            </a:r>
+          </a:p>
+          <a:p>
+            <a:pPr lvl="2"/>
+            <a:r>
+              <a:rPr lang="en-US" dirty="0"/>
+              <a:t>Roll</a:t>
+            </a:r>
+          </a:p>
+          <a:p>
+            <a:r>
+              <a:rPr lang="en-US" dirty="0"/>
+              <a:t>GPS</a:t>
             </a:r>
           </a:p>
           <a:p>
             <a:pPr lvl="1"/>
             <a:r>
               <a:rPr lang="en-US" dirty="0"/>
-              <a:t>Drawing custom markers (custom landmark locations)</a:t>
+              <a:t>Requires explicit user permission</a:t>
             </a:r>
           </a:p>
           <a:p>
             <a:pPr lvl="1"/>
             <a:r>
               <a:rPr lang="en-US" dirty="0"/>
-              <a:t>Retrieving location data from refined map</a:t>
-            </a:r>
-          </a:p>
-          <a:p>
-            <a:endParaRPr lang="en-US" dirty="0"/>
+              <a:t>Gives access to:</a:t>
+            </a:r>
+          </a:p>
+          <a:p>
+            <a:pPr lvl="2"/>
+            <a:r>
+              <a:rPr lang="en-US" dirty="0"/>
+              <a:t>Latitude</a:t>
+            </a:r>
+          </a:p>
+          <a:p>
+            <a:pPr lvl="2"/>
+            <a:r>
+              <a:rPr lang="en-US" dirty="0"/>
+              <a:t>Longitude</a:t>
+            </a:r>
+          </a:p>
+          <a:p>
+            <a:pPr lvl="2"/>
+            <a:r>
+              <a:rPr lang="en-US" dirty="0"/>
+              <a:t>Elevation</a:t>
+            </a:r>
           </a:p>
         </p:txBody>
       </p:sp>
@@ -10246,7 +10294,7 @@
           <p:cNvPr id="4" name="Slide Number Placeholder 3">
             <a:extLst>
               <a:ext uri="{FF2B5EF4-FFF2-40B4-BE49-F238E27FC236}">
-                <a16:creationId xmlns:a16="http://schemas.microsoft.com/office/drawing/2014/main" id="{46B07E3D-35B9-4761-9561-21093A66968A}"/>
+                <a16:creationId xmlns:a16="http://schemas.microsoft.com/office/drawing/2014/main" id="{54E49C07-2ECF-4660-8582-3A662CD53904}"/>
               </a:ext>
             </a:extLst>
           </p:cNvPr>
@@ -10274,7 +10322,7 @@
     </p:spTree>
     <p:extLst>
       <p:ext uri="{BB962C8B-B14F-4D97-AF65-F5344CB8AC3E}">
-        <p14:creationId xmlns:p14="http://schemas.microsoft.com/office/powerpoint/2010/main" val="3591823853"/>
+        <p14:creationId xmlns:p14="http://schemas.microsoft.com/office/powerpoint/2010/main" val="3652658612"/>
       </p:ext>
     </p:extLst>
   </p:cSld>
@@ -10306,7 +10354,7 @@
           <p:cNvPr id="2" name="Title 1">
             <a:extLst>
               <a:ext uri="{FF2B5EF4-FFF2-40B4-BE49-F238E27FC236}">
-                <a16:creationId xmlns:a16="http://schemas.microsoft.com/office/drawing/2014/main" id="{0B3AFE50-BDBE-4AED-81A7-0DF1A0F76CDF}"/>
+                <a16:creationId xmlns:a16="http://schemas.microsoft.com/office/drawing/2014/main" id="{AB1A53DB-70FB-432D-BCAF-DCFBCCE6B023}"/>
               </a:ext>
             </a:extLst>
           </p:cNvPr>
@@ -10323,8 +10371,12 @@
           <a:lstStyle/>
           <a:p>
             <a:r>
-              <a:rPr lang="en-US" dirty="0"/>
-              <a:t>DEMO TIME</a:t>
+              <a:rPr lang="en-US" dirty="0" err="1"/>
+              <a:t>MapBox</a:t>
+            </a:r>
+            <a:r>
+              <a:rPr lang="en-US" dirty="0"/>
+              <a:t> API</a:t>
             </a:r>
           </a:p>
         </p:txBody>
@@ -10334,7 +10386,7 @@
           <p:cNvPr id="3" name="Content Placeholder 2">
             <a:extLst>
               <a:ext uri="{FF2B5EF4-FFF2-40B4-BE49-F238E27FC236}">
-                <a16:creationId xmlns:a16="http://schemas.microsoft.com/office/drawing/2014/main" id="{80DD7C09-83AA-465B-95B7-B255B8FBA959}"/>
+                <a16:creationId xmlns:a16="http://schemas.microsoft.com/office/drawing/2014/main" id="{A6866161-0CFB-4603-9213-EC107AF2D1E8}"/>
               </a:ext>
             </a:extLst>
           </p:cNvPr>
@@ -10347,10 +10399,70 @@
         </p:nvSpPr>
         <p:spPr/>
         <p:txBody>
-          <a:bodyPr/>
-          <a:lstStyle/>
-          <a:p>
-            <a:endParaRPr lang="en-US"/>
+          <a:bodyPr>
+            <a:normAutofit/>
+          </a:bodyPr>
+          <a:lstStyle/>
+          <a:p>
+            <a:r>
+              <a:rPr lang="en-US" dirty="0"/>
+              <a:t>Dove into documentation</a:t>
+            </a:r>
+          </a:p>
+          <a:p>
+            <a:r>
+              <a:rPr lang="en-US" dirty="0"/>
+              <a:t>Used our acquired key to interact with the API</a:t>
+            </a:r>
+          </a:p>
+          <a:p>
+            <a:r>
+              <a:rPr lang="en-US" dirty="0"/>
+              <a:t>Implemented drawing a map</a:t>
+            </a:r>
+          </a:p>
+          <a:p>
+            <a:r>
+              <a:rPr lang="en-US" dirty="0"/>
+              <a:t>Current points are arbitrary, but easily modified to reflect points produced by algorithm </a:t>
+            </a:r>
+          </a:p>
+          <a:p>
+            <a:r>
+              <a:rPr lang="en-US" dirty="0"/>
+              <a:t>Currently working on:</a:t>
+            </a:r>
+          </a:p>
+          <a:p>
+            <a:pPr lvl="1"/>
+            <a:r>
+              <a:rPr lang="en-US" dirty="0"/>
+              <a:t>Refining large map into a rectangular shaped map in direction phone is pointing</a:t>
+            </a:r>
+          </a:p>
+          <a:p>
+            <a:pPr lvl="1"/>
+            <a:r>
+              <a:rPr lang="en-US" dirty="0"/>
+              <a:t>Drawing markers for landmarks in refined map</a:t>
+            </a:r>
+          </a:p>
+          <a:p>
+            <a:pPr lvl="1"/>
+            <a:r>
+              <a:rPr lang="en-US" dirty="0"/>
+              <a:t>Drawing custom markers (custom landmark locations)</a:t>
+            </a:r>
+          </a:p>
+          <a:p>
+            <a:pPr lvl="1"/>
+            <a:r>
+              <a:rPr lang="en-US" dirty="0"/>
+              <a:t>Retrieving location data from refined map</a:t>
+            </a:r>
+          </a:p>
+          <a:p>
+            <a:endParaRPr lang="en-US" dirty="0"/>
           </a:p>
         </p:txBody>
       </p:sp>
@@ -10359,7 +10471,7 @@
           <p:cNvPr id="4" name="Slide Number Placeholder 3">
             <a:extLst>
               <a:ext uri="{FF2B5EF4-FFF2-40B4-BE49-F238E27FC236}">
-                <a16:creationId xmlns:a16="http://schemas.microsoft.com/office/drawing/2014/main" id="{AE31E36E-89F5-4BF3-9156-8D604472F1CC}"/>
+                <a16:creationId xmlns:a16="http://schemas.microsoft.com/office/drawing/2014/main" id="{46B07E3D-35B9-4761-9561-21093A66968A}"/>
               </a:ext>
             </a:extLst>
           </p:cNvPr>
@@ -10387,7 +10499,7 @@
     </p:spTree>
     <p:extLst>
       <p:ext uri="{BB962C8B-B14F-4D97-AF65-F5344CB8AC3E}">
-        <p14:creationId xmlns:p14="http://schemas.microsoft.com/office/powerpoint/2010/main" val="4021183166"/>
+        <p14:creationId xmlns:p14="http://schemas.microsoft.com/office/powerpoint/2010/main" val="3591823853"/>
       </p:ext>
     </p:extLst>
   </p:cSld>
@@ -10419,7 +10531,7 @@
           <p:cNvPr id="2" name="Title 1">
             <a:extLst>
               <a:ext uri="{FF2B5EF4-FFF2-40B4-BE49-F238E27FC236}">
-                <a16:creationId xmlns:a16="http://schemas.microsoft.com/office/drawing/2014/main" id="{E745B5BA-CEC8-422E-982B-F8BC98723754}"/>
+                <a16:creationId xmlns:a16="http://schemas.microsoft.com/office/drawing/2014/main" id="{0B3AFE50-BDBE-4AED-81A7-0DF1A0F76CDF}"/>
               </a:ext>
             </a:extLst>
           </p:cNvPr>
@@ -10437,7 +10549,7 @@
           <a:p>
             <a:r>
               <a:rPr lang="en-US" dirty="0"/>
-              <a:t>Questions?</a:t>
+              <a:t>DEMO TIME</a:t>
             </a:r>
           </a:p>
         </p:txBody>
@@ -10447,7 +10559,7 @@
           <p:cNvPr id="3" name="Content Placeholder 2">
             <a:extLst>
               <a:ext uri="{FF2B5EF4-FFF2-40B4-BE49-F238E27FC236}">
-                <a16:creationId xmlns:a16="http://schemas.microsoft.com/office/drawing/2014/main" id="{737908CF-DFCF-479E-B76A-2140E612B90F}"/>
+                <a16:creationId xmlns:a16="http://schemas.microsoft.com/office/drawing/2014/main" id="{80DD7C09-83AA-465B-95B7-B255B8FBA959}"/>
               </a:ext>
             </a:extLst>
           </p:cNvPr>
@@ -10472,7 +10584,7 @@
           <p:cNvPr id="4" name="Slide Number Placeholder 3">
             <a:extLst>
               <a:ext uri="{FF2B5EF4-FFF2-40B4-BE49-F238E27FC236}">
-                <a16:creationId xmlns:a16="http://schemas.microsoft.com/office/drawing/2014/main" id="{DF8C3242-F7F3-4B6D-BE97-C08D1A7EC84D}"/>
+                <a16:creationId xmlns:a16="http://schemas.microsoft.com/office/drawing/2014/main" id="{AE31E36E-89F5-4BF3-9156-8D604472F1CC}"/>
               </a:ext>
             </a:extLst>
           </p:cNvPr>
@@ -10500,7 +10612,7 @@
     </p:spTree>
     <p:extLst>
       <p:ext uri="{BB962C8B-B14F-4D97-AF65-F5344CB8AC3E}">
-        <p14:creationId xmlns:p14="http://schemas.microsoft.com/office/powerpoint/2010/main" val="1587191523"/>
+        <p14:creationId xmlns:p14="http://schemas.microsoft.com/office/powerpoint/2010/main" val="4021183166"/>
       </p:ext>
     </p:extLst>
   </p:cSld>
@@ -10532,7 +10644,7 @@
           <p:cNvPr id="2" name="Title 1">
             <a:extLst>
               <a:ext uri="{FF2B5EF4-FFF2-40B4-BE49-F238E27FC236}">
-                <a16:creationId xmlns:a16="http://schemas.microsoft.com/office/drawing/2014/main" id="{0925D358-7D77-482A-BA62-AF4AAB8E726F}"/>
+                <a16:creationId xmlns:a16="http://schemas.microsoft.com/office/drawing/2014/main" id="{E745B5BA-CEC8-422E-982B-F8BC98723754}"/>
               </a:ext>
             </a:extLst>
           </p:cNvPr>
@@ -10550,7 +10662,7 @@
           <a:p>
             <a:r>
               <a:rPr lang="en-US" dirty="0"/>
-              <a:t>Unofficial Sprint</a:t>
+              <a:t>Questions?</a:t>
             </a:r>
           </a:p>
         </p:txBody>
@@ -10560,7 +10672,7 @@
           <p:cNvPr id="3" name="Content Placeholder 2">
             <a:extLst>
               <a:ext uri="{FF2B5EF4-FFF2-40B4-BE49-F238E27FC236}">
-                <a16:creationId xmlns:a16="http://schemas.microsoft.com/office/drawing/2014/main" id="{6A41BCA7-F42D-4C14-9EE3-C0604BD1C8ED}"/>
+                <a16:creationId xmlns:a16="http://schemas.microsoft.com/office/drawing/2014/main" id="{737908CF-DFCF-479E-B76A-2140E612B90F}"/>
               </a:ext>
             </a:extLst>
           </p:cNvPr>
@@ -10585,7 +10697,7 @@
           <p:cNvPr id="4" name="Slide Number Placeholder 3">
             <a:extLst>
               <a:ext uri="{FF2B5EF4-FFF2-40B4-BE49-F238E27FC236}">
-                <a16:creationId xmlns:a16="http://schemas.microsoft.com/office/drawing/2014/main" id="{BB4882C3-32B5-455C-9E1C-9DBFC4D3EA7C}"/>
+                <a16:creationId xmlns:a16="http://schemas.microsoft.com/office/drawing/2014/main" id="{DF8C3242-F7F3-4B6D-BE97-C08D1A7EC84D}"/>
               </a:ext>
             </a:extLst>
           </p:cNvPr>
@@ -10613,7 +10725,7 @@
     </p:spTree>
     <p:extLst>
       <p:ext uri="{BB962C8B-B14F-4D97-AF65-F5344CB8AC3E}">
-        <p14:creationId xmlns:p14="http://schemas.microsoft.com/office/powerpoint/2010/main" val="4099954266"/>
+        <p14:creationId xmlns:p14="http://schemas.microsoft.com/office/powerpoint/2010/main" val="1587191523"/>
       </p:ext>
     </p:extLst>
   </p:cSld>
@@ -10645,7 +10757,7 @@
           <p:cNvPr id="2" name="Title 1">
             <a:extLst>
               <a:ext uri="{FF2B5EF4-FFF2-40B4-BE49-F238E27FC236}">
-                <a16:creationId xmlns:a16="http://schemas.microsoft.com/office/drawing/2014/main" id="{AD0AB5FE-C138-421F-92EE-1844FDF7256A}"/>
+                <a16:creationId xmlns:a16="http://schemas.microsoft.com/office/drawing/2014/main" id="{0925D358-7D77-482A-BA62-AF4AAB8E726F}"/>
               </a:ext>
             </a:extLst>
           </p:cNvPr>
@@ -10663,7 +10775,7 @@
           <a:p>
             <a:r>
               <a:rPr lang="en-US" dirty="0"/>
-              <a:t>Sprint 2</a:t>
+              <a:t>Unofficial Sprint</a:t>
             </a:r>
           </a:p>
         </p:txBody>
@@ -10673,7 +10785,7 @@
           <p:cNvPr id="3" name="Content Placeholder 2">
             <a:extLst>
               <a:ext uri="{FF2B5EF4-FFF2-40B4-BE49-F238E27FC236}">
-                <a16:creationId xmlns:a16="http://schemas.microsoft.com/office/drawing/2014/main" id="{903C4FAD-1519-4538-BD82-6A08BE138CB6}"/>
+                <a16:creationId xmlns:a16="http://schemas.microsoft.com/office/drawing/2014/main" id="{6A41BCA7-F42D-4C14-9EE3-C0604BD1C8ED}"/>
               </a:ext>
             </a:extLst>
           </p:cNvPr>
@@ -10698,7 +10810,7 @@
           <p:cNvPr id="4" name="Slide Number Placeholder 3">
             <a:extLst>
               <a:ext uri="{FF2B5EF4-FFF2-40B4-BE49-F238E27FC236}">
-                <a16:creationId xmlns:a16="http://schemas.microsoft.com/office/drawing/2014/main" id="{2D0C1AF0-2A5F-49B5-B744-94150C0B7BD5}"/>
+                <a16:creationId xmlns:a16="http://schemas.microsoft.com/office/drawing/2014/main" id="{BB4882C3-32B5-455C-9E1C-9DBFC4D3EA7C}"/>
               </a:ext>
             </a:extLst>
           </p:cNvPr>
@@ -10726,7 +10838,7 @@
     </p:spTree>
     <p:extLst>
       <p:ext uri="{BB962C8B-B14F-4D97-AF65-F5344CB8AC3E}">
-        <p14:creationId xmlns:p14="http://schemas.microsoft.com/office/powerpoint/2010/main" val="632679123"/>
+        <p14:creationId xmlns:p14="http://schemas.microsoft.com/office/powerpoint/2010/main" val="4099954266"/>
       </p:ext>
     </p:extLst>
   </p:cSld>
@@ -10758,6 +10870,119 @@
           <p:cNvPr id="2" name="Title 1">
             <a:extLst>
               <a:ext uri="{FF2B5EF4-FFF2-40B4-BE49-F238E27FC236}">
+                <a16:creationId xmlns:a16="http://schemas.microsoft.com/office/drawing/2014/main" id="{AD0AB5FE-C138-421F-92EE-1844FDF7256A}"/>
+              </a:ext>
+            </a:extLst>
+          </p:cNvPr>
+          <p:cNvSpPr>
+            <a:spLocks noGrp="1"/>
+          </p:cNvSpPr>
+          <p:nvPr>
+            <p:ph type="title"/>
+          </p:nvPr>
+        </p:nvSpPr>
+        <p:spPr/>
+        <p:txBody>
+          <a:bodyPr/>
+          <a:lstStyle/>
+          <a:p>
+            <a:r>
+              <a:rPr lang="en-US" dirty="0"/>
+              <a:t>Sprint 2</a:t>
+            </a:r>
+          </a:p>
+        </p:txBody>
+      </p:sp>
+      <p:sp>
+        <p:nvSpPr>
+          <p:cNvPr id="3" name="Content Placeholder 2">
+            <a:extLst>
+              <a:ext uri="{FF2B5EF4-FFF2-40B4-BE49-F238E27FC236}">
+                <a16:creationId xmlns:a16="http://schemas.microsoft.com/office/drawing/2014/main" id="{903C4FAD-1519-4538-BD82-6A08BE138CB6}"/>
+              </a:ext>
+            </a:extLst>
+          </p:cNvPr>
+          <p:cNvSpPr>
+            <a:spLocks noGrp="1"/>
+          </p:cNvSpPr>
+          <p:nvPr>
+            <p:ph idx="1"/>
+          </p:nvPr>
+        </p:nvSpPr>
+        <p:spPr/>
+        <p:txBody>
+          <a:bodyPr/>
+          <a:lstStyle/>
+          <a:p>
+            <a:endParaRPr lang="en-US"/>
+          </a:p>
+        </p:txBody>
+      </p:sp>
+      <p:sp>
+        <p:nvSpPr>
+          <p:cNvPr id="4" name="Slide Number Placeholder 3">
+            <a:extLst>
+              <a:ext uri="{FF2B5EF4-FFF2-40B4-BE49-F238E27FC236}">
+                <a16:creationId xmlns:a16="http://schemas.microsoft.com/office/drawing/2014/main" id="{2D0C1AF0-2A5F-49B5-B744-94150C0B7BD5}"/>
+              </a:ext>
+            </a:extLst>
+          </p:cNvPr>
+          <p:cNvSpPr>
+            <a:spLocks noGrp="1"/>
+          </p:cNvSpPr>
+          <p:nvPr>
+            <p:ph type="sldNum" sz="quarter" idx="12"/>
+          </p:nvPr>
+        </p:nvSpPr>
+        <p:spPr/>
+        <p:txBody>
+          <a:bodyPr/>
+          <a:lstStyle/>
+          <a:p>
+            <a:fld id="{D57F1E4F-1CFF-5643-939E-217C01CDF565}" type="slidenum">
+              <a:rPr lang="en-US" smtClean="0"/>
+              <a:pPr/>
+              <a:t>27</a:t>
+            </a:fld>
+            <a:endParaRPr lang="en-US" dirty="0"/>
+          </a:p>
+        </p:txBody>
+      </p:sp>
+    </p:spTree>
+    <p:extLst>
+      <p:ext uri="{BB962C8B-B14F-4D97-AF65-F5344CB8AC3E}">
+        <p14:creationId xmlns:p14="http://schemas.microsoft.com/office/powerpoint/2010/main" val="632679123"/>
+      </p:ext>
+    </p:extLst>
+  </p:cSld>
+  <p:clrMapOvr>
+    <a:masterClrMapping/>
+  </p:clrMapOvr>
+</p:sld>
+</file>
+
+<file path=ppt/slides/slide28.xml><?xml version="1.0" encoding="utf-8"?>
+<p:sld xmlns:a="http://schemas.openxmlformats.org/drawingml/2006/main" xmlns:r="http://schemas.openxmlformats.org/officeDocument/2006/relationships" xmlns:p="http://schemas.openxmlformats.org/presentationml/2006/main">
+  <p:cSld>
+    <p:spTree>
+      <p:nvGrpSpPr>
+        <p:cNvPr id="1" name=""/>
+        <p:cNvGrpSpPr/>
+        <p:nvPr/>
+      </p:nvGrpSpPr>
+      <p:grpSpPr>
+        <a:xfrm>
+          <a:off x="0" y="0"/>
+          <a:ext cx="0" cy="0"/>
+          <a:chOff x="0" y="0"/>
+          <a:chExt cx="0" cy="0"/>
+        </a:xfrm>
+      </p:grpSpPr>
+      <p:sp>
+        <p:nvSpPr>
+          <p:cNvPr id="2" name="Title 1">
+            <a:extLst>
+              <a:ext uri="{FF2B5EF4-FFF2-40B4-BE49-F238E27FC236}">
                 <a16:creationId xmlns:a16="http://schemas.microsoft.com/office/drawing/2014/main" id="{5DE1D604-AE0D-4070-84FA-E88517FF5DFF}"/>
               </a:ext>
             </a:extLst>
@@ -10830,7 +11055,7 @@
             <a:fld id="{D57F1E4F-1CFF-5643-939E-217C01CDF565}" type="slidenum">
               <a:rPr lang="en-US" smtClean="0"/>
               <a:pPr/>
-              <a:t>27</a:t>
+              <a:t>28</a:t>
             </a:fld>
             <a:endParaRPr lang="en-US" dirty="0"/>
           </a:p>

</xml_diff>

<commit_message>
Fixed ALL Merge Conflicts
</commit_message>
<xml_diff>
--- a/Presentations/Sprint01 ReviewMeeting.pptx
+++ b/Presentations/Sprint01 ReviewMeeting.pptx
@@ -5,7 +5,7 @@
     <p:sldMasterId id="2147483648" r:id="rId1"/>
   </p:sldMasterIdLst>
   <p:notesMasterIdLst>
-    <p:notesMasterId r:id="rId29"/>
+    <p:notesMasterId r:id="rId33"/>
   </p:notesMasterIdLst>
   <p:sldIdLst>
     <p:sldId id="256" r:id="rId2"/>
@@ -26,15 +26,19 @@
     <p:sldId id="282" r:id="rId17"/>
     <p:sldId id="280" r:id="rId18"/>
     <p:sldId id="275" r:id="rId19"/>
-    <p:sldId id="266" r:id="rId20"/>
-    <p:sldId id="276" r:id="rId21"/>
-    <p:sldId id="269" r:id="rId22"/>
-    <p:sldId id="270" r:id="rId23"/>
-    <p:sldId id="267" r:id="rId24"/>
-    <p:sldId id="277" r:id="rId25"/>
-    <p:sldId id="268" r:id="rId26"/>
-    <p:sldId id="273" r:id="rId27"/>
-    <p:sldId id="278" r:id="rId28"/>
+    <p:sldId id="267" r:id="rId20"/>
+    <p:sldId id="283" r:id="rId21"/>
+    <p:sldId id="284" r:id="rId22"/>
+    <p:sldId id="285" r:id="rId23"/>
+    <p:sldId id="276" r:id="rId24"/>
+    <p:sldId id="286" r:id="rId25"/>
+    <p:sldId id="287" r:id="rId26"/>
+    <p:sldId id="270" r:id="rId27"/>
+    <p:sldId id="288" r:id="rId28"/>
+    <p:sldId id="277" r:id="rId29"/>
+    <p:sldId id="268" r:id="rId30"/>
+    <p:sldId id="273" r:id="rId31"/>
+    <p:sldId id="278" r:id="rId32"/>
   </p:sldIdLst>
   <p:sldSz cx="12192000" cy="6858000"/>
   <p:notesSz cx="6858000" cy="9144000"/>
@@ -156,11 +160,15 @@
             <p14:sldId id="282"/>
             <p14:sldId id="280"/>
             <p14:sldId id="275"/>
-            <p14:sldId id="266"/>
+            <p14:sldId id="267"/>
+            <p14:sldId id="283"/>
+            <p14:sldId id="284"/>
+            <p14:sldId id="285"/>
             <p14:sldId id="276"/>
-            <p14:sldId id="269"/>
+            <p14:sldId id="286"/>
+            <p14:sldId id="287"/>
             <p14:sldId id="270"/>
-            <p14:sldId id="267"/>
+            <p14:sldId id="288"/>
             <p14:sldId id="277"/>
             <p14:sldId id="268"/>
             <p14:sldId id="273"/>
@@ -302,7 +310,7 @@
           <a:p>
             <a:fld id="{19BF4C59-5F08-44C4-B153-33D13F8820E2}" type="datetimeFigureOut">
               <a:rPr lang="en-US" smtClean="0"/>
-              <a:t>11/27/2018</a:t>
+              <a:t>27/11/2018</a:t>
             </a:fld>
             <a:endParaRPr lang="en-US"/>
           </a:p>
@@ -757,7 +765,7 @@
           <a:p>
             <a:fld id="{F496603D-C74F-4091-A2D3-4695C477BDF9}" type="datetime1">
               <a:rPr lang="en-US" smtClean="0"/>
-              <a:t>11/27/2018</a:t>
+              <a:t>27/11/2018</a:t>
             </a:fld>
             <a:endParaRPr lang="en-US" dirty="0"/>
           </a:p>
@@ -1091,7 +1099,7 @@
           <a:p>
             <a:fld id="{59B7F04C-D88F-4E87-8405-047FE8998599}" type="datetime1">
               <a:rPr lang="en-US" smtClean="0"/>
-              <a:t>11/27/2018</a:t>
+              <a:t>27/11/2018</a:t>
             </a:fld>
             <a:endParaRPr lang="en-US" dirty="0"/>
           </a:p>
@@ -1488,7 +1496,7 @@
           <a:p>
             <a:fld id="{F53A2574-81AC-4C8C-9315-A798CBD15508}" type="datetime1">
               <a:rPr lang="en-US" smtClean="0"/>
-              <a:t>11/27/2018</a:t>
+              <a:t>27/11/2018</a:t>
             </a:fld>
             <a:endParaRPr lang="en-US" dirty="0"/>
           </a:p>
@@ -1820,7 +1828,7 @@
           <a:p>
             <a:fld id="{9F79353D-7D17-4E5D-B6AA-BEFF3E0E4AED}" type="datetime1">
               <a:rPr lang="en-US" smtClean="0"/>
-              <a:t>11/27/2018</a:t>
+              <a:t>27/11/2018</a:t>
             </a:fld>
             <a:endParaRPr lang="en-US" dirty="0"/>
           </a:p>
@@ -2136,7 +2144,7 @@
           <a:p>
             <a:fld id="{62E83889-C6FA-4794-A93A-78152215D16A}" type="datetime1">
               <a:rPr lang="en-US" smtClean="0"/>
-              <a:t>11/27/2018</a:t>
+              <a:t>27/11/2018</a:t>
             </a:fld>
             <a:endParaRPr lang="en-US" dirty="0"/>
           </a:p>
@@ -2528,7 +2536,7 @@
           <a:p>
             <a:fld id="{A0ED2F6D-E95C-4D36-9BBD-35E186A95236}" type="datetime1">
               <a:rPr lang="en-US" smtClean="0"/>
-              <a:t>11/27/2018</a:t>
+              <a:t>27/11/2018</a:t>
             </a:fld>
             <a:endParaRPr lang="en-US" dirty="0"/>
           </a:p>
@@ -2781,7 +2789,7 @@
           <a:p>
             <a:fld id="{3F053689-2F89-4CD8-BBCC-628181C06D6F}" type="datetime1">
               <a:rPr lang="en-US" smtClean="0"/>
-              <a:t>11/27/2018</a:t>
+              <a:t>27/11/2018</a:t>
             </a:fld>
             <a:endParaRPr lang="en-US" dirty="0"/>
           </a:p>
@@ -3039,7 +3047,7 @@
           <a:p>
             <a:fld id="{97B04EC7-3A70-4154-BE8C-716D5F7D393A}" type="datetime1">
               <a:rPr lang="en-US" smtClean="0"/>
-              <a:t>11/27/2018</a:t>
+              <a:t>27/11/2018</a:t>
             </a:fld>
             <a:endParaRPr lang="en-US" dirty="0"/>
           </a:p>
@@ -3297,7 +3305,7 @@
           <a:p>
             <a:fld id="{324BC052-11CD-4DCD-ACF1-8E2FFA6E860A}" type="datetime1">
               <a:rPr lang="en-US" smtClean="0"/>
-              <a:t>11/27/2018</a:t>
+              <a:t>27/11/2018</a:t>
             </a:fld>
             <a:endParaRPr lang="en-US" dirty="0"/>
           </a:p>
@@ -3622,7 +3630,7 @@
           <a:p>
             <a:fld id="{76C8D67C-A063-467C-BC65-C57E079F80F5}" type="datetime1">
               <a:rPr lang="en-US" smtClean="0"/>
-              <a:t>11/27/2018</a:t>
+              <a:t>27/11/2018</a:t>
             </a:fld>
             <a:endParaRPr lang="en-US" dirty="0"/>
           </a:p>
@@ -3941,7 +3949,7 @@
           <a:p>
             <a:fld id="{B9D1D154-EC59-400A-90AD-D66E129D1C81}" type="datetime1">
               <a:rPr lang="en-US" smtClean="0"/>
-              <a:t>11/27/2018</a:t>
+              <a:t>27/11/2018</a:t>
             </a:fld>
             <a:endParaRPr lang="en-US" dirty="0"/>
           </a:p>
@@ -4394,7 +4402,7 @@
           <a:p>
             <a:fld id="{1289DCF8-DDB3-4ED6-91C7-A41042BCCEC0}" type="datetime1">
               <a:rPr lang="en-US" smtClean="0"/>
-              <a:t>11/27/2018</a:t>
+              <a:t>27/11/2018</a:t>
             </a:fld>
             <a:endParaRPr lang="en-US" dirty="0"/>
           </a:p>
@@ -4595,7 +4603,7 @@
           <a:p>
             <a:fld id="{B7D66469-CA9A-4262-8925-C1B460FFD1FE}" type="datetime1">
               <a:rPr lang="en-US" smtClean="0"/>
-              <a:t>11/27/2018</a:t>
+              <a:t>27/11/2018</a:t>
             </a:fld>
             <a:endParaRPr lang="en-US" dirty="0"/>
           </a:p>
@@ -4768,7 +4776,7 @@
           <a:p>
             <a:fld id="{8FFB0B98-420B-4669-A38B-6EA24DD00E40}" type="datetime1">
               <a:rPr lang="en-US" smtClean="0"/>
-              <a:t>11/27/2018</a:t>
+              <a:t>27/11/2018</a:t>
             </a:fld>
             <a:endParaRPr lang="en-US" dirty="0"/>
           </a:p>
@@ -5097,7 +5105,7 @@
           <a:p>
             <a:fld id="{57A84040-A505-4603-8AF8-947AF9A8C6B0}" type="datetime1">
               <a:rPr lang="en-US" smtClean="0"/>
-              <a:t>11/27/2018</a:t>
+              <a:t>27/11/2018</a:t>
             </a:fld>
             <a:endParaRPr lang="en-US" dirty="0"/>
           </a:p>
@@ -5438,7 +5446,7 @@
           <a:p>
             <a:fld id="{C257B495-959E-4C32-9725-73949DB74722}" type="datetime1">
               <a:rPr lang="en-US" smtClean="0"/>
-              <a:t>11/27/2018</a:t>
+              <a:t>27/11/2018</a:t>
             </a:fld>
             <a:endParaRPr lang="en-US" dirty="0"/>
           </a:p>
@@ -7551,7 +7559,7 @@
           <a:p>
             <a:fld id="{FC130E8E-EE4B-4D52-BAF0-F4AA6E538D19}" type="datetime1">
               <a:rPr lang="en-US" smtClean="0"/>
-              <a:t>11/27/2018</a:t>
+              <a:t>27/11/2018</a:t>
             </a:fld>
             <a:endParaRPr lang="en-US" dirty="0"/>
           </a:p>
@@ -9559,7 +9567,7 @@
           <p:cNvPr id="2" name="Title 1">
             <a:extLst>
               <a:ext uri="{FF2B5EF4-FFF2-40B4-BE49-F238E27FC236}">
-                <a16:creationId xmlns:a16="http://schemas.microsoft.com/office/drawing/2014/main" id="{83DFF23D-959A-44BC-BE78-1D0330CDF164}"/>
+                <a16:creationId xmlns:a16="http://schemas.microsoft.com/office/drawing/2014/main" id="{F2AB9014-8A31-4680-8991-595A8A0A7749}"/>
               </a:ext>
             </a:extLst>
           </p:cNvPr>
@@ -9577,7 +9585,7 @@
           <a:p>
             <a:r>
               <a:rPr lang="en-US" dirty="0"/>
-              <a:t>Algorithm</a:t>
+              <a:t>Possible Cloud Hosts for Databases</a:t>
             </a:r>
           </a:p>
         </p:txBody>
@@ -9587,7 +9595,7 @@
           <p:cNvPr id="3" name="Content Placeholder 2">
             <a:extLst>
               <a:ext uri="{FF2B5EF4-FFF2-40B4-BE49-F238E27FC236}">
-                <a16:creationId xmlns:a16="http://schemas.microsoft.com/office/drawing/2014/main" id="{706A48C4-F2C9-48C7-B302-4ADE777DDB2E}"/>
+                <a16:creationId xmlns:a16="http://schemas.microsoft.com/office/drawing/2014/main" id="{943385D6-20E6-41CB-94E2-C41E10317A02}"/>
               </a:ext>
             </a:extLst>
           </p:cNvPr>
@@ -9598,12 +9606,105 @@
             <p:ph idx="1"/>
           </p:nvPr>
         </p:nvSpPr>
-        <p:spPr/>
-        <p:txBody>
-          <a:bodyPr/>
-          <a:lstStyle/>
-          <a:p>
-            <a:endParaRPr lang="en-US"/>
+        <p:spPr>
+          <a:xfrm>
+            <a:off x="2589212" y="1394012"/>
+            <a:ext cx="8915400" cy="4554069"/>
+          </a:xfrm>
+        </p:spPr>
+        <p:txBody>
+          <a:bodyPr>
+            <a:normAutofit/>
+          </a:bodyPr>
+          <a:lstStyle/>
+          <a:p>
+            <a:r>
+              <a:rPr lang="en-US" dirty="0"/>
+              <a:t>Amazon Web Services</a:t>
+            </a:r>
+          </a:p>
+          <a:p>
+            <a:pPr lvl="1"/>
+            <a:r>
+              <a:rPr lang="en-US" dirty="0"/>
+              <a:t>Pros</a:t>
+            </a:r>
+            <a:endParaRPr lang="en-US" sz="1400" dirty="0"/>
+          </a:p>
+          <a:p>
+            <a:pPr lvl="2"/>
+            <a:r>
+              <a:rPr lang="en-US" dirty="0"/>
+              <a:t>Free trial</a:t>
+            </a:r>
+            <a:endParaRPr lang="en-US" sz="1200" dirty="0"/>
+          </a:p>
+          <a:p>
+            <a:pPr lvl="2"/>
+            <a:r>
+              <a:rPr lang="en-US" dirty="0"/>
+              <a:t>Supports multiple database types</a:t>
+            </a:r>
+            <a:endParaRPr lang="en-US" sz="1200" dirty="0"/>
+          </a:p>
+          <a:p>
+            <a:pPr lvl="1"/>
+            <a:r>
+              <a:rPr lang="en-US" dirty="0"/>
+              <a:t>Cons</a:t>
+            </a:r>
+            <a:endParaRPr lang="en-US" sz="1400" dirty="0"/>
+          </a:p>
+          <a:p>
+            <a:pPr lvl="2"/>
+            <a:r>
+              <a:rPr lang="en-US" dirty="0"/>
+              <a:t>Difficult to learn</a:t>
+            </a:r>
+          </a:p>
+          <a:p>
+            <a:r>
+              <a:rPr lang="en-US" dirty="0"/>
+              <a:t>Microsoft Azure</a:t>
+            </a:r>
+          </a:p>
+          <a:p>
+            <a:pPr lvl="1"/>
+            <a:r>
+              <a:rPr lang="en-US" dirty="0"/>
+              <a:t>Pros</a:t>
+            </a:r>
+            <a:endParaRPr lang="en-US" sz="1400" dirty="0"/>
+          </a:p>
+          <a:p>
+            <a:pPr lvl="2"/>
+            <a:r>
+              <a:rPr lang="en-US" dirty="0"/>
+              <a:t>Free trial</a:t>
+            </a:r>
+            <a:endParaRPr lang="en-US" sz="1200" dirty="0"/>
+          </a:p>
+          <a:p>
+            <a:pPr lvl="1"/>
+            <a:r>
+              <a:rPr lang="en-US" dirty="0"/>
+              <a:t>Cons</a:t>
+            </a:r>
+            <a:endParaRPr lang="en-US" sz="1400" dirty="0"/>
+          </a:p>
+          <a:p>
+            <a:pPr lvl="2"/>
+            <a:r>
+              <a:rPr lang="en-US" dirty="0"/>
+              <a:t>Support issues</a:t>
+            </a:r>
+            <a:endParaRPr lang="en-US" sz="1200" dirty="0"/>
+          </a:p>
+          <a:p>
+            <a:pPr marL="0" indent="0">
+              <a:buNone/>
+            </a:pPr>
+            <a:endParaRPr lang="en-US" dirty="0"/>
           </a:p>
         </p:txBody>
       </p:sp>
@@ -9612,7 +9713,7 @@
           <p:cNvPr id="4" name="Slide Number Placeholder 3">
             <a:extLst>
               <a:ext uri="{FF2B5EF4-FFF2-40B4-BE49-F238E27FC236}">
-                <a16:creationId xmlns:a16="http://schemas.microsoft.com/office/drawing/2014/main" id="{8BA44F56-3ECD-42B0-A9A9-E5F99872401B}"/>
+                <a16:creationId xmlns:a16="http://schemas.microsoft.com/office/drawing/2014/main" id="{D85744C6-A06A-4F75-9D77-276BE5D6962F}"/>
               </a:ext>
             </a:extLst>
           </p:cNvPr>
@@ -9640,7 +9741,7 @@
     </p:spTree>
     <p:extLst>
       <p:ext uri="{BB962C8B-B14F-4D97-AF65-F5344CB8AC3E}">
-        <p14:creationId xmlns:p14="http://schemas.microsoft.com/office/powerpoint/2010/main" val="230190470"/>
+        <p14:creationId xmlns:p14="http://schemas.microsoft.com/office/powerpoint/2010/main" val="735481043"/>
       </p:ext>
     </p:extLst>
   </p:cSld>
@@ -9823,7 +9924,7 @@
           <p:cNvPr id="2" name="Title 1">
             <a:extLst>
               <a:ext uri="{FF2B5EF4-FFF2-40B4-BE49-F238E27FC236}">
-                <a16:creationId xmlns:a16="http://schemas.microsoft.com/office/drawing/2014/main" id="{4E96F21E-1AFE-4A04-8BD0-C88D1D2DA52C}"/>
+                <a16:creationId xmlns:a16="http://schemas.microsoft.com/office/drawing/2014/main" id="{F2AB9014-8A31-4680-8991-595A8A0A7749}"/>
               </a:ext>
             </a:extLst>
           </p:cNvPr>
@@ -9834,14 +9935,19 @@
             <p:ph type="title"/>
           </p:nvPr>
         </p:nvSpPr>
-        <p:spPr/>
-        <p:txBody>
-          <a:bodyPr/>
-          <a:lstStyle/>
-          <a:p>
-            <a:r>
-              <a:rPr lang="en-US" dirty="0"/>
-              <a:t>Questions?</a:t>
+        <p:spPr>
+          <a:xfrm>
+            <a:off x="2592925" y="624110"/>
+            <a:ext cx="9236004" cy="1280890"/>
+          </a:xfrm>
+        </p:spPr>
+        <p:txBody>
+          <a:bodyPr/>
+          <a:lstStyle/>
+          <a:p>
+            <a:r>
+              <a:rPr lang="en-US" dirty="0"/>
+              <a:t>Possible Cloud Hosts for Databases cont.</a:t>
             </a:r>
           </a:p>
         </p:txBody>
@@ -9851,7 +9957,7 @@
           <p:cNvPr id="3" name="Content Placeholder 2">
             <a:extLst>
               <a:ext uri="{FF2B5EF4-FFF2-40B4-BE49-F238E27FC236}">
-                <a16:creationId xmlns:a16="http://schemas.microsoft.com/office/drawing/2014/main" id="{C6D9C712-7144-4100-BCDB-F2CFAF7A1F31}"/>
+                <a16:creationId xmlns:a16="http://schemas.microsoft.com/office/drawing/2014/main" id="{943385D6-20E6-41CB-94E2-C41E10317A02}"/>
               </a:ext>
             </a:extLst>
           </p:cNvPr>
@@ -9862,12 +9968,136 @@
             <p:ph idx="1"/>
           </p:nvPr>
         </p:nvSpPr>
-        <p:spPr/>
-        <p:txBody>
-          <a:bodyPr/>
-          <a:lstStyle/>
-          <a:p>
-            <a:endParaRPr lang="en-US"/>
+        <p:spPr>
+          <a:xfrm>
+            <a:off x="2589212" y="1394012"/>
+            <a:ext cx="8915400" cy="5396753"/>
+          </a:xfrm>
+        </p:spPr>
+        <p:txBody>
+          <a:bodyPr>
+            <a:normAutofit fontScale="92500" lnSpcReduction="10000"/>
+          </a:bodyPr>
+          <a:lstStyle/>
+          <a:p>
+            <a:r>
+              <a:rPr lang="en-US" dirty="0"/>
+              <a:t>Rackspace Cloud</a:t>
+            </a:r>
+          </a:p>
+          <a:p>
+            <a:pPr lvl="1"/>
+            <a:r>
+              <a:rPr lang="en-US" dirty="0"/>
+              <a:t>Pros</a:t>
+            </a:r>
+            <a:endParaRPr lang="en-US" sz="1400" dirty="0"/>
+          </a:p>
+          <a:p>
+            <a:pPr lvl="2"/>
+            <a:r>
+              <a:rPr lang="en-US" dirty="0"/>
+              <a:t>Supports multiple database types</a:t>
+            </a:r>
+            <a:endParaRPr lang="en-US" sz="1200" dirty="0"/>
+          </a:p>
+          <a:p>
+            <a:pPr lvl="1"/>
+            <a:r>
+              <a:rPr lang="en-US" dirty="0"/>
+              <a:t>Cons</a:t>
+            </a:r>
+            <a:endParaRPr lang="en-US" sz="1400" dirty="0"/>
+          </a:p>
+          <a:p>
+            <a:pPr lvl="2"/>
+            <a:r>
+              <a:rPr lang="en-US" dirty="0"/>
+              <a:t>Low documentation</a:t>
+            </a:r>
+          </a:p>
+          <a:p>
+            <a:r>
+              <a:rPr lang="en-US" dirty="0"/>
+              <a:t>Oracle Database Cloud</a:t>
+            </a:r>
+          </a:p>
+          <a:p>
+            <a:pPr lvl="1"/>
+            <a:r>
+              <a:rPr lang="en-US" dirty="0"/>
+              <a:t>Pros</a:t>
+            </a:r>
+            <a:endParaRPr lang="en-US" sz="1400" dirty="0"/>
+          </a:p>
+          <a:p>
+            <a:pPr lvl="2"/>
+            <a:r>
+              <a:rPr lang="en-US" dirty="0"/>
+              <a:t>Easy maintenance</a:t>
+            </a:r>
+            <a:endParaRPr lang="en-US" sz="1200" dirty="0"/>
+          </a:p>
+          <a:p>
+            <a:pPr lvl="2"/>
+            <a:r>
+              <a:rPr lang="en-US" dirty="0"/>
+              <a:t>Secure encryption</a:t>
+            </a:r>
+            <a:endParaRPr lang="en-US" sz="1200" dirty="0"/>
+          </a:p>
+          <a:p>
+            <a:pPr lvl="1"/>
+            <a:r>
+              <a:rPr lang="en-US" dirty="0"/>
+              <a:t>Cons</a:t>
+            </a:r>
+            <a:endParaRPr lang="en-US" sz="1400" dirty="0"/>
+          </a:p>
+          <a:p>
+            <a:pPr lvl="2"/>
+            <a:r>
+              <a:rPr lang="en-US" dirty="0"/>
+              <a:t>Support issues</a:t>
+            </a:r>
+          </a:p>
+          <a:p>
+            <a:r>
+              <a:rPr lang="en-US" dirty="0"/>
+              <a:t>SAP Cloud Platform</a:t>
+            </a:r>
+          </a:p>
+          <a:p>
+            <a:pPr lvl="1"/>
+            <a:r>
+              <a:rPr lang="en-US" dirty="0"/>
+              <a:t>Pros</a:t>
+            </a:r>
+            <a:endParaRPr lang="en-US" sz="1400" dirty="0"/>
+          </a:p>
+          <a:p>
+            <a:pPr lvl="2"/>
+            <a:r>
+              <a:rPr lang="en-US" dirty="0"/>
+              <a:t>Free trial</a:t>
+            </a:r>
+            <a:endParaRPr lang="en-US" sz="1200" dirty="0"/>
+          </a:p>
+          <a:p>
+            <a:pPr lvl="1"/>
+            <a:r>
+              <a:rPr lang="en-US" dirty="0"/>
+              <a:t>Cons</a:t>
+            </a:r>
+            <a:endParaRPr lang="en-US" sz="1400" dirty="0"/>
+          </a:p>
+          <a:p>
+            <a:pPr lvl="2"/>
+            <a:r>
+              <a:rPr lang="en-US" dirty="0"/>
+              <a:t>Expensive</a:t>
+            </a:r>
+            <a:endParaRPr lang="en-US" sz="1200" dirty="0"/>
           </a:p>
         </p:txBody>
       </p:sp>
@@ -9876,7 +10106,7 @@
           <p:cNvPr id="4" name="Slide Number Placeholder 3">
             <a:extLst>
               <a:ext uri="{FF2B5EF4-FFF2-40B4-BE49-F238E27FC236}">
-                <a16:creationId xmlns:a16="http://schemas.microsoft.com/office/drawing/2014/main" id="{ABDB7F91-3EE4-476A-9661-1648C797CBD1}"/>
+                <a16:creationId xmlns:a16="http://schemas.microsoft.com/office/drawing/2014/main" id="{D85744C6-A06A-4F75-9D77-276BE5D6962F}"/>
               </a:ext>
             </a:extLst>
           </p:cNvPr>
@@ -9904,7 +10134,7 @@
     </p:spTree>
     <p:extLst>
       <p:ext uri="{BB962C8B-B14F-4D97-AF65-F5344CB8AC3E}">
-        <p14:creationId xmlns:p14="http://schemas.microsoft.com/office/powerpoint/2010/main" val="1700607014"/>
+        <p14:creationId xmlns:p14="http://schemas.microsoft.com/office/powerpoint/2010/main" val="2279213441"/>
       </p:ext>
     </p:extLst>
   </p:cSld>
@@ -9936,7 +10166,7 @@
           <p:cNvPr id="2" name="Title 1">
             <a:extLst>
               <a:ext uri="{FF2B5EF4-FFF2-40B4-BE49-F238E27FC236}">
-                <a16:creationId xmlns:a16="http://schemas.microsoft.com/office/drawing/2014/main" id="{1183D399-4942-4C83-BF24-B436160EB419}"/>
+                <a16:creationId xmlns:a16="http://schemas.microsoft.com/office/drawing/2014/main" id="{FB48C855-54F0-48EC-A7CC-6354BCB305D5}"/>
               </a:ext>
             </a:extLst>
           </p:cNvPr>
@@ -9954,7 +10184,7 @@
           <a:p>
             <a:r>
               <a:rPr lang="en-US" dirty="0"/>
-              <a:t>Sensors</a:t>
+              <a:t>Chosen Database</a:t>
             </a:r>
           </a:p>
         </p:txBody>
@@ -9964,7 +10194,7 @@
           <p:cNvPr id="3" name="Content Placeholder 2">
             <a:extLst>
               <a:ext uri="{FF2B5EF4-FFF2-40B4-BE49-F238E27FC236}">
-                <a16:creationId xmlns:a16="http://schemas.microsoft.com/office/drawing/2014/main" id="{0DD74EA9-167B-4010-AF9E-BA2A7445C522}"/>
+                <a16:creationId xmlns:a16="http://schemas.microsoft.com/office/drawing/2014/main" id="{182AB522-2226-4EFD-823D-D450755C3706}"/>
               </a:ext>
             </a:extLst>
           </p:cNvPr>
@@ -9980,7 +10210,37 @@
           <a:bodyPr/>
           <a:lstStyle/>
           <a:p>
-            <a:endParaRPr lang="en-US"/>
+            <a:r>
+              <a:rPr lang="en-US" dirty="0"/>
+              <a:t>Azure SQL Database</a:t>
+            </a:r>
+          </a:p>
+          <a:p>
+            <a:endParaRPr lang="en-US" dirty="0"/>
+          </a:p>
+          <a:p>
+            <a:r>
+              <a:rPr lang="en-US" dirty="0"/>
+              <a:t>Free trial gives 250GB of storage on cloud</a:t>
+            </a:r>
+          </a:p>
+          <a:p>
+            <a:r>
+              <a:rPr lang="en-US" dirty="0"/>
+              <a:t>Shares same codebase with SQL Server</a:t>
+            </a:r>
+          </a:p>
+          <a:p>
+            <a:endParaRPr lang="en-US" dirty="0"/>
+          </a:p>
+          <a:p>
+            <a:endParaRPr lang="en-US" dirty="0"/>
+          </a:p>
+          <a:p>
+            <a:r>
+              <a:rPr lang="en-US" dirty="0"/>
+              <a:t>Prefer cloud as users could literally be anywhere</a:t>
+            </a:r>
           </a:p>
         </p:txBody>
       </p:sp>
@@ -9989,7 +10249,7 @@
           <p:cNvPr id="4" name="Slide Number Placeholder 3">
             <a:extLst>
               <a:ext uri="{FF2B5EF4-FFF2-40B4-BE49-F238E27FC236}">
-                <a16:creationId xmlns:a16="http://schemas.microsoft.com/office/drawing/2014/main" id="{54E49C07-2ECF-4660-8582-3A662CD53904}"/>
+                <a16:creationId xmlns:a16="http://schemas.microsoft.com/office/drawing/2014/main" id="{67A54C74-446F-4283-A614-DCD1E307638E}"/>
               </a:ext>
             </a:extLst>
           </p:cNvPr>
@@ -10017,7 +10277,7 @@
     </p:spTree>
     <p:extLst>
       <p:ext uri="{BB962C8B-B14F-4D97-AF65-F5344CB8AC3E}">
-        <p14:creationId xmlns:p14="http://schemas.microsoft.com/office/powerpoint/2010/main" val="3652658612"/>
+        <p14:creationId xmlns:p14="http://schemas.microsoft.com/office/powerpoint/2010/main" val="1065244771"/>
       </p:ext>
     </p:extLst>
   </p:cSld>
@@ -10049,7 +10309,7 @@
           <p:cNvPr id="2" name="Title 1">
             <a:extLst>
               <a:ext uri="{FF2B5EF4-FFF2-40B4-BE49-F238E27FC236}">
-                <a16:creationId xmlns:a16="http://schemas.microsoft.com/office/drawing/2014/main" id="{AB1A53DB-70FB-432D-BCAF-DCFBCCE6B023}"/>
+                <a16:creationId xmlns:a16="http://schemas.microsoft.com/office/drawing/2014/main" id="{099D98AF-3E4D-488E-B8C3-C0381CA48597}"/>
               </a:ext>
             </a:extLst>
           </p:cNvPr>
@@ -10066,12 +10326,8 @@
           <a:lstStyle/>
           <a:p>
             <a:r>
-              <a:rPr lang="en-US" dirty="0" err="1"/>
-              <a:t>MapBox</a:t>
-            </a:r>
-            <a:r>
-              <a:rPr lang="en-US" dirty="0"/>
-              <a:t> API</a:t>
+              <a:rPr lang="en-US" dirty="0"/>
+              <a:t>Landmark Data Storage</a:t>
             </a:r>
           </a:p>
         </p:txBody>
@@ -10081,7 +10337,7 @@
           <p:cNvPr id="3" name="Content Placeholder 2">
             <a:extLst>
               <a:ext uri="{FF2B5EF4-FFF2-40B4-BE49-F238E27FC236}">
-                <a16:creationId xmlns:a16="http://schemas.microsoft.com/office/drawing/2014/main" id="{A6866161-0CFB-4603-9213-EC107AF2D1E8}"/>
+                <a16:creationId xmlns:a16="http://schemas.microsoft.com/office/drawing/2014/main" id="{9B7F757E-BE2B-46DF-A69B-CF16514EFAD2}"/>
               </a:ext>
             </a:extLst>
           </p:cNvPr>
@@ -10094,70 +10350,60 @@
         </p:nvSpPr>
         <p:spPr/>
         <p:txBody>
-          <a:bodyPr>
-            <a:normAutofit/>
-          </a:bodyPr>
-          <a:lstStyle/>
-          <a:p>
-            <a:r>
-              <a:rPr lang="en-US" dirty="0"/>
-              <a:t>Dove into documentation</a:t>
-            </a:r>
-          </a:p>
-          <a:p>
-            <a:r>
-              <a:rPr lang="en-US" dirty="0"/>
-              <a:t>Used our acquired key to interact with the API</a:t>
-            </a:r>
-          </a:p>
-          <a:p>
-            <a:r>
-              <a:rPr lang="en-US" dirty="0"/>
-              <a:t>Implemented drawing a map</a:t>
-            </a:r>
-          </a:p>
-          <a:p>
-            <a:r>
-              <a:rPr lang="en-US" dirty="0"/>
-              <a:t>Current points are arbitrary, but easily modified to reflect points produced by algorithm </a:t>
-            </a:r>
-          </a:p>
-          <a:p>
-            <a:r>
-              <a:rPr lang="en-US" dirty="0"/>
-              <a:t>Currently working on:</a:t>
+          <a:bodyPr/>
+          <a:lstStyle/>
+          <a:p>
+            <a:r>
+              <a:rPr lang="en-US" dirty="0"/>
+              <a:t>Structure for Landmarks and Custom Landmarks</a:t>
+            </a:r>
+          </a:p>
+          <a:p>
+            <a:endParaRPr lang="en-US" dirty="0"/>
+          </a:p>
+          <a:p>
+            <a:r>
+              <a:rPr lang="en-US" dirty="0"/>
+              <a:t>Local storage:</a:t>
             </a:r>
           </a:p>
           <a:p>
             <a:pPr lvl="1"/>
             <a:r>
               <a:rPr lang="en-US" dirty="0"/>
-              <a:t>Refining large map into a rectangular shaped map in direction phone is pointing</a:t>
+              <a:t>Internal File Storage</a:t>
             </a:r>
           </a:p>
           <a:p>
             <a:pPr lvl="1"/>
             <a:r>
               <a:rPr lang="en-US" dirty="0"/>
-              <a:t>Drawing markers for landmarks in refined map</a:t>
+              <a:t>External File Storage</a:t>
             </a:r>
           </a:p>
           <a:p>
             <a:pPr lvl="1"/>
             <a:r>
               <a:rPr lang="en-US" dirty="0"/>
-              <a:t>Drawing custom markers (custom landmark locations)</a:t>
+              <a:t>Shared Preferences</a:t>
             </a:r>
           </a:p>
           <a:p>
             <a:pPr lvl="1"/>
             <a:r>
               <a:rPr lang="en-US" dirty="0"/>
-              <a:t>Retrieving location data from refined map</a:t>
-            </a:r>
-          </a:p>
-          <a:p>
+              <a:t>Private Databases</a:t>
+            </a:r>
+          </a:p>
+          <a:p>
+            <a:pPr lvl="1"/>
             <a:endParaRPr lang="en-US" dirty="0"/>
+          </a:p>
+          <a:p>
+            <a:r>
+              <a:rPr lang="en-US" dirty="0"/>
+              <a:t>Chosen SQLite</a:t>
+            </a:r>
           </a:p>
         </p:txBody>
       </p:sp>
@@ -10166,7 +10412,7 @@
           <p:cNvPr id="4" name="Slide Number Placeholder 3">
             <a:extLst>
               <a:ext uri="{FF2B5EF4-FFF2-40B4-BE49-F238E27FC236}">
-                <a16:creationId xmlns:a16="http://schemas.microsoft.com/office/drawing/2014/main" id="{46B07E3D-35B9-4761-9561-21093A66968A}"/>
+                <a16:creationId xmlns:a16="http://schemas.microsoft.com/office/drawing/2014/main" id="{70E8CCED-2F50-4A4F-B670-22D17EBEAE96}"/>
               </a:ext>
             </a:extLst>
           </p:cNvPr>
@@ -10191,10 +10437,70 @@
           </a:p>
         </p:txBody>
       </p:sp>
+      <p:pic>
+        <p:nvPicPr>
+          <p:cNvPr id="6" name="Picture 5">
+            <a:extLst>
+              <a:ext uri="{FF2B5EF4-FFF2-40B4-BE49-F238E27FC236}">
+                <a16:creationId xmlns:a16="http://schemas.microsoft.com/office/drawing/2014/main" id="{93E2551E-FDDB-4CF9-9037-E0DF2C45FC2E}"/>
+              </a:ext>
+            </a:extLst>
+          </p:cNvPr>
+          <p:cNvPicPr>
+            <a:picLocks noChangeAspect="1"/>
+          </p:cNvPicPr>
+          <p:nvPr/>
+        </p:nvPicPr>
+        <p:blipFill>
+          <a:blip r:embed="rId2"/>
+          <a:stretch>
+            <a:fillRect/>
+          </a:stretch>
+        </p:blipFill>
+        <p:spPr>
+          <a:xfrm>
+            <a:off x="6518654" y="2754888"/>
+            <a:ext cx="2414676" cy="3156334"/>
+          </a:xfrm>
+          <a:prstGeom prst="rect">
+            <a:avLst/>
+          </a:prstGeom>
+        </p:spPr>
+      </p:pic>
+      <p:pic>
+        <p:nvPicPr>
+          <p:cNvPr id="7" name="Picture 6">
+            <a:extLst>
+              <a:ext uri="{FF2B5EF4-FFF2-40B4-BE49-F238E27FC236}">
+                <a16:creationId xmlns:a16="http://schemas.microsoft.com/office/drawing/2014/main" id="{25861022-A0F3-459D-B689-E05BCF818561}"/>
+              </a:ext>
+            </a:extLst>
+          </p:cNvPr>
+          <p:cNvPicPr>
+            <a:picLocks noChangeAspect="1"/>
+          </p:cNvPicPr>
+          <p:nvPr/>
+        </p:nvPicPr>
+        <p:blipFill>
+          <a:blip r:embed="rId3"/>
+          <a:stretch>
+            <a:fillRect/>
+          </a:stretch>
+        </p:blipFill>
+        <p:spPr>
+          <a:xfrm>
+            <a:off x="9048621" y="1827543"/>
+            <a:ext cx="2455991" cy="4083679"/>
+          </a:xfrm>
+          <a:prstGeom prst="rect">
+            <a:avLst/>
+          </a:prstGeom>
+        </p:spPr>
+      </p:pic>
     </p:spTree>
     <p:extLst>
       <p:ext uri="{BB962C8B-B14F-4D97-AF65-F5344CB8AC3E}">
-        <p14:creationId xmlns:p14="http://schemas.microsoft.com/office/powerpoint/2010/main" val="3591823853"/>
+        <p14:creationId xmlns:p14="http://schemas.microsoft.com/office/powerpoint/2010/main" val="1449601278"/>
       </p:ext>
     </p:extLst>
   </p:cSld>
@@ -10226,7 +10532,7 @@
           <p:cNvPr id="2" name="Title 1">
             <a:extLst>
               <a:ext uri="{FF2B5EF4-FFF2-40B4-BE49-F238E27FC236}">
-                <a16:creationId xmlns:a16="http://schemas.microsoft.com/office/drawing/2014/main" id="{F2AB9014-8A31-4680-8991-595A8A0A7749}"/>
+                <a16:creationId xmlns:a16="http://schemas.microsoft.com/office/drawing/2014/main" id="{4E96F21E-1AFE-4A04-8BD0-C88D1D2DA52C}"/>
               </a:ext>
             </a:extLst>
           </p:cNvPr>
@@ -10244,7 +10550,7 @@
           <a:p>
             <a:r>
               <a:rPr lang="en-US" dirty="0"/>
-              <a:t>Database</a:t>
+              <a:t>Questions?</a:t>
             </a:r>
           </a:p>
         </p:txBody>
@@ -10254,7 +10560,7 @@
           <p:cNvPr id="3" name="Content Placeholder 2">
             <a:extLst>
               <a:ext uri="{FF2B5EF4-FFF2-40B4-BE49-F238E27FC236}">
-                <a16:creationId xmlns:a16="http://schemas.microsoft.com/office/drawing/2014/main" id="{943385D6-20E6-41CB-94E2-C41E10317A02}"/>
+                <a16:creationId xmlns:a16="http://schemas.microsoft.com/office/drawing/2014/main" id="{C6D9C712-7144-4100-BCDB-F2CFAF7A1F31}"/>
               </a:ext>
             </a:extLst>
           </p:cNvPr>
@@ -10279,7 +10585,7 @@
           <p:cNvPr id="4" name="Slide Number Placeholder 3">
             <a:extLst>
               <a:ext uri="{FF2B5EF4-FFF2-40B4-BE49-F238E27FC236}">
-                <a16:creationId xmlns:a16="http://schemas.microsoft.com/office/drawing/2014/main" id="{D85744C6-A06A-4F75-9D77-276BE5D6962F}"/>
+                <a16:creationId xmlns:a16="http://schemas.microsoft.com/office/drawing/2014/main" id="{ABDB7F91-3EE4-476A-9661-1648C797CBD1}"/>
               </a:ext>
             </a:extLst>
           </p:cNvPr>
@@ -10307,7 +10613,7 @@
     </p:spTree>
     <p:extLst>
       <p:ext uri="{BB962C8B-B14F-4D97-AF65-F5344CB8AC3E}">
-        <p14:creationId xmlns:p14="http://schemas.microsoft.com/office/powerpoint/2010/main" val="735481043"/>
+        <p14:creationId xmlns:p14="http://schemas.microsoft.com/office/powerpoint/2010/main" val="1700607014"/>
       </p:ext>
     </p:extLst>
   </p:cSld>
@@ -10339,7 +10645,7 @@
           <p:cNvPr id="2" name="Title 1">
             <a:extLst>
               <a:ext uri="{FF2B5EF4-FFF2-40B4-BE49-F238E27FC236}">
-                <a16:creationId xmlns:a16="http://schemas.microsoft.com/office/drawing/2014/main" id="{E745B5BA-CEC8-422E-982B-F8BC98723754}"/>
+                <a16:creationId xmlns:a16="http://schemas.microsoft.com/office/drawing/2014/main" id="{83DFF23D-959A-44BC-BE78-1D0330CDF164}"/>
               </a:ext>
             </a:extLst>
           </p:cNvPr>
@@ -10357,7 +10663,7 @@
           <a:p>
             <a:r>
               <a:rPr lang="en-US" dirty="0"/>
-              <a:t>Questions?</a:t>
+              <a:t>Algorithm</a:t>
             </a:r>
           </a:p>
         </p:txBody>
@@ -10367,7 +10673,7 @@
           <p:cNvPr id="3" name="Content Placeholder 2">
             <a:extLst>
               <a:ext uri="{FF2B5EF4-FFF2-40B4-BE49-F238E27FC236}">
-                <a16:creationId xmlns:a16="http://schemas.microsoft.com/office/drawing/2014/main" id="{737908CF-DFCF-479E-B76A-2140E612B90F}"/>
+                <a16:creationId xmlns:a16="http://schemas.microsoft.com/office/drawing/2014/main" id="{706A48C4-F2C9-48C7-B302-4ADE777DDB2E}"/>
               </a:ext>
             </a:extLst>
           </p:cNvPr>
@@ -10378,12 +10684,103 @@
             <p:ph idx="1"/>
           </p:nvPr>
         </p:nvSpPr>
-        <p:spPr/>
-        <p:txBody>
-          <a:bodyPr/>
-          <a:lstStyle/>
-          <a:p>
-            <a:endParaRPr lang="en-US"/>
+        <p:spPr>
+          <a:xfrm>
+            <a:off x="2589212" y="1752599"/>
+            <a:ext cx="8915400" cy="4285129"/>
+          </a:xfrm>
+        </p:spPr>
+        <p:txBody>
+          <a:bodyPr>
+            <a:normAutofit/>
+          </a:bodyPr>
+          <a:lstStyle/>
+          <a:p>
+            <a:r>
+              <a:rPr lang="en-US" dirty="0"/>
+              <a:t>Get relevant sensor information</a:t>
+            </a:r>
+          </a:p>
+          <a:p>
+            <a:pPr lvl="1"/>
+            <a:r>
+              <a:rPr lang="en-US" dirty="0"/>
+              <a:t>Get elevation </a:t>
+            </a:r>
+          </a:p>
+          <a:p>
+            <a:pPr lvl="1"/>
+            <a:r>
+              <a:rPr lang="en-US" dirty="0"/>
+              <a:t>Get location</a:t>
+            </a:r>
+          </a:p>
+          <a:p>
+            <a:pPr lvl="1"/>
+            <a:r>
+              <a:rPr lang="en-US" dirty="0"/>
+              <a:t>Get orientation</a:t>
+            </a:r>
+          </a:p>
+          <a:p>
+            <a:r>
+              <a:rPr lang="en-US" dirty="0"/>
+              <a:t>Find landmarks in orientation</a:t>
+            </a:r>
+          </a:p>
+          <a:p>
+            <a:pPr lvl="1"/>
+            <a:r>
+              <a:rPr lang="en-US" dirty="0"/>
+              <a:t>Find Line of Sight (</a:t>
+            </a:r>
+            <a:r>
+              <a:rPr lang="en-US" dirty="0" err="1"/>
+              <a:t>LoS</a:t>
+            </a:r>
+            <a:r>
+              <a:rPr lang="en-US" dirty="0"/>
+              <a:t>) by numerical method</a:t>
+            </a:r>
+          </a:p>
+          <a:p>
+            <a:pPr lvl="1"/>
+            <a:r>
+              <a:rPr lang="en-US" dirty="0"/>
+              <a:t>Find landmarks between location and </a:t>
+            </a:r>
+            <a:r>
+              <a:rPr lang="en-US" dirty="0" err="1"/>
+              <a:t>LoS</a:t>
+            </a:r>
+            <a:endParaRPr lang="en-US" dirty="0"/>
+          </a:p>
+          <a:p>
+            <a:pPr lvl="1"/>
+            <a:r>
+              <a:rPr lang="en-US" dirty="0"/>
+              <a:t>Output landmarks to user</a:t>
+            </a:r>
+          </a:p>
+          <a:p>
+            <a:pPr lvl="1"/>
+            <a:r>
+              <a:rPr lang="en-US" dirty="0"/>
+              <a:t>Allow user to select landmark </a:t>
+            </a:r>
+          </a:p>
+          <a:p>
+            <a:pPr lvl="1"/>
+            <a:r>
+              <a:rPr lang="en-US" dirty="0"/>
+              <a:t>Pull information about landmark</a:t>
+            </a:r>
+          </a:p>
+          <a:p>
+            <a:r>
+              <a:rPr lang="en-US" dirty="0"/>
+              <a:t>Find distance between current location and landmark</a:t>
+            </a:r>
           </a:p>
         </p:txBody>
       </p:sp>
@@ -10392,7 +10789,7 @@
           <p:cNvPr id="4" name="Slide Number Placeholder 3">
             <a:extLst>
               <a:ext uri="{FF2B5EF4-FFF2-40B4-BE49-F238E27FC236}">
-                <a16:creationId xmlns:a16="http://schemas.microsoft.com/office/drawing/2014/main" id="{DF8C3242-F7F3-4B6D-BE97-C08D1A7EC84D}"/>
+                <a16:creationId xmlns:a16="http://schemas.microsoft.com/office/drawing/2014/main" id="{8BA44F56-3ECD-42B0-A9A9-E5F99872401B}"/>
               </a:ext>
             </a:extLst>
           </p:cNvPr>
@@ -10420,7 +10817,7 @@
     </p:spTree>
     <p:extLst>
       <p:ext uri="{BB962C8B-B14F-4D97-AF65-F5344CB8AC3E}">
-        <p14:creationId xmlns:p14="http://schemas.microsoft.com/office/powerpoint/2010/main" val="1587191523"/>
+        <p14:creationId xmlns:p14="http://schemas.microsoft.com/office/powerpoint/2010/main" val="491630991"/>
       </p:ext>
     </p:extLst>
   </p:cSld>
@@ -10452,7 +10849,7 @@
           <p:cNvPr id="2" name="Title 1">
             <a:extLst>
               <a:ext uri="{FF2B5EF4-FFF2-40B4-BE49-F238E27FC236}">
-                <a16:creationId xmlns:a16="http://schemas.microsoft.com/office/drawing/2014/main" id="{0925D358-7D77-482A-BA62-AF4AAB8E726F}"/>
+                <a16:creationId xmlns:a16="http://schemas.microsoft.com/office/drawing/2014/main" id="{1183D399-4942-4C83-BF24-B436160EB419}"/>
               </a:ext>
             </a:extLst>
           </p:cNvPr>
@@ -10470,7 +10867,7 @@
           <a:p>
             <a:r>
               <a:rPr lang="en-US" dirty="0"/>
-              <a:t>Unofficial Sprint</a:t>
+              <a:t>Sensors</a:t>
             </a:r>
           </a:p>
         </p:txBody>
@@ -10480,7 +10877,7 @@
           <p:cNvPr id="3" name="Content Placeholder 2">
             <a:extLst>
               <a:ext uri="{FF2B5EF4-FFF2-40B4-BE49-F238E27FC236}">
-                <a16:creationId xmlns:a16="http://schemas.microsoft.com/office/drawing/2014/main" id="{6A41BCA7-F42D-4C14-9EE3-C0604BD1C8ED}"/>
+                <a16:creationId xmlns:a16="http://schemas.microsoft.com/office/drawing/2014/main" id="{0DD74EA9-167B-4010-AF9E-BA2A7445C522}"/>
               </a:ext>
             </a:extLst>
           </p:cNvPr>
@@ -10491,12 +10888,96 @@
             <p:ph idx="1"/>
           </p:nvPr>
         </p:nvSpPr>
-        <p:spPr/>
-        <p:txBody>
-          <a:bodyPr/>
-          <a:lstStyle/>
-          <a:p>
-            <a:endParaRPr lang="en-US"/>
+        <p:spPr>
+          <a:xfrm>
+            <a:off x="2589212" y="1564344"/>
+            <a:ext cx="8915400" cy="4509244"/>
+          </a:xfrm>
+        </p:spPr>
+        <p:txBody>
+          <a:bodyPr/>
+          <a:lstStyle/>
+          <a:p>
+            <a:r>
+              <a:rPr lang="en-US" dirty="0"/>
+              <a:t>Accelerometer and Magnetometer</a:t>
+            </a:r>
+          </a:p>
+          <a:p>
+            <a:pPr lvl="1"/>
+            <a:r>
+              <a:rPr lang="en-US" dirty="0"/>
+              <a:t>Used to calculate the orientation of the phone</a:t>
+            </a:r>
+          </a:p>
+          <a:p>
+            <a:pPr lvl="1"/>
+            <a:r>
+              <a:rPr lang="en-US" dirty="0"/>
+              <a:t>Gives access to:</a:t>
+            </a:r>
+          </a:p>
+          <a:p>
+            <a:pPr lvl="2"/>
+            <a:r>
+              <a:rPr lang="en-US" dirty="0"/>
+              <a:t>Azimuth</a:t>
+            </a:r>
+          </a:p>
+          <a:p>
+            <a:pPr lvl="2"/>
+            <a:r>
+              <a:rPr lang="en-US" dirty="0"/>
+              <a:t>Pitch</a:t>
+            </a:r>
+          </a:p>
+          <a:p>
+            <a:pPr lvl="2"/>
+            <a:r>
+              <a:rPr lang="en-US" dirty="0"/>
+              <a:t>Roll</a:t>
+            </a:r>
+          </a:p>
+          <a:p>
+            <a:r>
+              <a:rPr lang="en-US" dirty="0"/>
+              <a:t>GPS</a:t>
+            </a:r>
+          </a:p>
+          <a:p>
+            <a:pPr lvl="1"/>
+            <a:r>
+              <a:rPr lang="en-US" dirty="0"/>
+              <a:t>Requires explicit user permission</a:t>
+            </a:r>
+          </a:p>
+          <a:p>
+            <a:pPr lvl="1"/>
+            <a:r>
+              <a:rPr lang="en-US" dirty="0"/>
+              <a:t>Gives access to:</a:t>
+            </a:r>
+          </a:p>
+          <a:p>
+            <a:pPr lvl="2"/>
+            <a:r>
+              <a:rPr lang="en-US" dirty="0"/>
+              <a:t>Latitude</a:t>
+            </a:r>
+          </a:p>
+          <a:p>
+            <a:pPr lvl="2"/>
+            <a:r>
+              <a:rPr lang="en-US" dirty="0"/>
+              <a:t>Longitude</a:t>
+            </a:r>
+          </a:p>
+          <a:p>
+            <a:pPr lvl="2"/>
+            <a:r>
+              <a:rPr lang="en-US" dirty="0"/>
+              <a:t>Elevation</a:t>
+            </a:r>
           </a:p>
         </p:txBody>
       </p:sp>
@@ -10505,7 +10986,7 @@
           <p:cNvPr id="4" name="Slide Number Placeholder 3">
             <a:extLst>
               <a:ext uri="{FF2B5EF4-FFF2-40B4-BE49-F238E27FC236}">
-                <a16:creationId xmlns:a16="http://schemas.microsoft.com/office/drawing/2014/main" id="{BB4882C3-32B5-455C-9E1C-9DBFC4D3EA7C}"/>
+                <a16:creationId xmlns:a16="http://schemas.microsoft.com/office/drawing/2014/main" id="{54E49C07-2ECF-4660-8582-3A662CD53904}"/>
               </a:ext>
             </a:extLst>
           </p:cNvPr>
@@ -10533,7 +11014,7 @@
     </p:spTree>
     <p:extLst>
       <p:ext uri="{BB962C8B-B14F-4D97-AF65-F5344CB8AC3E}">
-        <p14:creationId xmlns:p14="http://schemas.microsoft.com/office/powerpoint/2010/main" val="4099954266"/>
+        <p14:creationId xmlns:p14="http://schemas.microsoft.com/office/powerpoint/2010/main" val="340270072"/>
       </p:ext>
     </p:extLst>
   </p:cSld>
@@ -10565,7 +11046,7 @@
           <p:cNvPr id="2" name="Title 1">
             <a:extLst>
               <a:ext uri="{FF2B5EF4-FFF2-40B4-BE49-F238E27FC236}">
-                <a16:creationId xmlns:a16="http://schemas.microsoft.com/office/drawing/2014/main" id="{AD0AB5FE-C138-421F-92EE-1844FDF7256A}"/>
+                <a16:creationId xmlns:a16="http://schemas.microsoft.com/office/drawing/2014/main" id="{AB1A53DB-70FB-432D-BCAF-DCFBCCE6B023}"/>
               </a:ext>
             </a:extLst>
           </p:cNvPr>
@@ -10582,8 +11063,12 @@
           <a:lstStyle/>
           <a:p>
             <a:r>
-              <a:rPr lang="en-US" dirty="0"/>
-              <a:t>Sprint 2</a:t>
+              <a:rPr lang="en-US" dirty="0" err="1"/>
+              <a:t>MapBox</a:t>
+            </a:r>
+            <a:r>
+              <a:rPr lang="en-US" dirty="0"/>
+              <a:t> API</a:t>
             </a:r>
           </a:p>
         </p:txBody>
@@ -10593,7 +11078,7 @@
           <p:cNvPr id="3" name="Content Placeholder 2">
             <a:extLst>
               <a:ext uri="{FF2B5EF4-FFF2-40B4-BE49-F238E27FC236}">
-                <a16:creationId xmlns:a16="http://schemas.microsoft.com/office/drawing/2014/main" id="{903C4FAD-1519-4538-BD82-6A08BE138CB6}"/>
+                <a16:creationId xmlns:a16="http://schemas.microsoft.com/office/drawing/2014/main" id="{A6866161-0CFB-4603-9213-EC107AF2D1E8}"/>
               </a:ext>
             </a:extLst>
           </p:cNvPr>
@@ -10606,10 +11091,70 @@
         </p:nvSpPr>
         <p:spPr/>
         <p:txBody>
-          <a:bodyPr/>
-          <a:lstStyle/>
-          <a:p>
-            <a:endParaRPr lang="en-US"/>
+          <a:bodyPr>
+            <a:normAutofit/>
+          </a:bodyPr>
+          <a:lstStyle/>
+          <a:p>
+            <a:r>
+              <a:rPr lang="en-US" dirty="0"/>
+              <a:t>Dove into documentation</a:t>
+            </a:r>
+          </a:p>
+          <a:p>
+            <a:r>
+              <a:rPr lang="en-US" dirty="0"/>
+              <a:t>Used our acquired key to interact with the API</a:t>
+            </a:r>
+          </a:p>
+          <a:p>
+            <a:r>
+              <a:rPr lang="en-US" dirty="0"/>
+              <a:t>Implemented drawing a map</a:t>
+            </a:r>
+          </a:p>
+          <a:p>
+            <a:r>
+              <a:rPr lang="en-US" dirty="0"/>
+              <a:t>Current points are arbitrary, but easily modified to reflect points produced by algorithm </a:t>
+            </a:r>
+          </a:p>
+          <a:p>
+            <a:r>
+              <a:rPr lang="en-US" dirty="0"/>
+              <a:t>Currently working on:</a:t>
+            </a:r>
+          </a:p>
+          <a:p>
+            <a:pPr lvl="1"/>
+            <a:r>
+              <a:rPr lang="en-US" dirty="0"/>
+              <a:t>Refining large map into a rectangular shaped map in direction phone is pointing</a:t>
+            </a:r>
+          </a:p>
+          <a:p>
+            <a:pPr lvl="1"/>
+            <a:r>
+              <a:rPr lang="en-US" dirty="0"/>
+              <a:t>Drawing markers for landmarks in refined map</a:t>
+            </a:r>
+          </a:p>
+          <a:p>
+            <a:pPr lvl="1"/>
+            <a:r>
+              <a:rPr lang="en-US" dirty="0"/>
+              <a:t>Drawing custom markers (custom landmark locations)</a:t>
+            </a:r>
+          </a:p>
+          <a:p>
+            <a:pPr lvl="1"/>
+            <a:r>
+              <a:rPr lang="en-US" dirty="0"/>
+              <a:t>Retrieving location data from refined map</a:t>
+            </a:r>
+          </a:p>
+          <a:p>
+            <a:endParaRPr lang="en-US" dirty="0"/>
           </a:p>
         </p:txBody>
       </p:sp>
@@ -10618,7 +11163,7 @@
           <p:cNvPr id="4" name="Slide Number Placeholder 3">
             <a:extLst>
               <a:ext uri="{FF2B5EF4-FFF2-40B4-BE49-F238E27FC236}">
-                <a16:creationId xmlns:a16="http://schemas.microsoft.com/office/drawing/2014/main" id="{2D0C1AF0-2A5F-49B5-B744-94150C0B7BD5}"/>
+                <a16:creationId xmlns:a16="http://schemas.microsoft.com/office/drawing/2014/main" id="{46B07E3D-35B9-4761-9561-21093A66968A}"/>
               </a:ext>
             </a:extLst>
           </p:cNvPr>
@@ -10646,7 +11191,7 @@
     </p:spTree>
     <p:extLst>
       <p:ext uri="{BB962C8B-B14F-4D97-AF65-F5344CB8AC3E}">
-        <p14:creationId xmlns:p14="http://schemas.microsoft.com/office/powerpoint/2010/main" val="632679123"/>
+        <p14:creationId xmlns:p14="http://schemas.microsoft.com/office/powerpoint/2010/main" val="3591823853"/>
       </p:ext>
     </p:extLst>
   </p:cSld>
@@ -10678,7 +11223,7 @@
           <p:cNvPr id="2" name="Title 1">
             <a:extLst>
               <a:ext uri="{FF2B5EF4-FFF2-40B4-BE49-F238E27FC236}">
-                <a16:creationId xmlns:a16="http://schemas.microsoft.com/office/drawing/2014/main" id="{5DE1D604-AE0D-4070-84FA-E88517FF5DFF}"/>
+                <a16:creationId xmlns:a16="http://schemas.microsoft.com/office/drawing/2014/main" id="{B20D5CF9-D210-49AA-B513-9E2427CCCB28}"/>
               </a:ext>
             </a:extLst>
           </p:cNvPr>
@@ -10695,8 +11240,8 @@
           <a:lstStyle/>
           <a:p>
             <a:r>
-              <a:rPr lang="en-US"/>
-              <a:t>Questions?</a:t>
+              <a:rPr lang="en-US" dirty="0"/>
+              <a:t>DEMO TIME</a:t>
             </a:r>
           </a:p>
         </p:txBody>
@@ -10706,7 +11251,7 @@
           <p:cNvPr id="3" name="Content Placeholder 2">
             <a:extLst>
               <a:ext uri="{FF2B5EF4-FFF2-40B4-BE49-F238E27FC236}">
-                <a16:creationId xmlns:a16="http://schemas.microsoft.com/office/drawing/2014/main" id="{E38BF89C-DFBF-421E-A964-AE3C9E1FC370}"/>
+                <a16:creationId xmlns:a16="http://schemas.microsoft.com/office/drawing/2014/main" id="{7B82F0A5-85A9-4F09-B616-1FC147B053B9}"/>
               </a:ext>
             </a:extLst>
           </p:cNvPr>
@@ -10731,7 +11276,7 @@
           <p:cNvPr id="4" name="Slide Number Placeholder 3">
             <a:extLst>
               <a:ext uri="{FF2B5EF4-FFF2-40B4-BE49-F238E27FC236}">
-                <a16:creationId xmlns:a16="http://schemas.microsoft.com/office/drawing/2014/main" id="{6DD83CE4-B7F7-4E5E-9EA9-93BC3E139089}"/>
+                <a16:creationId xmlns:a16="http://schemas.microsoft.com/office/drawing/2014/main" id="{FF8C6A05-DE04-4D40-936B-2836B8F7D657}"/>
               </a:ext>
             </a:extLst>
           </p:cNvPr>
@@ -10759,7 +11304,233 @@
     </p:spTree>
     <p:extLst>
       <p:ext uri="{BB962C8B-B14F-4D97-AF65-F5344CB8AC3E}">
-        <p14:creationId xmlns:p14="http://schemas.microsoft.com/office/powerpoint/2010/main" val="490955183"/>
+        <p14:creationId xmlns:p14="http://schemas.microsoft.com/office/powerpoint/2010/main" val="2896423194"/>
+      </p:ext>
+    </p:extLst>
+  </p:cSld>
+  <p:clrMapOvr>
+    <a:masterClrMapping/>
+  </p:clrMapOvr>
+</p:sld>
+</file>
+
+<file path=ppt/slides/slide28.xml><?xml version="1.0" encoding="utf-8"?>
+<p:sld xmlns:a="http://schemas.openxmlformats.org/drawingml/2006/main" xmlns:r="http://schemas.openxmlformats.org/officeDocument/2006/relationships" xmlns:p="http://schemas.openxmlformats.org/presentationml/2006/main">
+  <p:cSld>
+    <p:spTree>
+      <p:nvGrpSpPr>
+        <p:cNvPr id="1" name=""/>
+        <p:cNvGrpSpPr/>
+        <p:nvPr/>
+      </p:nvGrpSpPr>
+      <p:grpSpPr>
+        <a:xfrm>
+          <a:off x="0" y="0"/>
+          <a:ext cx="0" cy="0"/>
+          <a:chOff x="0" y="0"/>
+          <a:chExt cx="0" cy="0"/>
+        </a:xfrm>
+      </p:grpSpPr>
+      <p:sp>
+        <p:nvSpPr>
+          <p:cNvPr id="2" name="Title 1">
+            <a:extLst>
+              <a:ext uri="{FF2B5EF4-FFF2-40B4-BE49-F238E27FC236}">
+                <a16:creationId xmlns:a16="http://schemas.microsoft.com/office/drawing/2014/main" id="{E745B5BA-CEC8-422E-982B-F8BC98723754}"/>
+              </a:ext>
+            </a:extLst>
+          </p:cNvPr>
+          <p:cNvSpPr>
+            <a:spLocks noGrp="1"/>
+          </p:cNvSpPr>
+          <p:nvPr>
+            <p:ph type="title"/>
+          </p:nvPr>
+        </p:nvSpPr>
+        <p:spPr/>
+        <p:txBody>
+          <a:bodyPr/>
+          <a:lstStyle/>
+          <a:p>
+            <a:r>
+              <a:rPr lang="en-US" dirty="0"/>
+              <a:t>Questions?</a:t>
+            </a:r>
+          </a:p>
+        </p:txBody>
+      </p:sp>
+      <p:sp>
+        <p:nvSpPr>
+          <p:cNvPr id="3" name="Content Placeholder 2">
+            <a:extLst>
+              <a:ext uri="{FF2B5EF4-FFF2-40B4-BE49-F238E27FC236}">
+                <a16:creationId xmlns:a16="http://schemas.microsoft.com/office/drawing/2014/main" id="{737908CF-DFCF-479E-B76A-2140E612B90F}"/>
+              </a:ext>
+            </a:extLst>
+          </p:cNvPr>
+          <p:cNvSpPr>
+            <a:spLocks noGrp="1"/>
+          </p:cNvSpPr>
+          <p:nvPr>
+            <p:ph idx="1"/>
+          </p:nvPr>
+        </p:nvSpPr>
+        <p:spPr/>
+        <p:txBody>
+          <a:bodyPr/>
+          <a:lstStyle/>
+          <a:p>
+            <a:endParaRPr lang="en-US"/>
+          </a:p>
+        </p:txBody>
+      </p:sp>
+      <p:sp>
+        <p:nvSpPr>
+          <p:cNvPr id="4" name="Slide Number Placeholder 3">
+            <a:extLst>
+              <a:ext uri="{FF2B5EF4-FFF2-40B4-BE49-F238E27FC236}">
+                <a16:creationId xmlns:a16="http://schemas.microsoft.com/office/drawing/2014/main" id="{DF8C3242-F7F3-4B6D-BE97-C08D1A7EC84D}"/>
+              </a:ext>
+            </a:extLst>
+          </p:cNvPr>
+          <p:cNvSpPr>
+            <a:spLocks noGrp="1"/>
+          </p:cNvSpPr>
+          <p:nvPr>
+            <p:ph type="sldNum" sz="quarter" idx="12"/>
+          </p:nvPr>
+        </p:nvSpPr>
+        <p:spPr/>
+        <p:txBody>
+          <a:bodyPr/>
+          <a:lstStyle/>
+          <a:p>
+            <a:fld id="{D57F1E4F-1CFF-5643-939E-217C01CDF565}" type="slidenum">
+              <a:rPr lang="en-US" smtClean="0"/>
+              <a:pPr/>
+              <a:t>28</a:t>
+            </a:fld>
+            <a:endParaRPr lang="en-US" dirty="0"/>
+          </a:p>
+        </p:txBody>
+      </p:sp>
+    </p:spTree>
+    <p:extLst>
+      <p:ext uri="{BB962C8B-B14F-4D97-AF65-F5344CB8AC3E}">
+        <p14:creationId xmlns:p14="http://schemas.microsoft.com/office/powerpoint/2010/main" val="1587191523"/>
+      </p:ext>
+    </p:extLst>
+  </p:cSld>
+  <p:clrMapOvr>
+    <a:masterClrMapping/>
+  </p:clrMapOvr>
+</p:sld>
+</file>
+
+<file path=ppt/slides/slide29.xml><?xml version="1.0" encoding="utf-8"?>
+<p:sld xmlns:a="http://schemas.openxmlformats.org/drawingml/2006/main" xmlns:r="http://schemas.openxmlformats.org/officeDocument/2006/relationships" xmlns:p="http://schemas.openxmlformats.org/presentationml/2006/main">
+  <p:cSld>
+    <p:spTree>
+      <p:nvGrpSpPr>
+        <p:cNvPr id="1" name=""/>
+        <p:cNvGrpSpPr/>
+        <p:nvPr/>
+      </p:nvGrpSpPr>
+      <p:grpSpPr>
+        <a:xfrm>
+          <a:off x="0" y="0"/>
+          <a:ext cx="0" cy="0"/>
+          <a:chOff x="0" y="0"/>
+          <a:chExt cx="0" cy="0"/>
+        </a:xfrm>
+      </p:grpSpPr>
+      <p:sp>
+        <p:nvSpPr>
+          <p:cNvPr id="2" name="Title 1">
+            <a:extLst>
+              <a:ext uri="{FF2B5EF4-FFF2-40B4-BE49-F238E27FC236}">
+                <a16:creationId xmlns:a16="http://schemas.microsoft.com/office/drawing/2014/main" id="{0925D358-7D77-482A-BA62-AF4AAB8E726F}"/>
+              </a:ext>
+            </a:extLst>
+          </p:cNvPr>
+          <p:cNvSpPr>
+            <a:spLocks noGrp="1"/>
+          </p:cNvSpPr>
+          <p:nvPr>
+            <p:ph type="title"/>
+          </p:nvPr>
+        </p:nvSpPr>
+        <p:spPr/>
+        <p:txBody>
+          <a:bodyPr/>
+          <a:lstStyle/>
+          <a:p>
+            <a:r>
+              <a:rPr lang="en-US" dirty="0"/>
+              <a:t>Unofficial Sprint</a:t>
+            </a:r>
+          </a:p>
+        </p:txBody>
+      </p:sp>
+      <p:sp>
+        <p:nvSpPr>
+          <p:cNvPr id="3" name="Content Placeholder 2">
+            <a:extLst>
+              <a:ext uri="{FF2B5EF4-FFF2-40B4-BE49-F238E27FC236}">
+                <a16:creationId xmlns:a16="http://schemas.microsoft.com/office/drawing/2014/main" id="{6A41BCA7-F42D-4C14-9EE3-C0604BD1C8ED}"/>
+              </a:ext>
+            </a:extLst>
+          </p:cNvPr>
+          <p:cNvSpPr>
+            <a:spLocks noGrp="1"/>
+          </p:cNvSpPr>
+          <p:nvPr>
+            <p:ph idx="1"/>
+          </p:nvPr>
+        </p:nvSpPr>
+        <p:spPr/>
+        <p:txBody>
+          <a:bodyPr/>
+          <a:lstStyle/>
+          <a:p>
+            <a:endParaRPr lang="en-US"/>
+          </a:p>
+        </p:txBody>
+      </p:sp>
+      <p:sp>
+        <p:nvSpPr>
+          <p:cNvPr id="4" name="Slide Number Placeholder 3">
+            <a:extLst>
+              <a:ext uri="{FF2B5EF4-FFF2-40B4-BE49-F238E27FC236}">
+                <a16:creationId xmlns:a16="http://schemas.microsoft.com/office/drawing/2014/main" id="{BB4882C3-32B5-455C-9E1C-9DBFC4D3EA7C}"/>
+              </a:ext>
+            </a:extLst>
+          </p:cNvPr>
+          <p:cNvSpPr>
+            <a:spLocks noGrp="1"/>
+          </p:cNvSpPr>
+          <p:nvPr>
+            <p:ph type="sldNum" sz="quarter" idx="12"/>
+          </p:nvPr>
+        </p:nvSpPr>
+        <p:spPr/>
+        <p:txBody>
+          <a:bodyPr/>
+          <a:lstStyle/>
+          <a:p>
+            <a:fld id="{D57F1E4F-1CFF-5643-939E-217C01CDF565}" type="slidenum">
+              <a:rPr lang="en-US" smtClean="0"/>
+              <a:pPr/>
+              <a:t>29</a:t>
+            </a:fld>
+            <a:endParaRPr lang="en-US" dirty="0"/>
+          </a:p>
+        </p:txBody>
+      </p:sp>
+    </p:spTree>
+    <p:extLst>
+      <p:ext uri="{BB962C8B-B14F-4D97-AF65-F5344CB8AC3E}">
+        <p14:creationId xmlns:p14="http://schemas.microsoft.com/office/powerpoint/2010/main" val="4099954266"/>
       </p:ext>
     </p:extLst>
   </p:cSld>
@@ -10929,6 +11700,232 @@
     <p:extLst>
       <p:ext uri="{BB962C8B-B14F-4D97-AF65-F5344CB8AC3E}">
         <p14:creationId xmlns:p14="http://schemas.microsoft.com/office/powerpoint/2010/main" val="2687585637"/>
+      </p:ext>
+    </p:extLst>
+  </p:cSld>
+  <p:clrMapOvr>
+    <a:masterClrMapping/>
+  </p:clrMapOvr>
+</p:sld>
+</file>
+
+<file path=ppt/slides/slide30.xml><?xml version="1.0" encoding="utf-8"?>
+<p:sld xmlns:a="http://schemas.openxmlformats.org/drawingml/2006/main" xmlns:r="http://schemas.openxmlformats.org/officeDocument/2006/relationships" xmlns:p="http://schemas.openxmlformats.org/presentationml/2006/main">
+  <p:cSld>
+    <p:spTree>
+      <p:nvGrpSpPr>
+        <p:cNvPr id="1" name=""/>
+        <p:cNvGrpSpPr/>
+        <p:nvPr/>
+      </p:nvGrpSpPr>
+      <p:grpSpPr>
+        <a:xfrm>
+          <a:off x="0" y="0"/>
+          <a:ext cx="0" cy="0"/>
+          <a:chOff x="0" y="0"/>
+          <a:chExt cx="0" cy="0"/>
+        </a:xfrm>
+      </p:grpSpPr>
+      <p:sp>
+        <p:nvSpPr>
+          <p:cNvPr id="2" name="Title 1">
+            <a:extLst>
+              <a:ext uri="{FF2B5EF4-FFF2-40B4-BE49-F238E27FC236}">
+                <a16:creationId xmlns:a16="http://schemas.microsoft.com/office/drawing/2014/main" id="{AD0AB5FE-C138-421F-92EE-1844FDF7256A}"/>
+              </a:ext>
+            </a:extLst>
+          </p:cNvPr>
+          <p:cNvSpPr>
+            <a:spLocks noGrp="1"/>
+          </p:cNvSpPr>
+          <p:nvPr>
+            <p:ph type="title"/>
+          </p:nvPr>
+        </p:nvSpPr>
+        <p:spPr/>
+        <p:txBody>
+          <a:bodyPr/>
+          <a:lstStyle/>
+          <a:p>
+            <a:r>
+              <a:rPr lang="en-US" dirty="0"/>
+              <a:t>Sprint 2</a:t>
+            </a:r>
+          </a:p>
+        </p:txBody>
+      </p:sp>
+      <p:sp>
+        <p:nvSpPr>
+          <p:cNvPr id="3" name="Content Placeholder 2">
+            <a:extLst>
+              <a:ext uri="{FF2B5EF4-FFF2-40B4-BE49-F238E27FC236}">
+                <a16:creationId xmlns:a16="http://schemas.microsoft.com/office/drawing/2014/main" id="{903C4FAD-1519-4538-BD82-6A08BE138CB6}"/>
+              </a:ext>
+            </a:extLst>
+          </p:cNvPr>
+          <p:cNvSpPr>
+            <a:spLocks noGrp="1"/>
+          </p:cNvSpPr>
+          <p:nvPr>
+            <p:ph idx="1"/>
+          </p:nvPr>
+        </p:nvSpPr>
+        <p:spPr/>
+        <p:txBody>
+          <a:bodyPr/>
+          <a:lstStyle/>
+          <a:p>
+            <a:endParaRPr lang="en-US"/>
+          </a:p>
+        </p:txBody>
+      </p:sp>
+      <p:sp>
+        <p:nvSpPr>
+          <p:cNvPr id="4" name="Slide Number Placeholder 3">
+            <a:extLst>
+              <a:ext uri="{FF2B5EF4-FFF2-40B4-BE49-F238E27FC236}">
+                <a16:creationId xmlns:a16="http://schemas.microsoft.com/office/drawing/2014/main" id="{2D0C1AF0-2A5F-49B5-B744-94150C0B7BD5}"/>
+              </a:ext>
+            </a:extLst>
+          </p:cNvPr>
+          <p:cNvSpPr>
+            <a:spLocks noGrp="1"/>
+          </p:cNvSpPr>
+          <p:nvPr>
+            <p:ph type="sldNum" sz="quarter" idx="12"/>
+          </p:nvPr>
+        </p:nvSpPr>
+        <p:spPr/>
+        <p:txBody>
+          <a:bodyPr/>
+          <a:lstStyle/>
+          <a:p>
+            <a:fld id="{D57F1E4F-1CFF-5643-939E-217C01CDF565}" type="slidenum">
+              <a:rPr lang="en-US" smtClean="0"/>
+              <a:pPr/>
+              <a:t>30</a:t>
+            </a:fld>
+            <a:endParaRPr lang="en-US" dirty="0"/>
+          </a:p>
+        </p:txBody>
+      </p:sp>
+    </p:spTree>
+    <p:extLst>
+      <p:ext uri="{BB962C8B-B14F-4D97-AF65-F5344CB8AC3E}">
+        <p14:creationId xmlns:p14="http://schemas.microsoft.com/office/powerpoint/2010/main" val="632679123"/>
+      </p:ext>
+    </p:extLst>
+  </p:cSld>
+  <p:clrMapOvr>
+    <a:masterClrMapping/>
+  </p:clrMapOvr>
+</p:sld>
+</file>
+
+<file path=ppt/slides/slide31.xml><?xml version="1.0" encoding="utf-8"?>
+<p:sld xmlns:a="http://schemas.openxmlformats.org/drawingml/2006/main" xmlns:r="http://schemas.openxmlformats.org/officeDocument/2006/relationships" xmlns:p="http://schemas.openxmlformats.org/presentationml/2006/main">
+  <p:cSld>
+    <p:spTree>
+      <p:nvGrpSpPr>
+        <p:cNvPr id="1" name=""/>
+        <p:cNvGrpSpPr/>
+        <p:nvPr/>
+      </p:nvGrpSpPr>
+      <p:grpSpPr>
+        <a:xfrm>
+          <a:off x="0" y="0"/>
+          <a:ext cx="0" cy="0"/>
+          <a:chOff x="0" y="0"/>
+          <a:chExt cx="0" cy="0"/>
+        </a:xfrm>
+      </p:grpSpPr>
+      <p:sp>
+        <p:nvSpPr>
+          <p:cNvPr id="2" name="Title 1">
+            <a:extLst>
+              <a:ext uri="{FF2B5EF4-FFF2-40B4-BE49-F238E27FC236}">
+                <a16:creationId xmlns:a16="http://schemas.microsoft.com/office/drawing/2014/main" id="{5DE1D604-AE0D-4070-84FA-E88517FF5DFF}"/>
+              </a:ext>
+            </a:extLst>
+          </p:cNvPr>
+          <p:cNvSpPr>
+            <a:spLocks noGrp="1"/>
+          </p:cNvSpPr>
+          <p:nvPr>
+            <p:ph type="title"/>
+          </p:nvPr>
+        </p:nvSpPr>
+        <p:spPr/>
+        <p:txBody>
+          <a:bodyPr/>
+          <a:lstStyle/>
+          <a:p>
+            <a:r>
+              <a:rPr lang="en-US"/>
+              <a:t>Questions?</a:t>
+            </a:r>
+          </a:p>
+        </p:txBody>
+      </p:sp>
+      <p:sp>
+        <p:nvSpPr>
+          <p:cNvPr id="3" name="Content Placeholder 2">
+            <a:extLst>
+              <a:ext uri="{FF2B5EF4-FFF2-40B4-BE49-F238E27FC236}">
+                <a16:creationId xmlns:a16="http://schemas.microsoft.com/office/drawing/2014/main" id="{E38BF89C-DFBF-421E-A964-AE3C9E1FC370}"/>
+              </a:ext>
+            </a:extLst>
+          </p:cNvPr>
+          <p:cNvSpPr>
+            <a:spLocks noGrp="1"/>
+          </p:cNvSpPr>
+          <p:nvPr>
+            <p:ph idx="1"/>
+          </p:nvPr>
+        </p:nvSpPr>
+        <p:spPr/>
+        <p:txBody>
+          <a:bodyPr/>
+          <a:lstStyle/>
+          <a:p>
+            <a:endParaRPr lang="en-US"/>
+          </a:p>
+        </p:txBody>
+      </p:sp>
+      <p:sp>
+        <p:nvSpPr>
+          <p:cNvPr id="4" name="Slide Number Placeholder 3">
+            <a:extLst>
+              <a:ext uri="{FF2B5EF4-FFF2-40B4-BE49-F238E27FC236}">
+                <a16:creationId xmlns:a16="http://schemas.microsoft.com/office/drawing/2014/main" id="{6DD83CE4-B7F7-4E5E-9EA9-93BC3E139089}"/>
+              </a:ext>
+            </a:extLst>
+          </p:cNvPr>
+          <p:cNvSpPr>
+            <a:spLocks noGrp="1"/>
+          </p:cNvSpPr>
+          <p:nvPr>
+            <p:ph type="sldNum" sz="quarter" idx="12"/>
+          </p:nvPr>
+        </p:nvSpPr>
+        <p:spPr/>
+        <p:txBody>
+          <a:bodyPr/>
+          <a:lstStyle/>
+          <a:p>
+            <a:fld id="{D57F1E4F-1CFF-5643-939E-217C01CDF565}" type="slidenum">
+              <a:rPr lang="en-US" smtClean="0"/>
+              <a:pPr/>
+              <a:t>31</a:t>
+            </a:fld>
+            <a:endParaRPr lang="en-US" dirty="0"/>
+          </a:p>
+        </p:txBody>
+      </p:sp>
+    </p:spTree>
+    <p:extLst>
+      <p:ext uri="{BB962C8B-B14F-4D97-AF65-F5344CB8AC3E}">
+        <p14:creationId xmlns:p14="http://schemas.microsoft.com/office/powerpoint/2010/main" val="490955183"/>
       </p:ext>
     </p:extLst>
   </p:cSld>

</xml_diff>